<commit_message>
06/11/2023 Sample 4 complete
</commit_message>
<xml_diff>
--- a/Mikhail Bandurist Transistors/Report_Electrical_Characterisation_batch2.pptx
+++ b/Mikhail Bandurist Transistors/Report_Electrical_Characterisation_batch2.pptx
@@ -18,6 +18,12 @@
     <p:sldId id="266" r:id="rId12"/>
     <p:sldId id="267" r:id="rId13"/>
     <p:sldId id="268" r:id="rId14"/>
+    <p:sldId id="269" r:id="rId15"/>
+    <p:sldId id="270" r:id="rId16"/>
+    <p:sldId id="271" r:id="rId17"/>
+    <p:sldId id="272" r:id="rId18"/>
+    <p:sldId id="273" r:id="rId19"/>
+    <p:sldId id="274" r:id="rId20"/>
   </p:sldIdLst>
   <p:sldSz cx="12192000" cy="6858000"/>
   <p:notesSz cx="6858000" cy="9144000"/>
@@ -273,7 +279,7 @@
           <a:p>
             <a:fld id="{9FDA9E9B-36F1-4FB7-8743-C1EA76B05336}" type="datetimeFigureOut">
               <a:rPr lang="ru-RU" smtClean="0"/>
-              <a:t>05.11.2023</a:t>
+              <a:t>06.11.2023</a:t>
             </a:fld>
             <a:endParaRPr lang="ru-RU"/>
           </a:p>
@@ -473,7 +479,7 @@
           <a:p>
             <a:fld id="{9FDA9E9B-36F1-4FB7-8743-C1EA76B05336}" type="datetimeFigureOut">
               <a:rPr lang="ru-RU" smtClean="0"/>
-              <a:t>05.11.2023</a:t>
+              <a:t>06.11.2023</a:t>
             </a:fld>
             <a:endParaRPr lang="ru-RU"/>
           </a:p>
@@ -683,7 +689,7 @@
           <a:p>
             <a:fld id="{9FDA9E9B-36F1-4FB7-8743-C1EA76B05336}" type="datetimeFigureOut">
               <a:rPr lang="ru-RU" smtClean="0"/>
-              <a:t>05.11.2023</a:t>
+              <a:t>06.11.2023</a:t>
             </a:fld>
             <a:endParaRPr lang="ru-RU"/>
           </a:p>
@@ -883,7 +889,7 @@
           <a:p>
             <a:fld id="{9FDA9E9B-36F1-4FB7-8743-C1EA76B05336}" type="datetimeFigureOut">
               <a:rPr lang="ru-RU" smtClean="0"/>
-              <a:t>05.11.2023</a:t>
+              <a:t>06.11.2023</a:t>
             </a:fld>
             <a:endParaRPr lang="ru-RU"/>
           </a:p>
@@ -1159,7 +1165,7 @@
           <a:p>
             <a:fld id="{9FDA9E9B-36F1-4FB7-8743-C1EA76B05336}" type="datetimeFigureOut">
               <a:rPr lang="ru-RU" smtClean="0"/>
-              <a:t>05.11.2023</a:t>
+              <a:t>06.11.2023</a:t>
             </a:fld>
             <a:endParaRPr lang="ru-RU"/>
           </a:p>
@@ -1427,7 +1433,7 @@
           <a:p>
             <a:fld id="{9FDA9E9B-36F1-4FB7-8743-C1EA76B05336}" type="datetimeFigureOut">
               <a:rPr lang="ru-RU" smtClean="0"/>
-              <a:t>05.11.2023</a:t>
+              <a:t>06.11.2023</a:t>
             </a:fld>
             <a:endParaRPr lang="ru-RU"/>
           </a:p>
@@ -1842,7 +1848,7 @@
           <a:p>
             <a:fld id="{9FDA9E9B-36F1-4FB7-8743-C1EA76B05336}" type="datetimeFigureOut">
               <a:rPr lang="ru-RU" smtClean="0"/>
-              <a:t>05.11.2023</a:t>
+              <a:t>06.11.2023</a:t>
             </a:fld>
             <a:endParaRPr lang="ru-RU"/>
           </a:p>
@@ -1984,7 +1990,7 @@
           <a:p>
             <a:fld id="{9FDA9E9B-36F1-4FB7-8743-C1EA76B05336}" type="datetimeFigureOut">
               <a:rPr lang="ru-RU" smtClean="0"/>
-              <a:t>05.11.2023</a:t>
+              <a:t>06.11.2023</a:t>
             </a:fld>
             <a:endParaRPr lang="ru-RU"/>
           </a:p>
@@ -2097,7 +2103,7 @@
           <a:p>
             <a:fld id="{9FDA9E9B-36F1-4FB7-8743-C1EA76B05336}" type="datetimeFigureOut">
               <a:rPr lang="ru-RU" smtClean="0"/>
-              <a:t>05.11.2023</a:t>
+              <a:t>06.11.2023</a:t>
             </a:fld>
             <a:endParaRPr lang="ru-RU"/>
           </a:p>
@@ -2410,7 +2416,7 @@
           <a:p>
             <a:fld id="{9FDA9E9B-36F1-4FB7-8743-C1EA76B05336}" type="datetimeFigureOut">
               <a:rPr lang="ru-RU" smtClean="0"/>
-              <a:t>05.11.2023</a:t>
+              <a:t>06.11.2023</a:t>
             </a:fld>
             <a:endParaRPr lang="ru-RU"/>
           </a:p>
@@ -2699,7 +2705,7 @@
           <a:p>
             <a:fld id="{9FDA9E9B-36F1-4FB7-8743-C1EA76B05336}" type="datetimeFigureOut">
               <a:rPr lang="ru-RU" smtClean="0"/>
-              <a:t>05.11.2023</a:t>
+              <a:t>06.11.2023</a:t>
             </a:fld>
             <a:endParaRPr lang="ru-RU"/>
           </a:p>
@@ -2942,7 +2948,7 @@
           <a:p>
             <a:fld id="{9FDA9E9B-36F1-4FB7-8743-C1EA76B05336}" type="datetimeFigureOut">
               <a:rPr lang="ru-RU" smtClean="0"/>
-              <a:t>05.11.2023</a:t>
+              <a:t>06.11.2023</a:t>
             </a:fld>
             <a:endParaRPr lang="ru-RU"/>
           </a:p>
@@ -4153,6 +4159,658 @@
     <p:extLst>
       <p:ext uri="{BB962C8B-B14F-4D97-AF65-F5344CB8AC3E}">
         <p14:creationId xmlns:p14="http://schemas.microsoft.com/office/powerpoint/2010/main" val="3904730134"/>
+      </p:ext>
+    </p:extLst>
+  </p:cSld>
+  <p:clrMapOvr>
+    <a:masterClrMapping/>
+  </p:clrMapOvr>
+</p:sld>
+</file>
+
+<file path=ppt/slides/slide14.xml><?xml version="1.0" encoding="utf-8"?>
+<p:sld xmlns:a="http://schemas.openxmlformats.org/drawingml/2006/main" xmlns:r="http://schemas.openxmlformats.org/officeDocument/2006/relationships" xmlns:p="http://schemas.openxmlformats.org/presentationml/2006/main">
+  <p:cSld>
+    <p:spTree>
+      <p:nvGrpSpPr>
+        <p:cNvPr id="1" name=""/>
+        <p:cNvGrpSpPr/>
+        <p:nvPr/>
+      </p:nvGrpSpPr>
+      <p:grpSpPr>
+        <a:xfrm>
+          <a:off x="0" y="0"/>
+          <a:ext cx="0" cy="0"/>
+          <a:chOff x="0" y="0"/>
+          <a:chExt cx="0" cy="0"/>
+        </a:xfrm>
+      </p:grpSpPr>
+      <p:sp>
+        <p:nvSpPr>
+          <p:cNvPr id="2" name="Title 1">
+            <a:extLst>
+              <a:ext uri="{FF2B5EF4-FFF2-40B4-BE49-F238E27FC236}">
+                <a16:creationId xmlns:a16="http://schemas.microsoft.com/office/drawing/2014/main" id="{14D665AE-237B-976C-CC0F-614591CCB7AD}"/>
+              </a:ext>
+            </a:extLst>
+          </p:cNvPr>
+          <p:cNvSpPr>
+            <a:spLocks noGrp="1"/>
+          </p:cNvSpPr>
+          <p:nvPr>
+            <p:ph type="ctrTitle"/>
+          </p:nvPr>
+        </p:nvSpPr>
+        <p:spPr/>
+        <p:txBody>
+          <a:bodyPr/>
+          <a:lstStyle/>
+          <a:p>
+            <a:r>
+              <a:rPr lang="en-US" dirty="0"/>
+              <a:t>Sample 4</a:t>
+            </a:r>
+            <a:endParaRPr lang="ru-RU" dirty="0"/>
+          </a:p>
+        </p:txBody>
+      </p:sp>
+      <p:sp>
+        <p:nvSpPr>
+          <p:cNvPr id="3" name="Subtitle 2">
+            <a:extLst>
+              <a:ext uri="{FF2B5EF4-FFF2-40B4-BE49-F238E27FC236}">
+                <a16:creationId xmlns:a16="http://schemas.microsoft.com/office/drawing/2014/main" id="{F5D86F95-10C7-6B01-803E-C2C11F0F7D70}"/>
+              </a:ext>
+            </a:extLst>
+          </p:cNvPr>
+          <p:cNvSpPr>
+            <a:spLocks noGrp="1"/>
+          </p:cNvSpPr>
+          <p:nvPr>
+            <p:ph type="subTitle" idx="1"/>
+          </p:nvPr>
+        </p:nvSpPr>
+        <p:spPr/>
+        <p:txBody>
+          <a:bodyPr/>
+          <a:lstStyle/>
+          <a:p>
+            <a:pPr marL="342900" indent="-342900">
+              <a:buFont typeface="Arial" panose="020B0604020202020204" pitchFamily="34" charset="0"/>
+              <a:buChar char="•"/>
+            </a:pPr>
+            <a:r>
+              <a:rPr lang="en-US" dirty="0"/>
+              <a:t>Sample4_device1</a:t>
+            </a:r>
+            <a:endParaRPr lang="ru-RU" dirty="0"/>
+          </a:p>
+        </p:txBody>
+      </p:sp>
+    </p:spTree>
+    <p:extLst>
+      <p:ext uri="{BB962C8B-B14F-4D97-AF65-F5344CB8AC3E}">
+        <p14:creationId xmlns:p14="http://schemas.microsoft.com/office/powerpoint/2010/main" val="3761327978"/>
+      </p:ext>
+    </p:extLst>
+  </p:cSld>
+  <p:clrMapOvr>
+    <a:masterClrMapping/>
+  </p:clrMapOvr>
+</p:sld>
+</file>
+
+<file path=ppt/slides/slide15.xml><?xml version="1.0" encoding="utf-8"?>
+<p:sld xmlns:a="http://schemas.openxmlformats.org/drawingml/2006/main" xmlns:r="http://schemas.openxmlformats.org/officeDocument/2006/relationships" xmlns:p="http://schemas.openxmlformats.org/presentationml/2006/main">
+  <p:cSld>
+    <p:spTree>
+      <p:nvGrpSpPr>
+        <p:cNvPr id="1" name=""/>
+        <p:cNvGrpSpPr/>
+        <p:nvPr/>
+      </p:nvGrpSpPr>
+      <p:grpSpPr>
+        <a:xfrm>
+          <a:off x="0" y="0"/>
+          <a:ext cx="0" cy="0"/>
+          <a:chOff x="0" y="0"/>
+          <a:chExt cx="0" cy="0"/>
+        </a:xfrm>
+      </p:grpSpPr>
+      <p:sp>
+        <p:nvSpPr>
+          <p:cNvPr id="2" name="Title 1">
+            <a:extLst>
+              <a:ext uri="{FF2B5EF4-FFF2-40B4-BE49-F238E27FC236}">
+                <a16:creationId xmlns:a16="http://schemas.microsoft.com/office/drawing/2014/main" id="{01B04372-B5C7-6CA9-FBAC-3FD5ED37BF01}"/>
+              </a:ext>
+            </a:extLst>
+          </p:cNvPr>
+          <p:cNvSpPr>
+            <a:spLocks noGrp="1"/>
+          </p:cNvSpPr>
+          <p:nvPr>
+            <p:ph type="title"/>
+          </p:nvPr>
+        </p:nvSpPr>
+        <p:spPr/>
+        <p:txBody>
+          <a:bodyPr/>
+          <a:lstStyle/>
+          <a:p>
+            <a:r>
+              <a:rPr lang="en-US" dirty="0"/>
+              <a:t>Sample4_device1</a:t>
+            </a:r>
+            <a:endParaRPr lang="ru-RU" dirty="0"/>
+          </a:p>
+        </p:txBody>
+      </p:sp>
+      <p:graphicFrame>
+        <p:nvGraphicFramePr>
+          <p:cNvPr id="4" name="Object 3">
+            <a:extLst>
+              <a:ext uri="{FF2B5EF4-FFF2-40B4-BE49-F238E27FC236}">
+                <a16:creationId xmlns:a16="http://schemas.microsoft.com/office/drawing/2014/main" id="{7327DA12-6F88-BC73-FE02-3202C74A13CF}"/>
+              </a:ext>
+            </a:extLst>
+          </p:cNvPr>
+          <p:cNvGraphicFramePr>
+            <a:graphicFrameLocks noChangeAspect="1"/>
+          </p:cNvGraphicFramePr>
+          <p:nvPr>
+            <p:extLst>
+              <p:ext uri="{D42A27DB-BD31-4B8C-83A1-F6EECF244321}">
+                <p14:modId xmlns:p14="http://schemas.microsoft.com/office/powerpoint/2010/main" val="4131449418"/>
+              </p:ext>
+            </p:extLst>
+          </p:nvPr>
+        </p:nvGraphicFramePr>
+        <p:xfrm>
+          <a:off x="-275303" y="1690688"/>
+          <a:ext cx="6586667" cy="5040000"/>
+        </p:xfrm>
+        <a:graphic>
+          <a:graphicData uri="http://schemas.openxmlformats.org/presentationml/2006/ole">
+            <mc:AlternateContent xmlns:mc="http://schemas.openxmlformats.org/markup-compatibility/2006">
+              <mc:Choice xmlns:v="urn:schemas-microsoft-com:vml" Requires="v">
+                <p:oleObj name="Graph" r:id="rId2" imgW="3920760" imgH="3000960" progId="Origin95.Graph">
+                  <p:embed/>
+                </p:oleObj>
+              </mc:Choice>
+              <mc:Fallback>
+                <p:oleObj name="Graph" r:id="rId2" imgW="3920760" imgH="3000960" progId="Origin95.Graph">
+                  <p:embed/>
+                  <p:pic>
+                    <p:nvPicPr>
+                      <p:cNvPr id="0" name=""/>
+                      <p:cNvPicPr/>
+                      <p:nvPr/>
+                    </p:nvPicPr>
+                    <p:blipFill>
+                      <a:blip r:embed="rId3"/>
+                      <a:stretch>
+                        <a:fillRect/>
+                      </a:stretch>
+                    </p:blipFill>
+                    <p:spPr>
+                      <a:xfrm>
+                        <a:off x="-275303" y="1690688"/>
+                        <a:ext cx="6586667" cy="5040000"/>
+                      </a:xfrm>
+                      <a:prstGeom prst="rect">
+                        <a:avLst/>
+                      </a:prstGeom>
+                    </p:spPr>
+                  </p:pic>
+                </p:oleObj>
+              </mc:Fallback>
+            </mc:AlternateContent>
+          </a:graphicData>
+        </a:graphic>
+      </p:graphicFrame>
+      <p:graphicFrame>
+        <p:nvGraphicFramePr>
+          <p:cNvPr id="5" name="Object 4">
+            <a:extLst>
+              <a:ext uri="{FF2B5EF4-FFF2-40B4-BE49-F238E27FC236}">
+                <a16:creationId xmlns:a16="http://schemas.microsoft.com/office/drawing/2014/main" id="{51F72214-D8FE-DB38-3E8A-3275AB2F2333}"/>
+              </a:ext>
+            </a:extLst>
+          </p:cNvPr>
+          <p:cNvGraphicFramePr>
+            <a:graphicFrameLocks noChangeAspect="1"/>
+          </p:cNvGraphicFramePr>
+          <p:nvPr>
+            <p:extLst>
+              <p:ext uri="{D42A27DB-BD31-4B8C-83A1-F6EECF244321}">
+                <p14:modId xmlns:p14="http://schemas.microsoft.com/office/powerpoint/2010/main" val="167833916"/>
+              </p:ext>
+            </p:extLst>
+          </p:nvPr>
+        </p:nvGraphicFramePr>
+        <p:xfrm>
+          <a:off x="6096000" y="1690688"/>
+          <a:ext cx="6586667" cy="5040000"/>
+        </p:xfrm>
+        <a:graphic>
+          <a:graphicData uri="http://schemas.openxmlformats.org/presentationml/2006/ole">
+            <mc:AlternateContent xmlns:mc="http://schemas.openxmlformats.org/markup-compatibility/2006">
+              <mc:Choice xmlns:v="urn:schemas-microsoft-com:vml" Requires="v">
+                <p:oleObj name="Graph" r:id="rId4" imgW="3920760" imgH="3000960" progId="Origin95.Graph">
+                  <p:embed/>
+                </p:oleObj>
+              </mc:Choice>
+              <mc:Fallback>
+                <p:oleObj name="Graph" r:id="rId4" imgW="3920760" imgH="3000960" progId="Origin95.Graph">
+                  <p:embed/>
+                  <p:pic>
+                    <p:nvPicPr>
+                      <p:cNvPr id="0" name=""/>
+                      <p:cNvPicPr/>
+                      <p:nvPr/>
+                    </p:nvPicPr>
+                    <p:blipFill>
+                      <a:blip r:embed="rId5"/>
+                      <a:stretch>
+                        <a:fillRect/>
+                      </a:stretch>
+                    </p:blipFill>
+                    <p:spPr>
+                      <a:xfrm>
+                        <a:off x="6096000" y="1690688"/>
+                        <a:ext cx="6586667" cy="5040000"/>
+                      </a:xfrm>
+                      <a:prstGeom prst="rect">
+                        <a:avLst/>
+                      </a:prstGeom>
+                    </p:spPr>
+                  </p:pic>
+                </p:oleObj>
+              </mc:Fallback>
+            </mc:AlternateContent>
+          </a:graphicData>
+        </a:graphic>
+      </p:graphicFrame>
+    </p:spTree>
+    <p:extLst>
+      <p:ext uri="{BB962C8B-B14F-4D97-AF65-F5344CB8AC3E}">
+        <p14:creationId xmlns:p14="http://schemas.microsoft.com/office/powerpoint/2010/main" val="654888594"/>
+      </p:ext>
+    </p:extLst>
+  </p:cSld>
+  <p:clrMapOvr>
+    <a:masterClrMapping/>
+  </p:clrMapOvr>
+</p:sld>
+</file>
+
+<file path=ppt/slides/slide16.xml><?xml version="1.0" encoding="utf-8"?>
+<p:sld xmlns:a="http://schemas.openxmlformats.org/drawingml/2006/main" xmlns:r="http://schemas.openxmlformats.org/officeDocument/2006/relationships" xmlns:p="http://schemas.openxmlformats.org/presentationml/2006/main">
+  <p:cSld>
+    <p:spTree>
+      <p:nvGrpSpPr>
+        <p:cNvPr id="1" name=""/>
+        <p:cNvGrpSpPr/>
+        <p:nvPr/>
+      </p:nvGrpSpPr>
+      <p:grpSpPr>
+        <a:xfrm>
+          <a:off x="0" y="0"/>
+          <a:ext cx="0" cy="0"/>
+          <a:chOff x="0" y="0"/>
+          <a:chExt cx="0" cy="0"/>
+        </a:xfrm>
+      </p:grpSpPr>
+      <p:sp>
+        <p:nvSpPr>
+          <p:cNvPr id="2" name="Title 1">
+            <a:extLst>
+              <a:ext uri="{FF2B5EF4-FFF2-40B4-BE49-F238E27FC236}">
+                <a16:creationId xmlns:a16="http://schemas.microsoft.com/office/drawing/2014/main" id="{C7087B7F-F711-55C1-567B-DC69138FF912}"/>
+              </a:ext>
+            </a:extLst>
+          </p:cNvPr>
+          <p:cNvSpPr>
+            <a:spLocks noGrp="1"/>
+          </p:cNvSpPr>
+          <p:nvPr>
+            <p:ph type="title"/>
+          </p:nvPr>
+        </p:nvSpPr>
+        <p:spPr/>
+        <p:txBody>
+          <a:bodyPr/>
+          <a:lstStyle/>
+          <a:p>
+            <a:r>
+              <a:rPr lang="en-US" dirty="0"/>
+              <a:t>Sample4_device1</a:t>
+            </a:r>
+            <a:endParaRPr lang="ru-RU" dirty="0"/>
+          </a:p>
+        </p:txBody>
+      </p:sp>
+      <p:graphicFrame>
+        <p:nvGraphicFramePr>
+          <p:cNvPr id="4" name="Object 3">
+            <a:extLst>
+              <a:ext uri="{FF2B5EF4-FFF2-40B4-BE49-F238E27FC236}">
+                <a16:creationId xmlns:a16="http://schemas.microsoft.com/office/drawing/2014/main" id="{01F223FD-1576-5DDC-3849-5916A4B35B91}"/>
+              </a:ext>
+            </a:extLst>
+          </p:cNvPr>
+          <p:cNvGraphicFramePr>
+            <a:graphicFrameLocks noChangeAspect="1"/>
+          </p:cNvGraphicFramePr>
+          <p:nvPr>
+            <p:extLst>
+              <p:ext uri="{D42A27DB-BD31-4B8C-83A1-F6EECF244321}">
+                <p14:modId xmlns:p14="http://schemas.microsoft.com/office/powerpoint/2010/main" val="2176192848"/>
+              </p:ext>
+            </p:extLst>
+          </p:nvPr>
+        </p:nvGraphicFramePr>
+        <p:xfrm>
+          <a:off x="-376622" y="1690688"/>
+          <a:ext cx="6586667" cy="5040000"/>
+        </p:xfrm>
+        <a:graphic>
+          <a:graphicData uri="http://schemas.openxmlformats.org/presentationml/2006/ole">
+            <mc:AlternateContent xmlns:mc="http://schemas.openxmlformats.org/markup-compatibility/2006">
+              <mc:Choice xmlns:v="urn:schemas-microsoft-com:vml" Requires="v">
+                <p:oleObj name="Graph" r:id="rId2" imgW="3920760" imgH="3000960" progId="Origin95.Graph">
+                  <p:embed/>
+                </p:oleObj>
+              </mc:Choice>
+              <mc:Fallback>
+                <p:oleObj name="Graph" r:id="rId2" imgW="3920760" imgH="3000960" progId="Origin95.Graph">
+                  <p:embed/>
+                  <p:pic>
+                    <p:nvPicPr>
+                      <p:cNvPr id="0" name=""/>
+                      <p:cNvPicPr/>
+                      <p:nvPr/>
+                    </p:nvPicPr>
+                    <p:blipFill>
+                      <a:blip r:embed="rId3"/>
+                      <a:stretch>
+                        <a:fillRect/>
+                      </a:stretch>
+                    </p:blipFill>
+                    <p:spPr>
+                      <a:xfrm>
+                        <a:off x="-376622" y="1690688"/>
+                        <a:ext cx="6586667" cy="5040000"/>
+                      </a:xfrm>
+                      <a:prstGeom prst="rect">
+                        <a:avLst/>
+                      </a:prstGeom>
+                    </p:spPr>
+                  </p:pic>
+                </p:oleObj>
+              </mc:Fallback>
+            </mc:AlternateContent>
+          </a:graphicData>
+        </a:graphic>
+      </p:graphicFrame>
+      <p:graphicFrame>
+        <p:nvGraphicFramePr>
+          <p:cNvPr id="5" name="Object 4">
+            <a:extLst>
+              <a:ext uri="{FF2B5EF4-FFF2-40B4-BE49-F238E27FC236}">
+                <a16:creationId xmlns:a16="http://schemas.microsoft.com/office/drawing/2014/main" id="{F5B3F234-DBFF-7680-2D61-6133059C27ED}"/>
+              </a:ext>
+            </a:extLst>
+          </p:cNvPr>
+          <p:cNvGraphicFramePr>
+            <a:graphicFrameLocks noChangeAspect="1"/>
+          </p:cNvGraphicFramePr>
+          <p:nvPr>
+            <p:extLst>
+              <p:ext uri="{D42A27DB-BD31-4B8C-83A1-F6EECF244321}">
+                <p14:modId xmlns:p14="http://schemas.microsoft.com/office/powerpoint/2010/main" val="3825901204"/>
+              </p:ext>
+            </p:extLst>
+          </p:nvPr>
+        </p:nvGraphicFramePr>
+        <p:xfrm>
+          <a:off x="6096000" y="1690688"/>
+          <a:ext cx="6586667" cy="5040000"/>
+        </p:xfrm>
+        <a:graphic>
+          <a:graphicData uri="http://schemas.openxmlformats.org/presentationml/2006/ole">
+            <mc:AlternateContent xmlns:mc="http://schemas.openxmlformats.org/markup-compatibility/2006">
+              <mc:Choice xmlns:v="urn:schemas-microsoft-com:vml" Requires="v">
+                <p:oleObj name="Graph" r:id="rId4" imgW="3920760" imgH="3000960" progId="Origin95.Graph">
+                  <p:embed/>
+                </p:oleObj>
+              </mc:Choice>
+              <mc:Fallback>
+                <p:oleObj name="Graph" r:id="rId4" imgW="3920760" imgH="3000960" progId="Origin95.Graph">
+                  <p:embed/>
+                  <p:pic>
+                    <p:nvPicPr>
+                      <p:cNvPr id="0" name=""/>
+                      <p:cNvPicPr/>
+                      <p:nvPr/>
+                    </p:nvPicPr>
+                    <p:blipFill>
+                      <a:blip r:embed="rId5"/>
+                      <a:stretch>
+                        <a:fillRect/>
+                      </a:stretch>
+                    </p:blipFill>
+                    <p:spPr>
+                      <a:xfrm>
+                        <a:off x="6096000" y="1690688"/>
+                        <a:ext cx="6586667" cy="5040000"/>
+                      </a:xfrm>
+                      <a:prstGeom prst="rect">
+                        <a:avLst/>
+                      </a:prstGeom>
+                    </p:spPr>
+                  </p:pic>
+                </p:oleObj>
+              </mc:Fallback>
+            </mc:AlternateContent>
+          </a:graphicData>
+        </a:graphic>
+      </p:graphicFrame>
+    </p:spTree>
+    <p:extLst>
+      <p:ext uri="{BB962C8B-B14F-4D97-AF65-F5344CB8AC3E}">
+        <p14:creationId xmlns:p14="http://schemas.microsoft.com/office/powerpoint/2010/main" val="2997380184"/>
+      </p:ext>
+    </p:extLst>
+  </p:cSld>
+  <p:clrMapOvr>
+    <a:masterClrMapping/>
+  </p:clrMapOvr>
+</p:sld>
+</file>
+
+<file path=ppt/slides/slide17.xml><?xml version="1.0" encoding="utf-8"?>
+<p:sld xmlns:a="http://schemas.openxmlformats.org/drawingml/2006/main" xmlns:r="http://schemas.openxmlformats.org/officeDocument/2006/relationships" xmlns:p="http://schemas.openxmlformats.org/presentationml/2006/main">
+  <p:cSld>
+    <p:spTree>
+      <p:nvGrpSpPr>
+        <p:cNvPr id="1" name=""/>
+        <p:cNvGrpSpPr/>
+        <p:nvPr/>
+      </p:nvGrpSpPr>
+      <p:grpSpPr>
+        <a:xfrm>
+          <a:off x="0" y="0"/>
+          <a:ext cx="0" cy="0"/>
+          <a:chOff x="0" y="0"/>
+          <a:chExt cx="0" cy="0"/>
+        </a:xfrm>
+      </p:grpSpPr>
+      <p:sp>
+        <p:nvSpPr>
+          <p:cNvPr id="2" name="Title 1">
+            <a:extLst>
+              <a:ext uri="{FF2B5EF4-FFF2-40B4-BE49-F238E27FC236}">
+                <a16:creationId xmlns:a16="http://schemas.microsoft.com/office/drawing/2014/main" id="{9C078969-CC03-9D85-D2E1-DF8317DF11E4}"/>
+              </a:ext>
+            </a:extLst>
+          </p:cNvPr>
+          <p:cNvSpPr>
+            <a:spLocks noGrp="1"/>
+          </p:cNvSpPr>
+          <p:nvPr>
+            <p:ph type="ctrTitle"/>
+          </p:nvPr>
+        </p:nvSpPr>
+        <p:spPr/>
+        <p:txBody>
+          <a:bodyPr/>
+          <a:lstStyle/>
+          <a:p>
+            <a:endParaRPr lang="ru-RU"/>
+          </a:p>
+        </p:txBody>
+      </p:sp>
+      <p:sp>
+        <p:nvSpPr>
+          <p:cNvPr id="3" name="Subtitle 2">
+            <a:extLst>
+              <a:ext uri="{FF2B5EF4-FFF2-40B4-BE49-F238E27FC236}">
+                <a16:creationId xmlns:a16="http://schemas.microsoft.com/office/drawing/2014/main" id="{C07E624A-3385-2757-4F09-180C52B10E8B}"/>
+              </a:ext>
+            </a:extLst>
+          </p:cNvPr>
+          <p:cNvSpPr>
+            <a:spLocks noGrp="1"/>
+          </p:cNvSpPr>
+          <p:nvPr>
+            <p:ph type="subTitle" idx="1"/>
+          </p:nvPr>
+        </p:nvSpPr>
+        <p:spPr/>
+        <p:txBody>
+          <a:bodyPr/>
+          <a:lstStyle/>
+          <a:p>
+            <a:endParaRPr lang="ru-RU"/>
+          </a:p>
+        </p:txBody>
+      </p:sp>
+    </p:spTree>
+    <p:extLst>
+      <p:ext uri="{BB962C8B-B14F-4D97-AF65-F5344CB8AC3E}">
+        <p14:creationId xmlns:p14="http://schemas.microsoft.com/office/powerpoint/2010/main" val="826207796"/>
+      </p:ext>
+    </p:extLst>
+  </p:cSld>
+  <p:clrMapOvr>
+    <a:masterClrMapping/>
+  </p:clrMapOvr>
+</p:sld>
+</file>
+
+<file path=ppt/slides/slide18.xml><?xml version="1.0" encoding="utf-8"?>
+<p:sld xmlns:a="http://schemas.openxmlformats.org/drawingml/2006/main" xmlns:r="http://schemas.openxmlformats.org/officeDocument/2006/relationships" xmlns:p="http://schemas.openxmlformats.org/presentationml/2006/main">
+  <p:cSld>
+    <p:spTree>
+      <p:nvGrpSpPr>
+        <p:cNvPr id="1" name=""/>
+        <p:cNvGrpSpPr/>
+        <p:nvPr/>
+      </p:nvGrpSpPr>
+      <p:grpSpPr>
+        <a:xfrm>
+          <a:off x="0" y="0"/>
+          <a:ext cx="0" cy="0"/>
+          <a:chOff x="0" y="0"/>
+          <a:chExt cx="0" cy="0"/>
+        </a:xfrm>
+      </p:grpSpPr>
+      <p:sp>
+        <p:nvSpPr>
+          <p:cNvPr id="2" name="Title 1">
+            <a:extLst>
+              <a:ext uri="{FF2B5EF4-FFF2-40B4-BE49-F238E27FC236}">
+                <a16:creationId xmlns:a16="http://schemas.microsoft.com/office/drawing/2014/main" id="{C203A7DE-257C-64CA-53D6-3CA5DB6D24CF}"/>
+              </a:ext>
+            </a:extLst>
+          </p:cNvPr>
+          <p:cNvSpPr>
+            <a:spLocks noGrp="1"/>
+          </p:cNvSpPr>
+          <p:nvPr>
+            <p:ph type="title"/>
+          </p:nvPr>
+        </p:nvSpPr>
+        <p:spPr/>
+        <p:txBody>
+          <a:bodyPr/>
+          <a:lstStyle/>
+          <a:p>
+            <a:endParaRPr lang="ru-RU"/>
+          </a:p>
+        </p:txBody>
+      </p:sp>
+    </p:spTree>
+    <p:extLst>
+      <p:ext uri="{BB962C8B-B14F-4D97-AF65-F5344CB8AC3E}">
+        <p14:creationId xmlns:p14="http://schemas.microsoft.com/office/powerpoint/2010/main" val="2463774170"/>
+      </p:ext>
+    </p:extLst>
+  </p:cSld>
+  <p:clrMapOvr>
+    <a:masterClrMapping/>
+  </p:clrMapOvr>
+</p:sld>
+</file>
+
+<file path=ppt/slides/slide19.xml><?xml version="1.0" encoding="utf-8"?>
+<p:sld xmlns:a="http://schemas.openxmlformats.org/drawingml/2006/main" xmlns:r="http://schemas.openxmlformats.org/officeDocument/2006/relationships" xmlns:p="http://schemas.openxmlformats.org/presentationml/2006/main">
+  <p:cSld>
+    <p:spTree>
+      <p:nvGrpSpPr>
+        <p:cNvPr id="1" name=""/>
+        <p:cNvGrpSpPr/>
+        <p:nvPr/>
+      </p:nvGrpSpPr>
+      <p:grpSpPr>
+        <a:xfrm>
+          <a:off x="0" y="0"/>
+          <a:ext cx="0" cy="0"/>
+          <a:chOff x="0" y="0"/>
+          <a:chExt cx="0" cy="0"/>
+        </a:xfrm>
+      </p:grpSpPr>
+      <p:sp>
+        <p:nvSpPr>
+          <p:cNvPr id="2" name="Title 1">
+            <a:extLst>
+              <a:ext uri="{FF2B5EF4-FFF2-40B4-BE49-F238E27FC236}">
+                <a16:creationId xmlns:a16="http://schemas.microsoft.com/office/drawing/2014/main" id="{FB6E1254-5134-FA5A-085D-1291A6BDEB9D}"/>
+              </a:ext>
+            </a:extLst>
+          </p:cNvPr>
+          <p:cNvSpPr>
+            <a:spLocks noGrp="1"/>
+          </p:cNvSpPr>
+          <p:nvPr>
+            <p:ph type="title"/>
+          </p:nvPr>
+        </p:nvSpPr>
+        <p:spPr/>
+        <p:txBody>
+          <a:bodyPr/>
+          <a:lstStyle/>
+          <a:p>
+            <a:endParaRPr lang="ru-RU"/>
+          </a:p>
+        </p:txBody>
+      </p:sp>
+    </p:spTree>
+    <p:extLst>
+      <p:ext uri="{BB962C8B-B14F-4D97-AF65-F5344CB8AC3E}">
+        <p14:creationId xmlns:p14="http://schemas.microsoft.com/office/powerpoint/2010/main" val="3016746786"/>
       </p:ext>
     </p:extLst>
   </p:cSld>

</xml_diff>

<commit_message>
08/11/2023 Sample 6 is complete
</commit_message>
<xml_diff>
--- a/Mikhail Bandurist Transistors/Report_Electrical_Characterisation_batch2.pptx
+++ b/Mikhail Bandurist Transistors/Report_Electrical_Characterisation_batch2.pptx
@@ -5,7 +5,7 @@
     <p:sldMasterId id="2147483648" r:id="rId1"/>
   </p:sldMasterIdLst>
   <p:notesMasterIdLst>
-    <p:notesMasterId r:id="rId31"/>
+    <p:notesMasterId r:id="rId36"/>
   </p:notesMasterIdLst>
   <p:sldIdLst>
     <p:sldId id="256" r:id="rId2"/>
@@ -33,10 +33,15 @@
     <p:sldId id="278" r:id="rId24"/>
     <p:sldId id="279" r:id="rId25"/>
     <p:sldId id="280" r:id="rId26"/>
-    <p:sldId id="281" r:id="rId27"/>
-    <p:sldId id="282" r:id="rId28"/>
-    <p:sldId id="283" r:id="rId29"/>
-    <p:sldId id="284" r:id="rId30"/>
+    <p:sldId id="285" r:id="rId27"/>
+    <p:sldId id="281" r:id="rId28"/>
+    <p:sldId id="282" r:id="rId29"/>
+    <p:sldId id="283" r:id="rId30"/>
+    <p:sldId id="284" r:id="rId31"/>
+    <p:sldId id="286" r:id="rId32"/>
+    <p:sldId id="287" r:id="rId33"/>
+    <p:sldId id="288" r:id="rId34"/>
+    <p:sldId id="289" r:id="rId35"/>
   </p:sldIdLst>
   <p:sldSz cx="12192000" cy="6858000"/>
   <p:notesSz cx="6858000" cy="9144000"/>
@@ -225,7 +230,7 @@
           <a:p>
             <a:fld id="{B96EF0F7-918A-4738-AB99-78B82970DF32}" type="datetimeFigureOut">
               <a:rPr lang="ru-RU" smtClean="0"/>
-              <a:t>06.11.2023</a:t>
+              <a:t>07.11.2023</a:t>
             </a:fld>
             <a:endParaRPr lang="ru-RU"/>
           </a:p>
@@ -726,7 +731,7 @@
           <a:p>
             <a:fld id="{9FDA9E9B-36F1-4FB7-8743-C1EA76B05336}" type="datetimeFigureOut">
               <a:rPr lang="ru-RU" smtClean="0"/>
-              <a:t>06.11.2023</a:t>
+              <a:t>07.11.2023</a:t>
             </a:fld>
             <a:endParaRPr lang="ru-RU"/>
           </a:p>
@@ -926,7 +931,7 @@
           <a:p>
             <a:fld id="{9FDA9E9B-36F1-4FB7-8743-C1EA76B05336}" type="datetimeFigureOut">
               <a:rPr lang="ru-RU" smtClean="0"/>
-              <a:t>06.11.2023</a:t>
+              <a:t>07.11.2023</a:t>
             </a:fld>
             <a:endParaRPr lang="ru-RU"/>
           </a:p>
@@ -1136,7 +1141,7 @@
           <a:p>
             <a:fld id="{9FDA9E9B-36F1-4FB7-8743-C1EA76B05336}" type="datetimeFigureOut">
               <a:rPr lang="ru-RU" smtClean="0"/>
-              <a:t>06.11.2023</a:t>
+              <a:t>07.11.2023</a:t>
             </a:fld>
             <a:endParaRPr lang="ru-RU"/>
           </a:p>
@@ -1336,7 +1341,7 @@
           <a:p>
             <a:fld id="{9FDA9E9B-36F1-4FB7-8743-C1EA76B05336}" type="datetimeFigureOut">
               <a:rPr lang="ru-RU" smtClean="0"/>
-              <a:t>06.11.2023</a:t>
+              <a:t>07.11.2023</a:t>
             </a:fld>
             <a:endParaRPr lang="ru-RU"/>
           </a:p>
@@ -1612,7 +1617,7 @@
           <a:p>
             <a:fld id="{9FDA9E9B-36F1-4FB7-8743-C1EA76B05336}" type="datetimeFigureOut">
               <a:rPr lang="ru-RU" smtClean="0"/>
-              <a:t>06.11.2023</a:t>
+              <a:t>07.11.2023</a:t>
             </a:fld>
             <a:endParaRPr lang="ru-RU"/>
           </a:p>
@@ -1880,7 +1885,7 @@
           <a:p>
             <a:fld id="{9FDA9E9B-36F1-4FB7-8743-C1EA76B05336}" type="datetimeFigureOut">
               <a:rPr lang="ru-RU" smtClean="0"/>
-              <a:t>06.11.2023</a:t>
+              <a:t>07.11.2023</a:t>
             </a:fld>
             <a:endParaRPr lang="ru-RU"/>
           </a:p>
@@ -2295,7 +2300,7 @@
           <a:p>
             <a:fld id="{9FDA9E9B-36F1-4FB7-8743-C1EA76B05336}" type="datetimeFigureOut">
               <a:rPr lang="ru-RU" smtClean="0"/>
-              <a:t>06.11.2023</a:t>
+              <a:t>07.11.2023</a:t>
             </a:fld>
             <a:endParaRPr lang="ru-RU"/>
           </a:p>
@@ -2437,7 +2442,7 @@
           <a:p>
             <a:fld id="{9FDA9E9B-36F1-4FB7-8743-C1EA76B05336}" type="datetimeFigureOut">
               <a:rPr lang="ru-RU" smtClean="0"/>
-              <a:t>06.11.2023</a:t>
+              <a:t>07.11.2023</a:t>
             </a:fld>
             <a:endParaRPr lang="ru-RU"/>
           </a:p>
@@ -2550,7 +2555,7 @@
           <a:p>
             <a:fld id="{9FDA9E9B-36F1-4FB7-8743-C1EA76B05336}" type="datetimeFigureOut">
               <a:rPr lang="ru-RU" smtClean="0"/>
-              <a:t>06.11.2023</a:t>
+              <a:t>07.11.2023</a:t>
             </a:fld>
             <a:endParaRPr lang="ru-RU"/>
           </a:p>
@@ -2863,7 +2868,7 @@
           <a:p>
             <a:fld id="{9FDA9E9B-36F1-4FB7-8743-C1EA76B05336}" type="datetimeFigureOut">
               <a:rPr lang="ru-RU" smtClean="0"/>
-              <a:t>06.11.2023</a:t>
+              <a:t>07.11.2023</a:t>
             </a:fld>
             <a:endParaRPr lang="ru-RU"/>
           </a:p>
@@ -3152,7 +3157,7 @@
           <a:p>
             <a:fld id="{9FDA9E9B-36F1-4FB7-8743-C1EA76B05336}" type="datetimeFigureOut">
               <a:rPr lang="ru-RU" smtClean="0"/>
-              <a:t>06.11.2023</a:t>
+              <a:t>07.11.2023</a:t>
             </a:fld>
             <a:endParaRPr lang="ru-RU"/>
           </a:p>
@@ -3395,7 +3400,7 @@
           <a:p>
             <a:fld id="{9FDA9E9B-36F1-4FB7-8743-C1EA76B05336}" type="datetimeFigureOut">
               <a:rPr lang="ru-RU" smtClean="0"/>
-              <a:t>06.11.2023</a:t>
+              <a:t>07.11.2023</a:t>
             </a:fld>
             <a:endParaRPr lang="ru-RU"/>
           </a:p>
@@ -6355,10 +6360,10 @@
           <a:lstStyle/>
           <a:p>
             <a:r>
-              <a:rPr lang="en-US"/>
-              <a:t>Sample5_device</a:t>
-            </a:r>
-            <a:endParaRPr lang="ru-RU"/>
+              <a:rPr lang="en-US" dirty="0"/>
+              <a:t>Sample5_device4</a:t>
+            </a:r>
+            <a:endParaRPr lang="ru-RU" dirty="0"/>
           </a:p>
         </p:txBody>
       </p:sp>
@@ -6394,18 +6399,18 @@
       </p:grpSpPr>
       <p:sp>
         <p:nvSpPr>
-          <p:cNvPr id="2" name="Title 1">
-            <a:extLst>
-              <a:ext uri="{FF2B5EF4-FFF2-40B4-BE49-F238E27FC236}">
-                <a16:creationId xmlns:a16="http://schemas.microsoft.com/office/drawing/2014/main" id="{F41E8349-77E2-271B-99C4-5032417D57A8}"/>
-              </a:ext>
-            </a:extLst>
-          </p:cNvPr>
-          <p:cNvSpPr>
-            <a:spLocks noGrp="1"/>
-          </p:cNvSpPr>
-          <p:nvPr>
-            <p:ph type="title"/>
+          <p:cNvPr id="3" name="Title 2">
+            <a:extLst>
+              <a:ext uri="{FF2B5EF4-FFF2-40B4-BE49-F238E27FC236}">
+                <a16:creationId xmlns:a16="http://schemas.microsoft.com/office/drawing/2014/main" id="{3B005E3F-BC9B-01C0-DEAC-932DA1DE30F4}"/>
+              </a:ext>
+            </a:extLst>
+          </p:cNvPr>
+          <p:cNvSpPr>
+            <a:spLocks noGrp="1"/>
+          </p:cNvSpPr>
+          <p:nvPr>
+            <p:ph type="ctrTitle"/>
           </p:nvPr>
         </p:nvSpPr>
         <p:spPr/>
@@ -6413,7 +6418,96 @@
           <a:bodyPr/>
           <a:lstStyle/>
           <a:p>
-            <a:endParaRPr lang="ru-RU"/>
+            <a:r>
+              <a:rPr lang="en-US" dirty="0"/>
+              <a:t>Sample 6</a:t>
+            </a:r>
+            <a:endParaRPr lang="ru-RU" dirty="0"/>
+          </a:p>
+        </p:txBody>
+      </p:sp>
+      <p:sp>
+        <p:nvSpPr>
+          <p:cNvPr id="4" name="Subtitle 3">
+            <a:extLst>
+              <a:ext uri="{FF2B5EF4-FFF2-40B4-BE49-F238E27FC236}">
+                <a16:creationId xmlns:a16="http://schemas.microsoft.com/office/drawing/2014/main" id="{D4FAE6EA-91D9-D225-845B-0DA3DAF269FC}"/>
+              </a:ext>
+            </a:extLst>
+          </p:cNvPr>
+          <p:cNvSpPr>
+            <a:spLocks noGrp="1"/>
+          </p:cNvSpPr>
+          <p:nvPr>
+            <p:ph type="subTitle" idx="1"/>
+          </p:nvPr>
+        </p:nvSpPr>
+        <p:spPr/>
+        <p:txBody>
+          <a:bodyPr/>
+          <a:lstStyle/>
+          <a:p>
+            <a:pPr marL="342900" indent="-342900">
+              <a:buFont typeface="Arial" panose="020B0604020202020204" pitchFamily="34" charset="0"/>
+              <a:buChar char="•"/>
+            </a:pPr>
+            <a:r>
+              <a:rPr lang="en-US" dirty="0"/>
+              <a:t>Sample6_device1 </a:t>
+            </a:r>
+            <a:r>
+              <a:rPr lang="en-US" dirty="0" err="1"/>
+              <a:t>th</a:t>
+            </a:r>
+            <a:r>
+              <a:rPr lang="en-US" dirty="0"/>
+              <a:t>=8.3±0.9 nm</a:t>
+            </a:r>
+          </a:p>
+          <a:p>
+            <a:pPr marL="342900" indent="-342900">
+              <a:buFont typeface="Arial" panose="020B0604020202020204" pitchFamily="34" charset="0"/>
+              <a:buChar char="•"/>
+            </a:pPr>
+            <a:r>
+              <a:rPr lang="en-US" dirty="0"/>
+              <a:t>Sample6_device3 </a:t>
+            </a:r>
+            <a:r>
+              <a:rPr lang="en-US" dirty="0" err="1"/>
+              <a:t>th</a:t>
+            </a:r>
+            <a:r>
+              <a:rPr lang="en-US" dirty="0"/>
+              <a:t>=10.8±0.6 nm</a:t>
+            </a:r>
+            <a:endParaRPr lang="ru-RU" dirty="0"/>
+          </a:p>
+          <a:p>
+            <a:pPr marL="342900" indent="-342900">
+              <a:buFont typeface="Arial" panose="020B0604020202020204" pitchFamily="34" charset="0"/>
+              <a:buChar char="•"/>
+            </a:pPr>
+            <a:r>
+              <a:rPr lang="en-US" dirty="0"/>
+              <a:t>Sample6_device5 </a:t>
+            </a:r>
+            <a:r>
+              <a:rPr lang="en-US" dirty="0" err="1"/>
+              <a:t>th</a:t>
+            </a:r>
+            <a:r>
+              <a:rPr lang="en-US" dirty="0"/>
+              <a:t>=6.3±0.6 nm</a:t>
+            </a:r>
+            <a:endParaRPr lang="ru-RU" dirty="0"/>
+          </a:p>
+          <a:p>
+            <a:pPr marL="342900" indent="-342900">
+              <a:buFont typeface="Arial" panose="020B0604020202020204" pitchFamily="34" charset="0"/>
+              <a:buChar char="•"/>
+            </a:pPr>
+            <a:endParaRPr lang="ru-RU" dirty="0"/>
           </a:p>
         </p:txBody>
       </p:sp>
@@ -6449,10 +6543,10 @@
       </p:grpSpPr>
       <p:sp>
         <p:nvSpPr>
-          <p:cNvPr id="2" name="Title 1">
-            <a:extLst>
-              <a:ext uri="{FF2B5EF4-FFF2-40B4-BE49-F238E27FC236}">
-                <a16:creationId xmlns:a16="http://schemas.microsoft.com/office/drawing/2014/main" id="{FA1B8890-F529-3114-05D1-18028E7FB2AC}"/>
+          <p:cNvPr id="4" name="Title 3">
+            <a:extLst>
+              <a:ext uri="{FF2B5EF4-FFF2-40B4-BE49-F238E27FC236}">
+                <a16:creationId xmlns:a16="http://schemas.microsoft.com/office/drawing/2014/main" id="{860B2D80-FA22-691A-F733-6B9AF149ABAA}"/>
               </a:ext>
             </a:extLst>
           </p:cNvPr>
@@ -6468,14 +6562,144 @@
           <a:bodyPr/>
           <a:lstStyle/>
           <a:p>
-            <a:endParaRPr lang="ru-RU"/>
-          </a:p>
-        </p:txBody>
-      </p:sp>
+            <a:r>
+              <a:rPr lang="en-US" dirty="0"/>
+              <a:t>Sample6_device1</a:t>
+            </a:r>
+            <a:endParaRPr lang="ru-RU" dirty="0"/>
+          </a:p>
+        </p:txBody>
+      </p:sp>
+      <p:graphicFrame>
+        <p:nvGraphicFramePr>
+          <p:cNvPr id="5" name="Object 4">
+            <a:extLst>
+              <a:ext uri="{FF2B5EF4-FFF2-40B4-BE49-F238E27FC236}">
+                <a16:creationId xmlns:a16="http://schemas.microsoft.com/office/drawing/2014/main" id="{888BA3FA-E26A-4CEB-51B0-BC3C22783002}"/>
+              </a:ext>
+            </a:extLst>
+          </p:cNvPr>
+          <p:cNvGraphicFramePr>
+            <a:graphicFrameLocks noChangeAspect="1"/>
+          </p:cNvGraphicFramePr>
+          <p:nvPr>
+            <p:extLst>
+              <p:ext uri="{D42A27DB-BD31-4B8C-83A1-F6EECF244321}">
+                <p14:modId xmlns:p14="http://schemas.microsoft.com/office/powerpoint/2010/main" val="1140740095"/>
+              </p:ext>
+            </p:extLst>
+          </p:nvPr>
+        </p:nvGraphicFramePr>
+        <p:xfrm>
+          <a:off x="-348071" y="1690688"/>
+          <a:ext cx="6586664" cy="5040000"/>
+        </p:xfrm>
+        <a:graphic>
+          <a:graphicData uri="http://schemas.openxmlformats.org/presentationml/2006/ole">
+            <mc:AlternateContent xmlns:mc="http://schemas.openxmlformats.org/markup-compatibility/2006">
+              <mc:Choice xmlns:v="urn:schemas-microsoft-com:vml" Requires="v">
+                <p:oleObj name="Graph" r:id="rId2" imgW="3920760" imgH="3000960" progId="Origin95.Graph">
+                  <p:embed/>
+                </p:oleObj>
+              </mc:Choice>
+              <mc:Fallback>
+                <p:oleObj name="Graph" r:id="rId2" imgW="3920760" imgH="3000960" progId="Origin95.Graph">
+                  <p:embed/>
+                  <p:pic>
+                    <p:nvPicPr>
+                      <p:cNvPr id="0" name=""/>
+                      <p:cNvPicPr/>
+                      <p:nvPr/>
+                    </p:nvPicPr>
+                    <p:blipFill>
+                      <a:blip r:embed="rId3"/>
+                      <a:stretch>
+                        <a:fillRect/>
+                      </a:stretch>
+                    </p:blipFill>
+                    <p:spPr>
+                      <a:xfrm>
+                        <a:off x="-348071" y="1690688"/>
+                        <a:ext cx="6586664" cy="5040000"/>
+                      </a:xfrm>
+                      <a:prstGeom prst="rect">
+                        <a:avLst/>
+                      </a:prstGeom>
+                    </p:spPr>
+                  </p:pic>
+                </p:oleObj>
+              </mc:Fallback>
+            </mc:AlternateContent>
+          </a:graphicData>
+        </a:graphic>
+      </p:graphicFrame>
+      <p:graphicFrame>
+        <p:nvGraphicFramePr>
+          <p:cNvPr id="6" name="Object 5">
+            <a:extLst>
+              <a:ext uri="{FF2B5EF4-FFF2-40B4-BE49-F238E27FC236}">
+                <a16:creationId xmlns:a16="http://schemas.microsoft.com/office/drawing/2014/main" id="{137F4049-BD78-4FA9-25C7-77A49FC94B68}"/>
+              </a:ext>
+            </a:extLst>
+          </p:cNvPr>
+          <p:cNvGraphicFramePr>
+            <a:graphicFrameLocks noChangeAspect="1"/>
+          </p:cNvGraphicFramePr>
+          <p:nvPr>
+            <p:extLst>
+              <p:ext uri="{D42A27DB-BD31-4B8C-83A1-F6EECF244321}">
+                <p14:modId xmlns:p14="http://schemas.microsoft.com/office/powerpoint/2010/main" val="3551569255"/>
+              </p:ext>
+            </p:extLst>
+          </p:nvPr>
+        </p:nvGraphicFramePr>
+        <p:xfrm>
+          <a:off x="6096000" y="1690688"/>
+          <a:ext cx="6586667" cy="5040000"/>
+        </p:xfrm>
+        <a:graphic>
+          <a:graphicData uri="http://schemas.openxmlformats.org/presentationml/2006/ole">
+            <mc:AlternateContent xmlns:mc="http://schemas.openxmlformats.org/markup-compatibility/2006">
+              <mc:Choice xmlns:v="urn:schemas-microsoft-com:vml" Requires="v">
+                <p:oleObj name="Graph" r:id="rId4" imgW="3920760" imgH="3000960" progId="Origin95.Graph">
+                  <p:embed/>
+                </p:oleObj>
+              </mc:Choice>
+              <mc:Fallback>
+                <p:oleObj name="Graph" r:id="rId4" imgW="3920760" imgH="3000960" progId="Origin95.Graph">
+                  <p:embed/>
+                  <p:pic>
+                    <p:nvPicPr>
+                      <p:cNvPr id="0" name=""/>
+                      <p:cNvPicPr/>
+                      <p:nvPr/>
+                    </p:nvPicPr>
+                    <p:blipFill>
+                      <a:blip r:embed="rId5"/>
+                      <a:stretch>
+                        <a:fillRect/>
+                      </a:stretch>
+                    </p:blipFill>
+                    <p:spPr>
+                      <a:xfrm>
+                        <a:off x="6096000" y="1690688"/>
+                        <a:ext cx="6586667" cy="5040000"/>
+                      </a:xfrm>
+                      <a:prstGeom prst="rect">
+                        <a:avLst/>
+                      </a:prstGeom>
+                    </p:spPr>
+                  </p:pic>
+                </p:oleObj>
+              </mc:Fallback>
+            </mc:AlternateContent>
+          </a:graphicData>
+        </a:graphic>
+      </p:graphicFrame>
     </p:spTree>
     <p:extLst>
       <p:ext uri="{BB962C8B-B14F-4D97-AF65-F5344CB8AC3E}">
-        <p14:creationId xmlns:p14="http://schemas.microsoft.com/office/powerpoint/2010/main" val="3577981357"/>
+        <p14:creationId xmlns:p14="http://schemas.microsoft.com/office/powerpoint/2010/main" val="741125486"/>
       </p:ext>
     </p:extLst>
   </p:cSld>
@@ -6507,7 +6731,7 @@
           <p:cNvPr id="2" name="Title 1">
             <a:extLst>
               <a:ext uri="{FF2B5EF4-FFF2-40B4-BE49-F238E27FC236}">
-                <a16:creationId xmlns:a16="http://schemas.microsoft.com/office/drawing/2014/main" id="{45CF80B4-2E12-4934-22AB-A9984C883342}"/>
+                <a16:creationId xmlns:a16="http://schemas.microsoft.com/office/drawing/2014/main" id="{FA1B8890-F529-3114-05D1-18028E7FB2AC}"/>
               </a:ext>
             </a:extLst>
           </p:cNvPr>
@@ -6523,14 +6747,144 @@
           <a:bodyPr/>
           <a:lstStyle/>
           <a:p>
-            <a:endParaRPr lang="ru-RU"/>
-          </a:p>
-        </p:txBody>
-      </p:sp>
+            <a:r>
+              <a:rPr lang="en-US" dirty="0"/>
+              <a:t>Sample6_device1</a:t>
+            </a:r>
+            <a:endParaRPr lang="ru-RU" dirty="0"/>
+          </a:p>
+        </p:txBody>
+      </p:sp>
+      <p:graphicFrame>
+        <p:nvGraphicFramePr>
+          <p:cNvPr id="3" name="Object 2">
+            <a:extLst>
+              <a:ext uri="{FF2B5EF4-FFF2-40B4-BE49-F238E27FC236}">
+                <a16:creationId xmlns:a16="http://schemas.microsoft.com/office/drawing/2014/main" id="{FA8EC3EE-7501-A75A-1B12-8A1A08AD1704}"/>
+              </a:ext>
+            </a:extLst>
+          </p:cNvPr>
+          <p:cNvGraphicFramePr>
+            <a:graphicFrameLocks noChangeAspect="1"/>
+          </p:cNvGraphicFramePr>
+          <p:nvPr>
+            <p:extLst>
+              <p:ext uri="{D42A27DB-BD31-4B8C-83A1-F6EECF244321}">
+                <p14:modId xmlns:p14="http://schemas.microsoft.com/office/powerpoint/2010/main" val="668070532"/>
+              </p:ext>
+            </p:extLst>
+          </p:nvPr>
+        </p:nvGraphicFramePr>
+        <p:xfrm>
+          <a:off x="6096000" y="1690688"/>
+          <a:ext cx="6586667" cy="5040000"/>
+        </p:xfrm>
+        <a:graphic>
+          <a:graphicData uri="http://schemas.openxmlformats.org/presentationml/2006/ole">
+            <mc:AlternateContent xmlns:mc="http://schemas.openxmlformats.org/markup-compatibility/2006">
+              <mc:Choice xmlns:v="urn:schemas-microsoft-com:vml" Requires="v">
+                <p:oleObj name="Graph" r:id="rId2" imgW="3920760" imgH="3000960" progId="Origin95.Graph">
+                  <p:embed/>
+                </p:oleObj>
+              </mc:Choice>
+              <mc:Fallback>
+                <p:oleObj name="Graph" r:id="rId2" imgW="3920760" imgH="3000960" progId="Origin95.Graph">
+                  <p:embed/>
+                  <p:pic>
+                    <p:nvPicPr>
+                      <p:cNvPr id="0" name=""/>
+                      <p:cNvPicPr/>
+                      <p:nvPr/>
+                    </p:nvPicPr>
+                    <p:blipFill>
+                      <a:blip r:embed="rId3"/>
+                      <a:stretch>
+                        <a:fillRect/>
+                      </a:stretch>
+                    </p:blipFill>
+                    <p:spPr>
+                      <a:xfrm>
+                        <a:off x="6096000" y="1690688"/>
+                        <a:ext cx="6586667" cy="5040000"/>
+                      </a:xfrm>
+                      <a:prstGeom prst="rect">
+                        <a:avLst/>
+                      </a:prstGeom>
+                    </p:spPr>
+                  </p:pic>
+                </p:oleObj>
+              </mc:Fallback>
+            </mc:AlternateContent>
+          </a:graphicData>
+        </a:graphic>
+      </p:graphicFrame>
+      <p:graphicFrame>
+        <p:nvGraphicFramePr>
+          <p:cNvPr id="4" name="Object 3">
+            <a:extLst>
+              <a:ext uri="{FF2B5EF4-FFF2-40B4-BE49-F238E27FC236}">
+                <a16:creationId xmlns:a16="http://schemas.microsoft.com/office/drawing/2014/main" id="{D1ED43C7-43CF-323D-F554-AB6B47BE4D1A}"/>
+              </a:ext>
+            </a:extLst>
+          </p:cNvPr>
+          <p:cNvGraphicFramePr>
+            <a:graphicFrameLocks noChangeAspect="1"/>
+          </p:cNvGraphicFramePr>
+          <p:nvPr>
+            <p:extLst>
+              <p:ext uri="{D42A27DB-BD31-4B8C-83A1-F6EECF244321}">
+                <p14:modId xmlns:p14="http://schemas.microsoft.com/office/powerpoint/2010/main" val="2484179284"/>
+              </p:ext>
+            </p:extLst>
+          </p:nvPr>
+        </p:nvGraphicFramePr>
+        <p:xfrm>
+          <a:off x="-377569" y="1690688"/>
+          <a:ext cx="6586667" cy="5040000"/>
+        </p:xfrm>
+        <a:graphic>
+          <a:graphicData uri="http://schemas.openxmlformats.org/presentationml/2006/ole">
+            <mc:AlternateContent xmlns:mc="http://schemas.openxmlformats.org/markup-compatibility/2006">
+              <mc:Choice xmlns:v="urn:schemas-microsoft-com:vml" Requires="v">
+                <p:oleObj name="Graph" r:id="rId4" imgW="3920760" imgH="3000960" progId="Origin95.Graph">
+                  <p:embed/>
+                </p:oleObj>
+              </mc:Choice>
+              <mc:Fallback>
+                <p:oleObj name="Graph" r:id="rId4" imgW="3920760" imgH="3000960" progId="Origin95.Graph">
+                  <p:embed/>
+                  <p:pic>
+                    <p:nvPicPr>
+                      <p:cNvPr id="0" name=""/>
+                      <p:cNvPicPr/>
+                      <p:nvPr/>
+                    </p:nvPicPr>
+                    <p:blipFill>
+                      <a:blip r:embed="rId5"/>
+                      <a:stretch>
+                        <a:fillRect/>
+                      </a:stretch>
+                    </p:blipFill>
+                    <p:spPr>
+                      <a:xfrm>
+                        <a:off x="-377569" y="1690688"/>
+                        <a:ext cx="6586667" cy="5040000"/>
+                      </a:xfrm>
+                      <a:prstGeom prst="rect">
+                        <a:avLst/>
+                      </a:prstGeom>
+                    </p:spPr>
+                  </p:pic>
+                </p:oleObj>
+              </mc:Fallback>
+            </mc:AlternateContent>
+          </a:graphicData>
+        </a:graphic>
+      </p:graphicFrame>
     </p:spTree>
     <p:extLst>
       <p:ext uri="{BB962C8B-B14F-4D97-AF65-F5344CB8AC3E}">
-        <p14:creationId xmlns:p14="http://schemas.microsoft.com/office/powerpoint/2010/main" val="357159881"/>
+        <p14:creationId xmlns:p14="http://schemas.microsoft.com/office/powerpoint/2010/main" val="3577981357"/>
       </p:ext>
     </p:extLst>
   </p:cSld>
@@ -6562,7 +6916,7 @@
           <p:cNvPr id="2" name="Title 1">
             <a:extLst>
               <a:ext uri="{FF2B5EF4-FFF2-40B4-BE49-F238E27FC236}">
-                <a16:creationId xmlns:a16="http://schemas.microsoft.com/office/drawing/2014/main" id="{3D3211C0-7D4C-00D9-B483-0A0A08D920BB}"/>
+                <a16:creationId xmlns:a16="http://schemas.microsoft.com/office/drawing/2014/main" id="{45CF80B4-2E12-4934-22AB-A9984C883342}"/>
               </a:ext>
             </a:extLst>
           </p:cNvPr>
@@ -6578,14 +6932,144 @@
           <a:bodyPr/>
           <a:lstStyle/>
           <a:p>
-            <a:endParaRPr lang="ru-RU"/>
-          </a:p>
-        </p:txBody>
-      </p:sp>
+            <a:r>
+              <a:rPr lang="en-US" dirty="0"/>
+              <a:t>Sample6_device3</a:t>
+            </a:r>
+            <a:endParaRPr lang="ru-RU" dirty="0"/>
+          </a:p>
+        </p:txBody>
+      </p:sp>
+      <p:graphicFrame>
+        <p:nvGraphicFramePr>
+          <p:cNvPr id="3" name="Object 2">
+            <a:extLst>
+              <a:ext uri="{FF2B5EF4-FFF2-40B4-BE49-F238E27FC236}">
+                <a16:creationId xmlns:a16="http://schemas.microsoft.com/office/drawing/2014/main" id="{41852AE5-82EF-D2A7-A926-6AC7D99D1F7F}"/>
+              </a:ext>
+            </a:extLst>
+          </p:cNvPr>
+          <p:cNvGraphicFramePr>
+            <a:graphicFrameLocks noChangeAspect="1"/>
+          </p:cNvGraphicFramePr>
+          <p:nvPr>
+            <p:extLst>
+              <p:ext uri="{D42A27DB-BD31-4B8C-83A1-F6EECF244321}">
+                <p14:modId xmlns:p14="http://schemas.microsoft.com/office/powerpoint/2010/main" val="2376843056"/>
+              </p:ext>
+            </p:extLst>
+          </p:nvPr>
+        </p:nvGraphicFramePr>
+        <p:xfrm>
+          <a:off x="-259581" y="1690688"/>
+          <a:ext cx="6586667" cy="5040000"/>
+        </p:xfrm>
+        <a:graphic>
+          <a:graphicData uri="http://schemas.openxmlformats.org/presentationml/2006/ole">
+            <mc:AlternateContent xmlns:mc="http://schemas.openxmlformats.org/markup-compatibility/2006">
+              <mc:Choice xmlns:v="urn:schemas-microsoft-com:vml" Requires="v">
+                <p:oleObj name="Graph" r:id="rId2" imgW="3920760" imgH="3000960" progId="Origin95.Graph">
+                  <p:embed/>
+                </p:oleObj>
+              </mc:Choice>
+              <mc:Fallback>
+                <p:oleObj name="Graph" r:id="rId2" imgW="3920760" imgH="3000960" progId="Origin95.Graph">
+                  <p:embed/>
+                  <p:pic>
+                    <p:nvPicPr>
+                      <p:cNvPr id="0" name=""/>
+                      <p:cNvPicPr/>
+                      <p:nvPr/>
+                    </p:nvPicPr>
+                    <p:blipFill>
+                      <a:blip r:embed="rId3"/>
+                      <a:stretch>
+                        <a:fillRect/>
+                      </a:stretch>
+                    </p:blipFill>
+                    <p:spPr>
+                      <a:xfrm>
+                        <a:off x="-259581" y="1690688"/>
+                        <a:ext cx="6586667" cy="5040000"/>
+                      </a:xfrm>
+                      <a:prstGeom prst="rect">
+                        <a:avLst/>
+                      </a:prstGeom>
+                    </p:spPr>
+                  </p:pic>
+                </p:oleObj>
+              </mc:Fallback>
+            </mc:AlternateContent>
+          </a:graphicData>
+        </a:graphic>
+      </p:graphicFrame>
+      <p:graphicFrame>
+        <p:nvGraphicFramePr>
+          <p:cNvPr id="5" name="Object 4">
+            <a:extLst>
+              <a:ext uri="{FF2B5EF4-FFF2-40B4-BE49-F238E27FC236}">
+                <a16:creationId xmlns:a16="http://schemas.microsoft.com/office/drawing/2014/main" id="{680F9FAD-C2B6-0FCF-E9C0-E35255BEB919}"/>
+              </a:ext>
+            </a:extLst>
+          </p:cNvPr>
+          <p:cNvGraphicFramePr>
+            <a:graphicFrameLocks noChangeAspect="1"/>
+          </p:cNvGraphicFramePr>
+          <p:nvPr>
+            <p:extLst>
+              <p:ext uri="{D42A27DB-BD31-4B8C-83A1-F6EECF244321}">
+                <p14:modId xmlns:p14="http://schemas.microsoft.com/office/powerpoint/2010/main" val="1668905221"/>
+              </p:ext>
+            </p:extLst>
+          </p:nvPr>
+        </p:nvGraphicFramePr>
+        <p:xfrm>
+          <a:off x="6096000" y="1690688"/>
+          <a:ext cx="6586667" cy="5040000"/>
+        </p:xfrm>
+        <a:graphic>
+          <a:graphicData uri="http://schemas.openxmlformats.org/presentationml/2006/ole">
+            <mc:AlternateContent xmlns:mc="http://schemas.openxmlformats.org/markup-compatibility/2006">
+              <mc:Choice xmlns:v="urn:schemas-microsoft-com:vml" Requires="v">
+                <p:oleObj name="Graph" r:id="rId4" imgW="3920760" imgH="3000960" progId="Origin95.Graph">
+                  <p:embed/>
+                </p:oleObj>
+              </mc:Choice>
+              <mc:Fallback>
+                <p:oleObj name="Graph" r:id="rId4" imgW="3920760" imgH="3000960" progId="Origin95.Graph">
+                  <p:embed/>
+                  <p:pic>
+                    <p:nvPicPr>
+                      <p:cNvPr id="0" name=""/>
+                      <p:cNvPicPr/>
+                      <p:nvPr/>
+                    </p:nvPicPr>
+                    <p:blipFill>
+                      <a:blip r:embed="rId5"/>
+                      <a:stretch>
+                        <a:fillRect/>
+                      </a:stretch>
+                    </p:blipFill>
+                    <p:spPr>
+                      <a:xfrm>
+                        <a:off x="6096000" y="1690688"/>
+                        <a:ext cx="6586667" cy="5040000"/>
+                      </a:xfrm>
+                      <a:prstGeom prst="rect">
+                        <a:avLst/>
+                      </a:prstGeom>
+                    </p:spPr>
+                  </p:pic>
+                </p:oleObj>
+              </mc:Fallback>
+            </mc:AlternateContent>
+          </a:graphicData>
+        </a:graphic>
+      </p:graphicFrame>
     </p:spTree>
     <p:extLst>
       <p:ext uri="{BB962C8B-B14F-4D97-AF65-F5344CB8AC3E}">
-        <p14:creationId xmlns:p14="http://schemas.microsoft.com/office/powerpoint/2010/main" val="1715262485"/>
+        <p14:creationId xmlns:p14="http://schemas.microsoft.com/office/powerpoint/2010/main" val="357159881"/>
       </p:ext>
     </p:extLst>
   </p:cSld>
@@ -6617,7 +7101,7 @@
           <p:cNvPr id="2" name="Title 1">
             <a:extLst>
               <a:ext uri="{FF2B5EF4-FFF2-40B4-BE49-F238E27FC236}">
-                <a16:creationId xmlns:a16="http://schemas.microsoft.com/office/drawing/2014/main" id="{9F676DFD-020C-4B96-DADB-1F93D6DEDAD7}"/>
+                <a16:creationId xmlns:a16="http://schemas.microsoft.com/office/drawing/2014/main" id="{3D3211C0-7D4C-00D9-B483-0A0A08D920BB}"/>
               </a:ext>
             </a:extLst>
           </p:cNvPr>
@@ -6633,14 +7117,81 @@
           <a:bodyPr/>
           <a:lstStyle/>
           <a:p>
-            <a:endParaRPr lang="ru-RU"/>
-          </a:p>
-        </p:txBody>
-      </p:sp>
+            <a:r>
+              <a:rPr lang="en-US" dirty="0"/>
+              <a:t>Sample6_device3</a:t>
+            </a:r>
+            <a:endParaRPr lang="ru-RU" dirty="0"/>
+          </a:p>
+        </p:txBody>
+      </p:sp>
+      <p:graphicFrame>
+        <p:nvGraphicFramePr>
+          <p:cNvPr id="4" name="Object 3">
+            <a:extLst>
+              <a:ext uri="{FF2B5EF4-FFF2-40B4-BE49-F238E27FC236}">
+                <a16:creationId xmlns:a16="http://schemas.microsoft.com/office/drawing/2014/main" id="{A197F3A0-82C5-3CA7-2A29-00984DDD7639}"/>
+              </a:ext>
+            </a:extLst>
+          </p:cNvPr>
+          <p:cNvGraphicFramePr>
+            <a:graphicFrameLocks noChangeAspect="1"/>
+          </p:cNvGraphicFramePr>
+          <p:nvPr>
+            <p:extLst>
+              <p:ext uri="{D42A27DB-BD31-4B8C-83A1-F6EECF244321}">
+                <p14:modId xmlns:p14="http://schemas.microsoft.com/office/powerpoint/2010/main" val="2777183455"/>
+              </p:ext>
+            </p:extLst>
+          </p:nvPr>
+        </p:nvGraphicFramePr>
+        <p:xfrm>
+          <a:off x="6003566" y="1690688"/>
+          <a:ext cx="6586667" cy="5040000"/>
+        </p:xfrm>
+        <a:graphic>
+          <a:graphicData uri="http://schemas.openxmlformats.org/presentationml/2006/ole">
+            <mc:AlternateContent xmlns:mc="http://schemas.openxmlformats.org/markup-compatibility/2006">
+              <mc:Choice xmlns:v="urn:schemas-microsoft-com:vml" Requires="v">
+                <p:oleObj name="Graph" r:id="rId2" imgW="3920760" imgH="3000960" progId="Origin95.Graph">
+                  <p:embed/>
+                </p:oleObj>
+              </mc:Choice>
+              <mc:Fallback>
+                <p:oleObj name="Graph" r:id="rId2" imgW="3920760" imgH="3000960" progId="Origin95.Graph">
+                  <p:embed/>
+                  <p:pic>
+                    <p:nvPicPr>
+                      <p:cNvPr id="0" name=""/>
+                      <p:cNvPicPr/>
+                      <p:nvPr/>
+                    </p:nvPicPr>
+                    <p:blipFill>
+                      <a:blip r:embed="rId3"/>
+                      <a:stretch>
+                        <a:fillRect/>
+                      </a:stretch>
+                    </p:blipFill>
+                    <p:spPr>
+                      <a:xfrm>
+                        <a:off x="6003566" y="1690688"/>
+                        <a:ext cx="6586667" cy="5040000"/>
+                      </a:xfrm>
+                      <a:prstGeom prst="rect">
+                        <a:avLst/>
+                      </a:prstGeom>
+                    </p:spPr>
+                  </p:pic>
+                </p:oleObj>
+              </mc:Fallback>
+            </mc:AlternateContent>
+          </a:graphicData>
+        </a:graphic>
+      </p:graphicFrame>
     </p:spTree>
     <p:extLst>
       <p:ext uri="{BB962C8B-B14F-4D97-AF65-F5344CB8AC3E}">
-        <p14:creationId xmlns:p14="http://schemas.microsoft.com/office/powerpoint/2010/main" val="596332133"/>
+        <p14:creationId xmlns:p14="http://schemas.microsoft.com/office/powerpoint/2010/main" val="1715262485"/>
       </p:ext>
     </p:extLst>
   </p:cSld>
@@ -6725,6 +7276,882 @@
     <p:extLst>
       <p:ext uri="{BB962C8B-B14F-4D97-AF65-F5344CB8AC3E}">
         <p14:creationId xmlns:p14="http://schemas.microsoft.com/office/powerpoint/2010/main" val="1409427156"/>
+      </p:ext>
+    </p:extLst>
+  </p:cSld>
+  <p:clrMapOvr>
+    <a:masterClrMapping/>
+  </p:clrMapOvr>
+</p:sld>
+</file>
+
+<file path=ppt/slides/slide30.xml><?xml version="1.0" encoding="utf-8"?>
+<p:sld xmlns:a="http://schemas.openxmlformats.org/drawingml/2006/main" xmlns:r="http://schemas.openxmlformats.org/officeDocument/2006/relationships" xmlns:p="http://schemas.openxmlformats.org/presentationml/2006/main">
+  <p:cSld>
+    <p:spTree>
+      <p:nvGrpSpPr>
+        <p:cNvPr id="1" name=""/>
+        <p:cNvGrpSpPr/>
+        <p:nvPr/>
+      </p:nvGrpSpPr>
+      <p:grpSpPr>
+        <a:xfrm>
+          <a:off x="0" y="0"/>
+          <a:ext cx="0" cy="0"/>
+          <a:chOff x="0" y="0"/>
+          <a:chExt cx="0" cy="0"/>
+        </a:xfrm>
+      </p:grpSpPr>
+      <p:sp>
+        <p:nvSpPr>
+          <p:cNvPr id="2" name="Title 1">
+            <a:extLst>
+              <a:ext uri="{FF2B5EF4-FFF2-40B4-BE49-F238E27FC236}">
+                <a16:creationId xmlns:a16="http://schemas.microsoft.com/office/drawing/2014/main" id="{9F676DFD-020C-4B96-DADB-1F93D6DEDAD7}"/>
+              </a:ext>
+            </a:extLst>
+          </p:cNvPr>
+          <p:cNvSpPr>
+            <a:spLocks noGrp="1"/>
+          </p:cNvSpPr>
+          <p:nvPr>
+            <p:ph type="title"/>
+          </p:nvPr>
+        </p:nvSpPr>
+        <p:spPr/>
+        <p:txBody>
+          <a:bodyPr/>
+          <a:lstStyle/>
+          <a:p>
+            <a:r>
+              <a:rPr lang="en-US" dirty="0"/>
+              <a:t>Sample6_device5</a:t>
+            </a:r>
+            <a:endParaRPr lang="ru-RU" dirty="0"/>
+          </a:p>
+        </p:txBody>
+      </p:sp>
+      <p:graphicFrame>
+        <p:nvGraphicFramePr>
+          <p:cNvPr id="3" name="Object 2">
+            <a:extLst>
+              <a:ext uri="{FF2B5EF4-FFF2-40B4-BE49-F238E27FC236}">
+                <a16:creationId xmlns:a16="http://schemas.microsoft.com/office/drawing/2014/main" id="{4A26AA39-09E8-8969-6178-7C6999940549}"/>
+              </a:ext>
+            </a:extLst>
+          </p:cNvPr>
+          <p:cNvGraphicFramePr>
+            <a:graphicFrameLocks noChangeAspect="1"/>
+          </p:cNvGraphicFramePr>
+          <p:nvPr>
+            <p:extLst>
+              <p:ext uri="{D42A27DB-BD31-4B8C-83A1-F6EECF244321}">
+                <p14:modId xmlns:p14="http://schemas.microsoft.com/office/powerpoint/2010/main" val="324268049"/>
+              </p:ext>
+            </p:extLst>
+          </p:nvPr>
+        </p:nvGraphicFramePr>
+        <p:xfrm>
+          <a:off x="-255639" y="1690688"/>
+          <a:ext cx="6586667" cy="5040000"/>
+        </p:xfrm>
+        <a:graphic>
+          <a:graphicData uri="http://schemas.openxmlformats.org/presentationml/2006/ole">
+            <mc:AlternateContent xmlns:mc="http://schemas.openxmlformats.org/markup-compatibility/2006">
+              <mc:Choice xmlns:v="urn:schemas-microsoft-com:vml" Requires="v">
+                <p:oleObj name="Graph" r:id="rId2" imgW="3920760" imgH="3000960" progId="Origin95.Graph">
+                  <p:embed/>
+                </p:oleObj>
+              </mc:Choice>
+              <mc:Fallback>
+                <p:oleObj name="Graph" r:id="rId2" imgW="3920760" imgH="3000960" progId="Origin95.Graph">
+                  <p:embed/>
+                  <p:pic>
+                    <p:nvPicPr>
+                      <p:cNvPr id="0" name=""/>
+                      <p:cNvPicPr/>
+                      <p:nvPr/>
+                    </p:nvPicPr>
+                    <p:blipFill>
+                      <a:blip r:embed="rId3"/>
+                      <a:stretch>
+                        <a:fillRect/>
+                      </a:stretch>
+                    </p:blipFill>
+                    <p:spPr>
+                      <a:xfrm>
+                        <a:off x="-255639" y="1690688"/>
+                        <a:ext cx="6586667" cy="5040000"/>
+                      </a:xfrm>
+                      <a:prstGeom prst="rect">
+                        <a:avLst/>
+                      </a:prstGeom>
+                    </p:spPr>
+                  </p:pic>
+                </p:oleObj>
+              </mc:Fallback>
+            </mc:AlternateContent>
+          </a:graphicData>
+        </a:graphic>
+      </p:graphicFrame>
+      <p:graphicFrame>
+        <p:nvGraphicFramePr>
+          <p:cNvPr id="4" name="Object 3">
+            <a:extLst>
+              <a:ext uri="{FF2B5EF4-FFF2-40B4-BE49-F238E27FC236}">
+                <a16:creationId xmlns:a16="http://schemas.microsoft.com/office/drawing/2014/main" id="{9BF7C39D-EF21-2216-1D7B-0789E6D2B2EC}"/>
+              </a:ext>
+            </a:extLst>
+          </p:cNvPr>
+          <p:cNvGraphicFramePr>
+            <a:graphicFrameLocks noChangeAspect="1"/>
+          </p:cNvGraphicFramePr>
+          <p:nvPr>
+            <p:extLst>
+              <p:ext uri="{D42A27DB-BD31-4B8C-83A1-F6EECF244321}">
+                <p14:modId xmlns:p14="http://schemas.microsoft.com/office/powerpoint/2010/main" val="2159514777"/>
+              </p:ext>
+            </p:extLst>
+          </p:nvPr>
+        </p:nvGraphicFramePr>
+        <p:xfrm>
+          <a:off x="6096000" y="1690688"/>
+          <a:ext cx="6586667" cy="5040000"/>
+        </p:xfrm>
+        <a:graphic>
+          <a:graphicData uri="http://schemas.openxmlformats.org/presentationml/2006/ole">
+            <mc:AlternateContent xmlns:mc="http://schemas.openxmlformats.org/markup-compatibility/2006">
+              <mc:Choice xmlns:v="urn:schemas-microsoft-com:vml" Requires="v">
+                <p:oleObj name="Graph" r:id="rId4" imgW="3920760" imgH="3000960" progId="Origin95.Graph">
+                  <p:embed/>
+                </p:oleObj>
+              </mc:Choice>
+              <mc:Fallback>
+                <p:oleObj name="Graph" r:id="rId4" imgW="3920760" imgH="3000960" progId="Origin95.Graph">
+                  <p:embed/>
+                  <p:pic>
+                    <p:nvPicPr>
+                      <p:cNvPr id="0" name=""/>
+                      <p:cNvPicPr/>
+                      <p:nvPr/>
+                    </p:nvPicPr>
+                    <p:blipFill>
+                      <a:blip r:embed="rId5"/>
+                      <a:stretch>
+                        <a:fillRect/>
+                      </a:stretch>
+                    </p:blipFill>
+                    <p:spPr>
+                      <a:xfrm>
+                        <a:off x="6096000" y="1690688"/>
+                        <a:ext cx="6586667" cy="5040000"/>
+                      </a:xfrm>
+                      <a:prstGeom prst="rect">
+                        <a:avLst/>
+                      </a:prstGeom>
+                    </p:spPr>
+                  </p:pic>
+                </p:oleObj>
+              </mc:Fallback>
+            </mc:AlternateContent>
+          </a:graphicData>
+        </a:graphic>
+      </p:graphicFrame>
+    </p:spTree>
+    <p:extLst>
+      <p:ext uri="{BB962C8B-B14F-4D97-AF65-F5344CB8AC3E}">
+        <p14:creationId xmlns:p14="http://schemas.microsoft.com/office/powerpoint/2010/main" val="596332133"/>
+      </p:ext>
+    </p:extLst>
+  </p:cSld>
+  <p:clrMapOvr>
+    <a:masterClrMapping/>
+  </p:clrMapOvr>
+</p:sld>
+</file>
+
+<file path=ppt/slides/slide31.xml><?xml version="1.0" encoding="utf-8"?>
+<p:sld xmlns:a="http://schemas.openxmlformats.org/drawingml/2006/main" xmlns:r="http://schemas.openxmlformats.org/officeDocument/2006/relationships" xmlns:p="http://schemas.openxmlformats.org/presentationml/2006/main">
+  <p:cSld>
+    <p:spTree>
+      <p:nvGrpSpPr>
+        <p:cNvPr id="1" name=""/>
+        <p:cNvGrpSpPr/>
+        <p:nvPr/>
+      </p:nvGrpSpPr>
+      <p:grpSpPr>
+        <a:xfrm>
+          <a:off x="0" y="0"/>
+          <a:ext cx="0" cy="0"/>
+          <a:chOff x="0" y="0"/>
+          <a:chExt cx="0" cy="0"/>
+        </a:xfrm>
+      </p:grpSpPr>
+      <p:sp>
+        <p:nvSpPr>
+          <p:cNvPr id="2" name="Title 1">
+            <a:extLst>
+              <a:ext uri="{FF2B5EF4-FFF2-40B4-BE49-F238E27FC236}">
+                <a16:creationId xmlns:a16="http://schemas.microsoft.com/office/drawing/2014/main" id="{D42461EC-6254-BC55-47CD-B0D85D89F845}"/>
+              </a:ext>
+            </a:extLst>
+          </p:cNvPr>
+          <p:cNvSpPr>
+            <a:spLocks noGrp="1"/>
+          </p:cNvSpPr>
+          <p:nvPr>
+            <p:ph type="title"/>
+          </p:nvPr>
+        </p:nvSpPr>
+        <p:spPr/>
+        <p:txBody>
+          <a:bodyPr/>
+          <a:lstStyle/>
+          <a:p>
+            <a:r>
+              <a:rPr lang="en-US" dirty="0"/>
+              <a:t>Sample6_device5</a:t>
+            </a:r>
+            <a:endParaRPr lang="ru-RU" dirty="0"/>
+          </a:p>
+        </p:txBody>
+      </p:sp>
+      <p:graphicFrame>
+        <p:nvGraphicFramePr>
+          <p:cNvPr id="3" name="Object 2">
+            <a:extLst>
+              <a:ext uri="{FF2B5EF4-FFF2-40B4-BE49-F238E27FC236}">
+                <a16:creationId xmlns:a16="http://schemas.microsoft.com/office/drawing/2014/main" id="{F3284AD7-C96C-D850-FF42-611F8E03E710}"/>
+              </a:ext>
+            </a:extLst>
+          </p:cNvPr>
+          <p:cNvGraphicFramePr>
+            <a:graphicFrameLocks noChangeAspect="1"/>
+          </p:cNvGraphicFramePr>
+          <p:nvPr>
+            <p:extLst>
+              <p:ext uri="{D42A27DB-BD31-4B8C-83A1-F6EECF244321}">
+                <p14:modId xmlns:p14="http://schemas.microsoft.com/office/powerpoint/2010/main" val="3904460937"/>
+              </p:ext>
+            </p:extLst>
+          </p:nvPr>
+        </p:nvGraphicFramePr>
+        <p:xfrm>
+          <a:off x="6096000" y="1690688"/>
+          <a:ext cx="6586667" cy="5040000"/>
+        </p:xfrm>
+        <a:graphic>
+          <a:graphicData uri="http://schemas.openxmlformats.org/presentationml/2006/ole">
+            <mc:AlternateContent xmlns:mc="http://schemas.openxmlformats.org/markup-compatibility/2006">
+              <mc:Choice xmlns:v="urn:schemas-microsoft-com:vml" Requires="v">
+                <p:oleObj name="Graph" r:id="rId2" imgW="3920760" imgH="3000960" progId="Origin95.Graph">
+                  <p:embed/>
+                </p:oleObj>
+              </mc:Choice>
+              <mc:Fallback>
+                <p:oleObj name="Graph" r:id="rId2" imgW="3920760" imgH="3000960" progId="Origin95.Graph">
+                  <p:embed/>
+                  <p:pic>
+                    <p:nvPicPr>
+                      <p:cNvPr id="0" name=""/>
+                      <p:cNvPicPr/>
+                      <p:nvPr/>
+                    </p:nvPicPr>
+                    <p:blipFill>
+                      <a:blip r:embed="rId3"/>
+                      <a:stretch>
+                        <a:fillRect/>
+                      </a:stretch>
+                    </p:blipFill>
+                    <p:spPr>
+                      <a:xfrm>
+                        <a:off x="6096000" y="1690688"/>
+                        <a:ext cx="6586667" cy="5040000"/>
+                      </a:xfrm>
+                      <a:prstGeom prst="rect">
+                        <a:avLst/>
+                      </a:prstGeom>
+                    </p:spPr>
+                  </p:pic>
+                </p:oleObj>
+              </mc:Fallback>
+            </mc:AlternateContent>
+          </a:graphicData>
+        </a:graphic>
+      </p:graphicFrame>
+      <p:graphicFrame>
+        <p:nvGraphicFramePr>
+          <p:cNvPr id="4" name="Object 3">
+            <a:extLst>
+              <a:ext uri="{FF2B5EF4-FFF2-40B4-BE49-F238E27FC236}">
+                <a16:creationId xmlns:a16="http://schemas.microsoft.com/office/drawing/2014/main" id="{48472CE4-56B0-240D-0DD6-370D9583854A}"/>
+              </a:ext>
+            </a:extLst>
+          </p:cNvPr>
+          <p:cNvGraphicFramePr>
+            <a:graphicFrameLocks noChangeAspect="1"/>
+          </p:cNvGraphicFramePr>
+          <p:nvPr>
+            <p:extLst>
+              <p:ext uri="{D42A27DB-BD31-4B8C-83A1-F6EECF244321}">
+                <p14:modId xmlns:p14="http://schemas.microsoft.com/office/powerpoint/2010/main" val="110888139"/>
+              </p:ext>
+            </p:extLst>
+          </p:nvPr>
+        </p:nvGraphicFramePr>
+        <p:xfrm>
+          <a:off x="-377569" y="1690688"/>
+          <a:ext cx="6586667" cy="5040000"/>
+        </p:xfrm>
+        <a:graphic>
+          <a:graphicData uri="http://schemas.openxmlformats.org/presentationml/2006/ole">
+            <mc:AlternateContent xmlns:mc="http://schemas.openxmlformats.org/markup-compatibility/2006">
+              <mc:Choice xmlns:v="urn:schemas-microsoft-com:vml" Requires="v">
+                <p:oleObj name="Graph" r:id="rId4" imgW="3920760" imgH="3000960" progId="Origin95.Graph">
+                  <p:embed/>
+                </p:oleObj>
+              </mc:Choice>
+              <mc:Fallback>
+                <p:oleObj name="Graph" r:id="rId4" imgW="3920760" imgH="3000960" progId="Origin95.Graph">
+                  <p:embed/>
+                  <p:pic>
+                    <p:nvPicPr>
+                      <p:cNvPr id="0" name=""/>
+                      <p:cNvPicPr/>
+                      <p:nvPr/>
+                    </p:nvPicPr>
+                    <p:blipFill>
+                      <a:blip r:embed="rId5"/>
+                      <a:stretch>
+                        <a:fillRect/>
+                      </a:stretch>
+                    </p:blipFill>
+                    <p:spPr>
+                      <a:xfrm>
+                        <a:off x="-377569" y="1690688"/>
+                        <a:ext cx="6586667" cy="5040000"/>
+                      </a:xfrm>
+                      <a:prstGeom prst="rect">
+                        <a:avLst/>
+                      </a:prstGeom>
+                    </p:spPr>
+                  </p:pic>
+                </p:oleObj>
+              </mc:Fallback>
+            </mc:AlternateContent>
+          </a:graphicData>
+        </a:graphic>
+      </p:graphicFrame>
+    </p:spTree>
+    <p:extLst>
+      <p:ext uri="{BB962C8B-B14F-4D97-AF65-F5344CB8AC3E}">
+        <p14:creationId xmlns:p14="http://schemas.microsoft.com/office/powerpoint/2010/main" val="932762269"/>
+      </p:ext>
+    </p:extLst>
+  </p:cSld>
+  <p:clrMapOvr>
+    <a:masterClrMapping/>
+  </p:clrMapOvr>
+</p:sld>
+</file>
+
+<file path=ppt/slides/slide32.xml><?xml version="1.0" encoding="utf-8"?>
+<p:sld xmlns:a="http://schemas.openxmlformats.org/drawingml/2006/main" xmlns:r="http://schemas.openxmlformats.org/officeDocument/2006/relationships" xmlns:p="http://schemas.openxmlformats.org/presentationml/2006/main">
+  <p:cSld>
+    <p:spTree>
+      <p:nvGrpSpPr>
+        <p:cNvPr id="1" name=""/>
+        <p:cNvGrpSpPr/>
+        <p:nvPr/>
+      </p:nvGrpSpPr>
+      <p:grpSpPr>
+        <a:xfrm>
+          <a:off x="0" y="0"/>
+          <a:ext cx="0" cy="0"/>
+          <a:chOff x="0" y="0"/>
+          <a:chExt cx="0" cy="0"/>
+        </a:xfrm>
+      </p:grpSpPr>
+      <p:sp>
+        <p:nvSpPr>
+          <p:cNvPr id="2" name="Title 1">
+            <a:extLst>
+              <a:ext uri="{FF2B5EF4-FFF2-40B4-BE49-F238E27FC236}">
+                <a16:creationId xmlns:a16="http://schemas.microsoft.com/office/drawing/2014/main" id="{8E210B4A-315C-3B73-6035-609DB24F41E8}"/>
+              </a:ext>
+            </a:extLst>
+          </p:cNvPr>
+          <p:cNvSpPr>
+            <a:spLocks noGrp="1"/>
+          </p:cNvSpPr>
+          <p:nvPr>
+            <p:ph type="ctrTitle"/>
+          </p:nvPr>
+        </p:nvSpPr>
+        <p:spPr/>
+        <p:txBody>
+          <a:bodyPr/>
+          <a:lstStyle/>
+          <a:p>
+            <a:r>
+              <a:rPr lang="en-US" dirty="0"/>
+              <a:t>Sample7</a:t>
+            </a:r>
+            <a:endParaRPr lang="ru-RU" dirty="0"/>
+          </a:p>
+        </p:txBody>
+      </p:sp>
+      <p:sp>
+        <p:nvSpPr>
+          <p:cNvPr id="3" name="Subtitle 2">
+            <a:extLst>
+              <a:ext uri="{FF2B5EF4-FFF2-40B4-BE49-F238E27FC236}">
+                <a16:creationId xmlns:a16="http://schemas.microsoft.com/office/drawing/2014/main" id="{FF33A0C5-02AA-48B1-3BA8-70CC08F5FD0D}"/>
+              </a:ext>
+            </a:extLst>
+          </p:cNvPr>
+          <p:cNvSpPr>
+            <a:spLocks noGrp="1"/>
+          </p:cNvSpPr>
+          <p:nvPr>
+            <p:ph type="subTitle" idx="1"/>
+          </p:nvPr>
+        </p:nvSpPr>
+        <p:spPr/>
+        <p:txBody>
+          <a:bodyPr/>
+          <a:lstStyle/>
+          <a:p>
+            <a:pPr marL="342900" indent="-342900">
+              <a:buFont typeface="Arial" panose="020B0604020202020204" pitchFamily="34" charset="0"/>
+              <a:buChar char="•"/>
+            </a:pPr>
+            <a:r>
+              <a:rPr lang="en-US" dirty="0"/>
+              <a:t>Sample7_device1 </a:t>
+            </a:r>
+            <a:r>
+              <a:rPr lang="en-US" dirty="0" err="1"/>
+              <a:t>th</a:t>
+            </a:r>
+            <a:r>
+              <a:rPr lang="en-US" dirty="0"/>
+              <a:t>=2.8±0.4 nm</a:t>
+            </a:r>
+          </a:p>
+          <a:p>
+            <a:pPr marL="342900" indent="-342900">
+              <a:buFont typeface="Arial" panose="020B0604020202020204" pitchFamily="34" charset="0"/>
+              <a:buChar char="•"/>
+            </a:pPr>
+            <a:r>
+              <a:rPr lang="en-US" dirty="0"/>
+              <a:t>Sample7_device4 </a:t>
+            </a:r>
+            <a:r>
+              <a:rPr lang="en-US" dirty="0" err="1"/>
+              <a:t>th</a:t>
+            </a:r>
+            <a:r>
+              <a:rPr lang="en-US" dirty="0"/>
+              <a:t>=3.8±0.4 nm</a:t>
+            </a:r>
+          </a:p>
+          <a:p>
+            <a:pPr marL="342900" indent="-342900">
+              <a:buFont typeface="Arial" panose="020B0604020202020204" pitchFamily="34" charset="0"/>
+              <a:buChar char="•"/>
+            </a:pPr>
+            <a:r>
+              <a:rPr lang="en-US" dirty="0"/>
+              <a:t>Sample7_device5 </a:t>
+            </a:r>
+            <a:r>
+              <a:rPr lang="en-US" dirty="0" err="1"/>
+              <a:t>th</a:t>
+            </a:r>
+            <a:r>
+              <a:rPr lang="en-US" dirty="0"/>
+              <a:t>=5.7±0.3 nm</a:t>
+            </a:r>
+            <a:endParaRPr lang="ru-RU" dirty="0"/>
+          </a:p>
+        </p:txBody>
+      </p:sp>
+    </p:spTree>
+    <p:extLst>
+      <p:ext uri="{BB962C8B-B14F-4D97-AF65-F5344CB8AC3E}">
+        <p14:creationId xmlns:p14="http://schemas.microsoft.com/office/powerpoint/2010/main" val="1477020304"/>
+      </p:ext>
+    </p:extLst>
+  </p:cSld>
+  <p:clrMapOvr>
+    <a:masterClrMapping/>
+  </p:clrMapOvr>
+</p:sld>
+</file>
+
+<file path=ppt/slides/slide33.xml><?xml version="1.0" encoding="utf-8"?>
+<p:sld xmlns:a="http://schemas.openxmlformats.org/drawingml/2006/main" xmlns:r="http://schemas.openxmlformats.org/officeDocument/2006/relationships" xmlns:p="http://schemas.openxmlformats.org/presentationml/2006/main">
+  <p:cSld>
+    <p:spTree>
+      <p:nvGrpSpPr>
+        <p:cNvPr id="1" name=""/>
+        <p:cNvGrpSpPr/>
+        <p:nvPr/>
+      </p:nvGrpSpPr>
+      <p:grpSpPr>
+        <a:xfrm>
+          <a:off x="0" y="0"/>
+          <a:ext cx="0" cy="0"/>
+          <a:chOff x="0" y="0"/>
+          <a:chExt cx="0" cy="0"/>
+        </a:xfrm>
+      </p:grpSpPr>
+      <p:sp>
+        <p:nvSpPr>
+          <p:cNvPr id="2" name="Title 1">
+            <a:extLst>
+              <a:ext uri="{FF2B5EF4-FFF2-40B4-BE49-F238E27FC236}">
+                <a16:creationId xmlns:a16="http://schemas.microsoft.com/office/drawing/2014/main" id="{DFE03FBB-8BBF-BED0-32BB-C0D4A8083275}"/>
+              </a:ext>
+            </a:extLst>
+          </p:cNvPr>
+          <p:cNvSpPr>
+            <a:spLocks noGrp="1"/>
+          </p:cNvSpPr>
+          <p:nvPr>
+            <p:ph type="title"/>
+          </p:nvPr>
+        </p:nvSpPr>
+        <p:spPr/>
+        <p:txBody>
+          <a:bodyPr/>
+          <a:lstStyle/>
+          <a:p>
+            <a:r>
+              <a:rPr lang="en-US" dirty="0"/>
+              <a:t>Sample7_device1</a:t>
+            </a:r>
+            <a:endParaRPr lang="ru-RU" dirty="0"/>
+          </a:p>
+        </p:txBody>
+      </p:sp>
+      <p:graphicFrame>
+        <p:nvGraphicFramePr>
+          <p:cNvPr id="3" name="Object 2">
+            <a:extLst>
+              <a:ext uri="{FF2B5EF4-FFF2-40B4-BE49-F238E27FC236}">
+                <a16:creationId xmlns:a16="http://schemas.microsoft.com/office/drawing/2014/main" id="{AEDD00D4-7D44-2FCB-3664-D8A9BBC4564E}"/>
+              </a:ext>
+            </a:extLst>
+          </p:cNvPr>
+          <p:cNvGraphicFramePr>
+            <a:graphicFrameLocks noChangeAspect="1"/>
+          </p:cNvGraphicFramePr>
+          <p:nvPr>
+            <p:extLst>
+              <p:ext uri="{D42A27DB-BD31-4B8C-83A1-F6EECF244321}">
+                <p14:modId xmlns:p14="http://schemas.microsoft.com/office/powerpoint/2010/main" val="2866521420"/>
+              </p:ext>
+            </p:extLst>
+          </p:nvPr>
+        </p:nvGraphicFramePr>
+        <p:xfrm>
+          <a:off x="-357904" y="1690688"/>
+          <a:ext cx="6586667" cy="5040000"/>
+        </p:xfrm>
+        <a:graphic>
+          <a:graphicData uri="http://schemas.openxmlformats.org/presentationml/2006/ole">
+            <mc:AlternateContent xmlns:mc="http://schemas.openxmlformats.org/markup-compatibility/2006">
+              <mc:Choice xmlns:v="urn:schemas-microsoft-com:vml" Requires="v">
+                <p:oleObj name="Graph" r:id="rId2" imgW="3920760" imgH="3000960" progId="Origin95.Graph">
+                  <p:embed/>
+                </p:oleObj>
+              </mc:Choice>
+              <mc:Fallback>
+                <p:oleObj name="Graph" r:id="rId2" imgW="3920760" imgH="3000960" progId="Origin95.Graph">
+                  <p:embed/>
+                  <p:pic>
+                    <p:nvPicPr>
+                      <p:cNvPr id="0" name=""/>
+                      <p:cNvPicPr/>
+                      <p:nvPr/>
+                    </p:nvPicPr>
+                    <p:blipFill>
+                      <a:blip r:embed="rId3"/>
+                      <a:stretch>
+                        <a:fillRect/>
+                      </a:stretch>
+                    </p:blipFill>
+                    <p:spPr>
+                      <a:xfrm>
+                        <a:off x="-357904" y="1690688"/>
+                        <a:ext cx="6586667" cy="5040000"/>
+                      </a:xfrm>
+                      <a:prstGeom prst="rect">
+                        <a:avLst/>
+                      </a:prstGeom>
+                    </p:spPr>
+                  </p:pic>
+                </p:oleObj>
+              </mc:Fallback>
+            </mc:AlternateContent>
+          </a:graphicData>
+        </a:graphic>
+      </p:graphicFrame>
+      <p:graphicFrame>
+        <p:nvGraphicFramePr>
+          <p:cNvPr id="4" name="Object 3">
+            <a:extLst>
+              <a:ext uri="{FF2B5EF4-FFF2-40B4-BE49-F238E27FC236}">
+                <a16:creationId xmlns:a16="http://schemas.microsoft.com/office/drawing/2014/main" id="{61D978BF-7E39-8E5C-D54C-3490334CA10D}"/>
+              </a:ext>
+            </a:extLst>
+          </p:cNvPr>
+          <p:cNvGraphicFramePr>
+            <a:graphicFrameLocks noChangeAspect="1"/>
+          </p:cNvGraphicFramePr>
+          <p:nvPr>
+            <p:extLst>
+              <p:ext uri="{D42A27DB-BD31-4B8C-83A1-F6EECF244321}">
+                <p14:modId xmlns:p14="http://schemas.microsoft.com/office/powerpoint/2010/main" val="4186344023"/>
+              </p:ext>
+            </p:extLst>
+          </p:nvPr>
+        </p:nvGraphicFramePr>
+        <p:xfrm>
+          <a:off x="6096000" y="1690688"/>
+          <a:ext cx="6586667" cy="5040000"/>
+        </p:xfrm>
+        <a:graphic>
+          <a:graphicData uri="http://schemas.openxmlformats.org/presentationml/2006/ole">
+            <mc:AlternateContent xmlns:mc="http://schemas.openxmlformats.org/markup-compatibility/2006">
+              <mc:Choice xmlns:v="urn:schemas-microsoft-com:vml" Requires="v">
+                <p:oleObj name="Graph" r:id="rId4" imgW="3920760" imgH="3000960" progId="Origin95.Graph">
+                  <p:embed/>
+                </p:oleObj>
+              </mc:Choice>
+              <mc:Fallback>
+                <p:oleObj name="Graph" r:id="rId4" imgW="3920760" imgH="3000960" progId="Origin95.Graph">
+                  <p:embed/>
+                  <p:pic>
+                    <p:nvPicPr>
+                      <p:cNvPr id="0" name=""/>
+                      <p:cNvPicPr/>
+                      <p:nvPr/>
+                    </p:nvPicPr>
+                    <p:blipFill>
+                      <a:blip r:embed="rId5"/>
+                      <a:stretch>
+                        <a:fillRect/>
+                      </a:stretch>
+                    </p:blipFill>
+                    <p:spPr>
+                      <a:xfrm>
+                        <a:off x="6096000" y="1690688"/>
+                        <a:ext cx="6586667" cy="5040000"/>
+                      </a:xfrm>
+                      <a:prstGeom prst="rect">
+                        <a:avLst/>
+                      </a:prstGeom>
+                    </p:spPr>
+                  </p:pic>
+                </p:oleObj>
+              </mc:Fallback>
+            </mc:AlternateContent>
+          </a:graphicData>
+        </a:graphic>
+      </p:graphicFrame>
+    </p:spTree>
+    <p:extLst>
+      <p:ext uri="{BB962C8B-B14F-4D97-AF65-F5344CB8AC3E}">
+        <p14:creationId xmlns:p14="http://schemas.microsoft.com/office/powerpoint/2010/main" val="92333675"/>
+      </p:ext>
+    </p:extLst>
+  </p:cSld>
+  <p:clrMapOvr>
+    <a:masterClrMapping/>
+  </p:clrMapOvr>
+</p:sld>
+</file>
+
+<file path=ppt/slides/slide34.xml><?xml version="1.0" encoding="utf-8"?>
+<p:sld xmlns:a="http://schemas.openxmlformats.org/drawingml/2006/main" xmlns:r="http://schemas.openxmlformats.org/officeDocument/2006/relationships" xmlns:p="http://schemas.openxmlformats.org/presentationml/2006/main">
+  <p:cSld>
+    <p:spTree>
+      <p:nvGrpSpPr>
+        <p:cNvPr id="1" name=""/>
+        <p:cNvGrpSpPr/>
+        <p:nvPr/>
+      </p:nvGrpSpPr>
+      <p:grpSpPr>
+        <a:xfrm>
+          <a:off x="0" y="0"/>
+          <a:ext cx="0" cy="0"/>
+          <a:chOff x="0" y="0"/>
+          <a:chExt cx="0" cy="0"/>
+        </a:xfrm>
+      </p:grpSpPr>
+      <p:sp>
+        <p:nvSpPr>
+          <p:cNvPr id="2" name="Title 1">
+            <a:extLst>
+              <a:ext uri="{FF2B5EF4-FFF2-40B4-BE49-F238E27FC236}">
+                <a16:creationId xmlns:a16="http://schemas.microsoft.com/office/drawing/2014/main" id="{86D0C808-AE7C-5D7D-08E3-CB8FD2EDC259}"/>
+              </a:ext>
+            </a:extLst>
+          </p:cNvPr>
+          <p:cNvSpPr>
+            <a:spLocks noGrp="1"/>
+          </p:cNvSpPr>
+          <p:nvPr>
+            <p:ph type="title"/>
+          </p:nvPr>
+        </p:nvSpPr>
+        <p:spPr/>
+        <p:txBody>
+          <a:bodyPr/>
+          <a:lstStyle/>
+          <a:p>
+            <a:r>
+              <a:rPr lang="en-US" dirty="0"/>
+              <a:t>Sample7_device1</a:t>
+            </a:r>
+            <a:endParaRPr lang="ru-RU" dirty="0"/>
+          </a:p>
+        </p:txBody>
+      </p:sp>
+      <p:graphicFrame>
+        <p:nvGraphicFramePr>
+          <p:cNvPr id="3" name="Object 2">
+            <a:extLst>
+              <a:ext uri="{FF2B5EF4-FFF2-40B4-BE49-F238E27FC236}">
+                <a16:creationId xmlns:a16="http://schemas.microsoft.com/office/drawing/2014/main" id="{7EEA41CF-3DE6-21DF-F145-488F675CDBA8}"/>
+              </a:ext>
+            </a:extLst>
+          </p:cNvPr>
+          <p:cNvGraphicFramePr>
+            <a:graphicFrameLocks noChangeAspect="1"/>
+          </p:cNvGraphicFramePr>
+          <p:nvPr>
+            <p:extLst>
+              <p:ext uri="{D42A27DB-BD31-4B8C-83A1-F6EECF244321}">
+                <p14:modId xmlns:p14="http://schemas.microsoft.com/office/powerpoint/2010/main" val="927890418"/>
+              </p:ext>
+            </p:extLst>
+          </p:nvPr>
+        </p:nvGraphicFramePr>
+        <p:xfrm>
+          <a:off x="6003568" y="1690688"/>
+          <a:ext cx="6586667" cy="5040000"/>
+        </p:xfrm>
+        <a:graphic>
+          <a:graphicData uri="http://schemas.openxmlformats.org/presentationml/2006/ole">
+            <mc:AlternateContent xmlns:mc="http://schemas.openxmlformats.org/markup-compatibility/2006">
+              <mc:Choice xmlns:v="urn:schemas-microsoft-com:vml" Requires="v">
+                <p:oleObj name="Graph" r:id="rId2" imgW="3920760" imgH="3000960" progId="Origin95.Graph">
+                  <p:embed/>
+                </p:oleObj>
+              </mc:Choice>
+              <mc:Fallback>
+                <p:oleObj name="Graph" r:id="rId2" imgW="3920760" imgH="3000960" progId="Origin95.Graph">
+                  <p:embed/>
+                  <p:pic>
+                    <p:nvPicPr>
+                      <p:cNvPr id="0" name=""/>
+                      <p:cNvPicPr/>
+                      <p:nvPr/>
+                    </p:nvPicPr>
+                    <p:blipFill>
+                      <a:blip r:embed="rId3"/>
+                      <a:stretch>
+                        <a:fillRect/>
+                      </a:stretch>
+                    </p:blipFill>
+                    <p:spPr>
+                      <a:xfrm>
+                        <a:off x="6003568" y="1690688"/>
+                        <a:ext cx="6586667" cy="5040000"/>
+                      </a:xfrm>
+                      <a:prstGeom prst="rect">
+                        <a:avLst/>
+                      </a:prstGeom>
+                    </p:spPr>
+                  </p:pic>
+                </p:oleObj>
+              </mc:Fallback>
+            </mc:AlternateContent>
+          </a:graphicData>
+        </a:graphic>
+      </p:graphicFrame>
+      <p:graphicFrame>
+        <p:nvGraphicFramePr>
+          <p:cNvPr id="4" name="Object 3">
+            <a:extLst>
+              <a:ext uri="{FF2B5EF4-FFF2-40B4-BE49-F238E27FC236}">
+                <a16:creationId xmlns:a16="http://schemas.microsoft.com/office/drawing/2014/main" id="{7433E80A-27B2-881C-3D8B-A4BF75991A96}"/>
+              </a:ext>
+            </a:extLst>
+          </p:cNvPr>
+          <p:cNvGraphicFramePr>
+            <a:graphicFrameLocks noChangeAspect="1"/>
+          </p:cNvGraphicFramePr>
+          <p:nvPr>
+            <p:extLst>
+              <p:ext uri="{D42A27DB-BD31-4B8C-83A1-F6EECF244321}">
+                <p14:modId xmlns:p14="http://schemas.microsoft.com/office/powerpoint/2010/main" val="165792641"/>
+              </p:ext>
+            </p:extLst>
+          </p:nvPr>
+        </p:nvGraphicFramePr>
+        <p:xfrm>
+          <a:off x="-398235" y="1690688"/>
+          <a:ext cx="6586667" cy="5040000"/>
+        </p:xfrm>
+        <a:graphic>
+          <a:graphicData uri="http://schemas.openxmlformats.org/presentationml/2006/ole">
+            <mc:AlternateContent xmlns:mc="http://schemas.openxmlformats.org/markup-compatibility/2006">
+              <mc:Choice xmlns:v="urn:schemas-microsoft-com:vml" Requires="v">
+                <p:oleObj name="Graph" r:id="rId4" imgW="3920760" imgH="3000960" progId="Origin95.Graph">
+                  <p:embed/>
+                </p:oleObj>
+              </mc:Choice>
+              <mc:Fallback>
+                <p:oleObj name="Graph" r:id="rId4" imgW="3920760" imgH="3000960" progId="Origin95.Graph">
+                  <p:embed/>
+                  <p:pic>
+                    <p:nvPicPr>
+                      <p:cNvPr id="0" name=""/>
+                      <p:cNvPicPr/>
+                      <p:nvPr/>
+                    </p:nvPicPr>
+                    <p:blipFill>
+                      <a:blip r:embed="rId5"/>
+                      <a:stretch>
+                        <a:fillRect/>
+                      </a:stretch>
+                    </p:blipFill>
+                    <p:spPr>
+                      <a:xfrm>
+                        <a:off x="-398235" y="1690688"/>
+                        <a:ext cx="6586667" cy="5040000"/>
+                      </a:xfrm>
+                      <a:prstGeom prst="rect">
+                        <a:avLst/>
+                      </a:prstGeom>
+                    </p:spPr>
+                  </p:pic>
+                </p:oleObj>
+              </mc:Fallback>
+            </mc:AlternateContent>
+          </a:graphicData>
+        </a:graphic>
+      </p:graphicFrame>
+    </p:spTree>
+    <p:extLst>
+      <p:ext uri="{BB962C8B-B14F-4D97-AF65-F5344CB8AC3E}">
+        <p14:creationId xmlns:p14="http://schemas.microsoft.com/office/powerpoint/2010/main" val="2267019412"/>
       </p:ext>
     </p:extLst>
   </p:cSld>

</xml_diff>

<commit_message>
09/11/2023 Sample 8 complete
</commit_message>
<xml_diff>
--- a/Mikhail Bandurist Transistors/Report_Electrical_Characterisation_batch2.pptx
+++ b/Mikhail Bandurist Transistors/Report_Electrical_Characterisation_batch2.pptx
@@ -5,7 +5,7 @@
     <p:sldMasterId id="2147483648" r:id="rId1"/>
   </p:sldMasterIdLst>
   <p:notesMasterIdLst>
-    <p:notesMasterId r:id="rId36"/>
+    <p:notesMasterId r:id="rId43"/>
   </p:notesMasterIdLst>
   <p:sldIdLst>
     <p:sldId id="256" r:id="rId2"/>
@@ -42,6 +42,13 @@
     <p:sldId id="287" r:id="rId33"/>
     <p:sldId id="288" r:id="rId34"/>
     <p:sldId id="289" r:id="rId35"/>
+    <p:sldId id="290" r:id="rId36"/>
+    <p:sldId id="291" r:id="rId37"/>
+    <p:sldId id="292" r:id="rId38"/>
+    <p:sldId id="293" r:id="rId39"/>
+    <p:sldId id="294" r:id="rId40"/>
+    <p:sldId id="295" r:id="rId41"/>
+    <p:sldId id="296" r:id="rId42"/>
   </p:sldIdLst>
   <p:sldSz cx="12192000" cy="6858000"/>
   <p:notesSz cx="6858000" cy="9144000"/>
@@ -230,7 +237,7 @@
           <a:p>
             <a:fld id="{B96EF0F7-918A-4738-AB99-78B82970DF32}" type="datetimeFigureOut">
               <a:rPr lang="ru-RU" smtClean="0"/>
-              <a:t>07.11.2023</a:t>
+              <a:t>08.11.2023</a:t>
             </a:fld>
             <a:endParaRPr lang="ru-RU"/>
           </a:p>
@@ -731,7 +738,7 @@
           <a:p>
             <a:fld id="{9FDA9E9B-36F1-4FB7-8743-C1EA76B05336}" type="datetimeFigureOut">
               <a:rPr lang="ru-RU" smtClean="0"/>
-              <a:t>07.11.2023</a:t>
+              <a:t>08.11.2023</a:t>
             </a:fld>
             <a:endParaRPr lang="ru-RU"/>
           </a:p>
@@ -931,7 +938,7 @@
           <a:p>
             <a:fld id="{9FDA9E9B-36F1-4FB7-8743-C1EA76B05336}" type="datetimeFigureOut">
               <a:rPr lang="ru-RU" smtClean="0"/>
-              <a:t>07.11.2023</a:t>
+              <a:t>08.11.2023</a:t>
             </a:fld>
             <a:endParaRPr lang="ru-RU"/>
           </a:p>
@@ -1141,7 +1148,7 @@
           <a:p>
             <a:fld id="{9FDA9E9B-36F1-4FB7-8743-C1EA76B05336}" type="datetimeFigureOut">
               <a:rPr lang="ru-RU" smtClean="0"/>
-              <a:t>07.11.2023</a:t>
+              <a:t>08.11.2023</a:t>
             </a:fld>
             <a:endParaRPr lang="ru-RU"/>
           </a:p>
@@ -1341,7 +1348,7 @@
           <a:p>
             <a:fld id="{9FDA9E9B-36F1-4FB7-8743-C1EA76B05336}" type="datetimeFigureOut">
               <a:rPr lang="ru-RU" smtClean="0"/>
-              <a:t>07.11.2023</a:t>
+              <a:t>08.11.2023</a:t>
             </a:fld>
             <a:endParaRPr lang="ru-RU"/>
           </a:p>
@@ -1617,7 +1624,7 @@
           <a:p>
             <a:fld id="{9FDA9E9B-36F1-4FB7-8743-C1EA76B05336}" type="datetimeFigureOut">
               <a:rPr lang="ru-RU" smtClean="0"/>
-              <a:t>07.11.2023</a:t>
+              <a:t>08.11.2023</a:t>
             </a:fld>
             <a:endParaRPr lang="ru-RU"/>
           </a:p>
@@ -1885,7 +1892,7 @@
           <a:p>
             <a:fld id="{9FDA9E9B-36F1-4FB7-8743-C1EA76B05336}" type="datetimeFigureOut">
               <a:rPr lang="ru-RU" smtClean="0"/>
-              <a:t>07.11.2023</a:t>
+              <a:t>08.11.2023</a:t>
             </a:fld>
             <a:endParaRPr lang="ru-RU"/>
           </a:p>
@@ -2300,7 +2307,7 @@
           <a:p>
             <a:fld id="{9FDA9E9B-36F1-4FB7-8743-C1EA76B05336}" type="datetimeFigureOut">
               <a:rPr lang="ru-RU" smtClean="0"/>
-              <a:t>07.11.2023</a:t>
+              <a:t>08.11.2023</a:t>
             </a:fld>
             <a:endParaRPr lang="ru-RU"/>
           </a:p>
@@ -2442,7 +2449,7 @@
           <a:p>
             <a:fld id="{9FDA9E9B-36F1-4FB7-8743-C1EA76B05336}" type="datetimeFigureOut">
               <a:rPr lang="ru-RU" smtClean="0"/>
-              <a:t>07.11.2023</a:t>
+              <a:t>08.11.2023</a:t>
             </a:fld>
             <a:endParaRPr lang="ru-RU"/>
           </a:p>
@@ -2555,7 +2562,7 @@
           <a:p>
             <a:fld id="{9FDA9E9B-36F1-4FB7-8743-C1EA76B05336}" type="datetimeFigureOut">
               <a:rPr lang="ru-RU" smtClean="0"/>
-              <a:t>07.11.2023</a:t>
+              <a:t>08.11.2023</a:t>
             </a:fld>
             <a:endParaRPr lang="ru-RU"/>
           </a:p>
@@ -2868,7 +2875,7 @@
           <a:p>
             <a:fld id="{9FDA9E9B-36F1-4FB7-8743-C1EA76B05336}" type="datetimeFigureOut">
               <a:rPr lang="ru-RU" smtClean="0"/>
-              <a:t>07.11.2023</a:t>
+              <a:t>08.11.2023</a:t>
             </a:fld>
             <a:endParaRPr lang="ru-RU"/>
           </a:p>
@@ -3157,7 +3164,7 @@
           <a:p>
             <a:fld id="{9FDA9E9B-36F1-4FB7-8743-C1EA76B05336}" type="datetimeFigureOut">
               <a:rPr lang="ru-RU" smtClean="0"/>
-              <a:t>07.11.2023</a:t>
+              <a:t>08.11.2023</a:t>
             </a:fld>
             <a:endParaRPr lang="ru-RU"/>
           </a:p>
@@ -3400,7 +3407,7 @@
           <a:p>
             <a:fld id="{9FDA9E9B-36F1-4FB7-8743-C1EA76B05336}" type="datetimeFigureOut">
               <a:rPr lang="ru-RU" smtClean="0"/>
-              <a:t>07.11.2023</a:t>
+              <a:t>08.11.2023</a:t>
             </a:fld>
             <a:endParaRPr lang="ru-RU"/>
           </a:p>
@@ -3838,7 +3845,7 @@
           <a:bodyPr/>
           <a:lstStyle/>
           <a:p>
-            <a:endParaRPr lang="ru-RU"/>
+            <a:endParaRPr lang="ru-RU" dirty="0"/>
           </a:p>
         </p:txBody>
       </p:sp>
@@ -7695,7 +7702,7 @@
           <a:p>
             <a:r>
               <a:rPr lang="en-US" dirty="0"/>
-              <a:t>Sample7</a:t>
+              <a:t>Sample 7</a:t>
             </a:r>
             <a:endParaRPr lang="ru-RU" dirty="0"/>
           </a:p>
@@ -8161,6 +8168,720 @@
 </p:sld>
 </file>
 
+<file path=ppt/slides/slide35.xml><?xml version="1.0" encoding="utf-8"?>
+<p:sld xmlns:a="http://schemas.openxmlformats.org/drawingml/2006/main" xmlns:r="http://schemas.openxmlformats.org/officeDocument/2006/relationships" xmlns:p="http://schemas.openxmlformats.org/presentationml/2006/main">
+  <p:cSld>
+    <p:spTree>
+      <p:nvGrpSpPr>
+        <p:cNvPr id="1" name=""/>
+        <p:cNvGrpSpPr/>
+        <p:nvPr/>
+      </p:nvGrpSpPr>
+      <p:grpSpPr>
+        <a:xfrm>
+          <a:off x="0" y="0"/>
+          <a:ext cx="0" cy="0"/>
+          <a:chOff x="0" y="0"/>
+          <a:chExt cx="0" cy="0"/>
+        </a:xfrm>
+      </p:grpSpPr>
+      <p:sp>
+        <p:nvSpPr>
+          <p:cNvPr id="2" name="Title 1">
+            <a:extLst>
+              <a:ext uri="{FF2B5EF4-FFF2-40B4-BE49-F238E27FC236}">
+                <a16:creationId xmlns:a16="http://schemas.microsoft.com/office/drawing/2014/main" id="{8095BE36-83BF-1164-1189-292C832E2192}"/>
+              </a:ext>
+            </a:extLst>
+          </p:cNvPr>
+          <p:cNvSpPr>
+            <a:spLocks noGrp="1"/>
+          </p:cNvSpPr>
+          <p:nvPr>
+            <p:ph type="title"/>
+          </p:nvPr>
+        </p:nvSpPr>
+        <p:spPr/>
+        <p:txBody>
+          <a:bodyPr/>
+          <a:lstStyle/>
+          <a:p>
+            <a:r>
+              <a:rPr lang="en-US" dirty="0"/>
+              <a:t>Sample7_device4</a:t>
+            </a:r>
+            <a:endParaRPr lang="ru-RU" dirty="0"/>
+          </a:p>
+        </p:txBody>
+      </p:sp>
+      <p:graphicFrame>
+        <p:nvGraphicFramePr>
+          <p:cNvPr id="4" name="Object 3">
+            <a:extLst>
+              <a:ext uri="{FF2B5EF4-FFF2-40B4-BE49-F238E27FC236}">
+                <a16:creationId xmlns:a16="http://schemas.microsoft.com/office/drawing/2014/main" id="{683CD537-A288-B150-48C0-CE451B600641}"/>
+              </a:ext>
+            </a:extLst>
+          </p:cNvPr>
+          <p:cNvGraphicFramePr>
+            <a:graphicFrameLocks noChangeAspect="1"/>
+          </p:cNvGraphicFramePr>
+          <p:nvPr>
+            <p:extLst>
+              <p:ext uri="{D42A27DB-BD31-4B8C-83A1-F6EECF244321}">
+                <p14:modId xmlns:p14="http://schemas.microsoft.com/office/powerpoint/2010/main" val="3394142091"/>
+              </p:ext>
+            </p:extLst>
+          </p:nvPr>
+        </p:nvGraphicFramePr>
+        <p:xfrm>
+          <a:off x="6096000" y="1690688"/>
+          <a:ext cx="6586667" cy="5040000"/>
+        </p:xfrm>
+        <a:graphic>
+          <a:graphicData uri="http://schemas.openxmlformats.org/presentationml/2006/ole">
+            <mc:AlternateContent xmlns:mc="http://schemas.openxmlformats.org/markup-compatibility/2006">
+              <mc:Choice xmlns:v="urn:schemas-microsoft-com:vml" Requires="v">
+                <p:oleObj name="Graph" r:id="rId2" imgW="3920760" imgH="3000960" progId="Origin95.Graph">
+                  <p:embed/>
+                </p:oleObj>
+              </mc:Choice>
+              <mc:Fallback>
+                <p:oleObj name="Graph" r:id="rId2" imgW="3920760" imgH="3000960" progId="Origin95.Graph">
+                  <p:embed/>
+                  <p:pic>
+                    <p:nvPicPr>
+                      <p:cNvPr id="0" name=""/>
+                      <p:cNvPicPr/>
+                      <p:nvPr/>
+                    </p:nvPicPr>
+                    <p:blipFill>
+                      <a:blip r:embed="rId3"/>
+                      <a:stretch>
+                        <a:fillRect/>
+                      </a:stretch>
+                    </p:blipFill>
+                    <p:spPr>
+                      <a:xfrm>
+                        <a:off x="6096000" y="1690688"/>
+                        <a:ext cx="6586667" cy="5040000"/>
+                      </a:xfrm>
+                      <a:prstGeom prst="rect">
+                        <a:avLst/>
+                      </a:prstGeom>
+                    </p:spPr>
+                  </p:pic>
+                </p:oleObj>
+              </mc:Fallback>
+            </mc:AlternateContent>
+          </a:graphicData>
+        </a:graphic>
+      </p:graphicFrame>
+      <p:graphicFrame>
+        <p:nvGraphicFramePr>
+          <p:cNvPr id="5" name="Object 4">
+            <a:extLst>
+              <a:ext uri="{FF2B5EF4-FFF2-40B4-BE49-F238E27FC236}">
+                <a16:creationId xmlns:a16="http://schemas.microsoft.com/office/drawing/2014/main" id="{4FFD8BCF-B320-8804-AE25-50A1A264EE4B}"/>
+              </a:ext>
+            </a:extLst>
+          </p:cNvPr>
+          <p:cNvGraphicFramePr>
+            <a:graphicFrameLocks noChangeAspect="1"/>
+          </p:cNvGraphicFramePr>
+          <p:nvPr>
+            <p:extLst>
+              <p:ext uri="{D42A27DB-BD31-4B8C-83A1-F6EECF244321}">
+                <p14:modId xmlns:p14="http://schemas.microsoft.com/office/powerpoint/2010/main" val="1019231863"/>
+              </p:ext>
+            </p:extLst>
+          </p:nvPr>
+        </p:nvGraphicFramePr>
+        <p:xfrm>
+          <a:off x="-382513" y="1690688"/>
+          <a:ext cx="6586667" cy="5040000"/>
+        </p:xfrm>
+        <a:graphic>
+          <a:graphicData uri="http://schemas.openxmlformats.org/presentationml/2006/ole">
+            <mc:AlternateContent xmlns:mc="http://schemas.openxmlformats.org/markup-compatibility/2006">
+              <mc:Choice xmlns:v="urn:schemas-microsoft-com:vml" Requires="v">
+                <p:oleObj name="Graph" r:id="rId4" imgW="3920760" imgH="3000960" progId="Origin95.Graph">
+                  <p:embed/>
+                </p:oleObj>
+              </mc:Choice>
+              <mc:Fallback>
+                <p:oleObj name="Graph" r:id="rId4" imgW="3920760" imgH="3000960" progId="Origin95.Graph">
+                  <p:embed/>
+                  <p:pic>
+                    <p:nvPicPr>
+                      <p:cNvPr id="0" name=""/>
+                      <p:cNvPicPr/>
+                      <p:nvPr/>
+                    </p:nvPicPr>
+                    <p:blipFill>
+                      <a:blip r:embed="rId5"/>
+                      <a:stretch>
+                        <a:fillRect/>
+                      </a:stretch>
+                    </p:blipFill>
+                    <p:spPr>
+                      <a:xfrm>
+                        <a:off x="-382513" y="1690688"/>
+                        <a:ext cx="6586667" cy="5040000"/>
+                      </a:xfrm>
+                      <a:prstGeom prst="rect">
+                        <a:avLst/>
+                      </a:prstGeom>
+                    </p:spPr>
+                  </p:pic>
+                </p:oleObj>
+              </mc:Fallback>
+            </mc:AlternateContent>
+          </a:graphicData>
+        </a:graphic>
+      </p:graphicFrame>
+    </p:spTree>
+    <p:extLst>
+      <p:ext uri="{BB962C8B-B14F-4D97-AF65-F5344CB8AC3E}">
+        <p14:creationId xmlns:p14="http://schemas.microsoft.com/office/powerpoint/2010/main" val="4118829868"/>
+      </p:ext>
+    </p:extLst>
+  </p:cSld>
+  <p:clrMapOvr>
+    <a:masterClrMapping/>
+  </p:clrMapOvr>
+</p:sld>
+</file>
+
+<file path=ppt/slides/slide36.xml><?xml version="1.0" encoding="utf-8"?>
+<p:sld xmlns:a="http://schemas.openxmlformats.org/drawingml/2006/main" xmlns:r="http://schemas.openxmlformats.org/officeDocument/2006/relationships" xmlns:p="http://schemas.openxmlformats.org/presentationml/2006/main">
+  <p:cSld>
+    <p:spTree>
+      <p:nvGrpSpPr>
+        <p:cNvPr id="1" name=""/>
+        <p:cNvGrpSpPr/>
+        <p:nvPr/>
+      </p:nvGrpSpPr>
+      <p:grpSpPr>
+        <a:xfrm>
+          <a:off x="0" y="0"/>
+          <a:ext cx="0" cy="0"/>
+          <a:chOff x="0" y="0"/>
+          <a:chExt cx="0" cy="0"/>
+        </a:xfrm>
+      </p:grpSpPr>
+      <p:sp>
+        <p:nvSpPr>
+          <p:cNvPr id="2" name="Title 1">
+            <a:extLst>
+              <a:ext uri="{FF2B5EF4-FFF2-40B4-BE49-F238E27FC236}">
+                <a16:creationId xmlns:a16="http://schemas.microsoft.com/office/drawing/2014/main" id="{85AF798A-71BD-D071-DC78-302FD105C914}"/>
+              </a:ext>
+            </a:extLst>
+          </p:cNvPr>
+          <p:cNvSpPr>
+            <a:spLocks noGrp="1"/>
+          </p:cNvSpPr>
+          <p:nvPr>
+            <p:ph type="title"/>
+          </p:nvPr>
+        </p:nvSpPr>
+        <p:spPr/>
+        <p:txBody>
+          <a:bodyPr/>
+          <a:lstStyle/>
+          <a:p>
+            <a:r>
+              <a:rPr lang="en-US" dirty="0"/>
+              <a:t>Sample7_device4</a:t>
+            </a:r>
+            <a:endParaRPr lang="ru-RU" dirty="0"/>
+          </a:p>
+        </p:txBody>
+      </p:sp>
+      <p:graphicFrame>
+        <p:nvGraphicFramePr>
+          <p:cNvPr id="3" name="Object 2">
+            <a:extLst>
+              <a:ext uri="{FF2B5EF4-FFF2-40B4-BE49-F238E27FC236}">
+                <a16:creationId xmlns:a16="http://schemas.microsoft.com/office/drawing/2014/main" id="{4409F987-BCD0-ADB9-2B35-F0972CA26176}"/>
+              </a:ext>
+            </a:extLst>
+          </p:cNvPr>
+          <p:cNvGraphicFramePr>
+            <a:graphicFrameLocks noChangeAspect="1"/>
+          </p:cNvGraphicFramePr>
+          <p:nvPr>
+            <p:extLst>
+              <p:ext uri="{D42A27DB-BD31-4B8C-83A1-F6EECF244321}">
+                <p14:modId xmlns:p14="http://schemas.microsoft.com/office/powerpoint/2010/main" val="2733318609"/>
+              </p:ext>
+            </p:extLst>
+          </p:nvPr>
+        </p:nvGraphicFramePr>
+        <p:xfrm>
+          <a:off x="5924909" y="1690688"/>
+          <a:ext cx="6586667" cy="5040000"/>
+        </p:xfrm>
+        <a:graphic>
+          <a:graphicData uri="http://schemas.openxmlformats.org/presentationml/2006/ole">
+            <mc:AlternateContent xmlns:mc="http://schemas.openxmlformats.org/markup-compatibility/2006">
+              <mc:Choice xmlns:v="urn:schemas-microsoft-com:vml" Requires="v">
+                <p:oleObj name="Graph" r:id="rId2" imgW="3920760" imgH="3000960" progId="Origin95.Graph">
+                  <p:embed/>
+                </p:oleObj>
+              </mc:Choice>
+              <mc:Fallback>
+                <p:oleObj name="Graph" r:id="rId2" imgW="3920760" imgH="3000960" progId="Origin95.Graph">
+                  <p:embed/>
+                  <p:pic>
+                    <p:nvPicPr>
+                      <p:cNvPr id="0" name=""/>
+                      <p:cNvPicPr/>
+                      <p:nvPr/>
+                    </p:nvPicPr>
+                    <p:blipFill>
+                      <a:blip r:embed="rId3"/>
+                      <a:stretch>
+                        <a:fillRect/>
+                      </a:stretch>
+                    </p:blipFill>
+                    <p:spPr>
+                      <a:xfrm>
+                        <a:off x="5924909" y="1690688"/>
+                        <a:ext cx="6586667" cy="5040000"/>
+                      </a:xfrm>
+                      <a:prstGeom prst="rect">
+                        <a:avLst/>
+                      </a:prstGeom>
+                    </p:spPr>
+                  </p:pic>
+                </p:oleObj>
+              </mc:Fallback>
+            </mc:AlternateContent>
+          </a:graphicData>
+        </a:graphic>
+      </p:graphicFrame>
+    </p:spTree>
+    <p:extLst>
+      <p:ext uri="{BB962C8B-B14F-4D97-AF65-F5344CB8AC3E}">
+        <p14:creationId xmlns:p14="http://schemas.microsoft.com/office/powerpoint/2010/main" val="3356948610"/>
+      </p:ext>
+    </p:extLst>
+  </p:cSld>
+  <p:clrMapOvr>
+    <a:masterClrMapping/>
+  </p:clrMapOvr>
+</p:sld>
+</file>
+
+<file path=ppt/slides/slide37.xml><?xml version="1.0" encoding="utf-8"?>
+<p:sld xmlns:a="http://schemas.openxmlformats.org/drawingml/2006/main" xmlns:r="http://schemas.openxmlformats.org/officeDocument/2006/relationships" xmlns:p="http://schemas.openxmlformats.org/presentationml/2006/main">
+  <p:cSld>
+    <p:spTree>
+      <p:nvGrpSpPr>
+        <p:cNvPr id="1" name=""/>
+        <p:cNvGrpSpPr/>
+        <p:nvPr/>
+      </p:nvGrpSpPr>
+      <p:grpSpPr>
+        <a:xfrm>
+          <a:off x="0" y="0"/>
+          <a:ext cx="0" cy="0"/>
+          <a:chOff x="0" y="0"/>
+          <a:chExt cx="0" cy="0"/>
+        </a:xfrm>
+      </p:grpSpPr>
+      <p:sp>
+        <p:nvSpPr>
+          <p:cNvPr id="2" name="Title 1">
+            <a:extLst>
+              <a:ext uri="{FF2B5EF4-FFF2-40B4-BE49-F238E27FC236}">
+                <a16:creationId xmlns:a16="http://schemas.microsoft.com/office/drawing/2014/main" id="{C03A9B9D-D0DB-578C-7D8C-9BA19B1ED8E3}"/>
+              </a:ext>
+            </a:extLst>
+          </p:cNvPr>
+          <p:cNvSpPr>
+            <a:spLocks noGrp="1"/>
+          </p:cNvSpPr>
+          <p:nvPr>
+            <p:ph type="title"/>
+          </p:nvPr>
+        </p:nvSpPr>
+        <p:spPr/>
+        <p:txBody>
+          <a:bodyPr/>
+          <a:lstStyle/>
+          <a:p>
+            <a:r>
+              <a:rPr lang="en-US" dirty="0"/>
+              <a:t>Sample7_device5</a:t>
+            </a:r>
+            <a:endParaRPr lang="ru-RU" dirty="0"/>
+          </a:p>
+        </p:txBody>
+      </p:sp>
+      <p:graphicFrame>
+        <p:nvGraphicFramePr>
+          <p:cNvPr id="3" name="Object 2">
+            <a:extLst>
+              <a:ext uri="{FF2B5EF4-FFF2-40B4-BE49-F238E27FC236}">
+                <a16:creationId xmlns:a16="http://schemas.microsoft.com/office/drawing/2014/main" id="{320597D1-6CD0-8D9F-0617-627E95F9E449}"/>
+              </a:ext>
+            </a:extLst>
+          </p:cNvPr>
+          <p:cNvGraphicFramePr>
+            <a:graphicFrameLocks noChangeAspect="1"/>
+          </p:cNvGraphicFramePr>
+          <p:nvPr>
+            <p:extLst>
+              <p:ext uri="{D42A27DB-BD31-4B8C-83A1-F6EECF244321}">
+                <p14:modId xmlns:p14="http://schemas.microsoft.com/office/powerpoint/2010/main" val="1883213783"/>
+              </p:ext>
+            </p:extLst>
+          </p:nvPr>
+        </p:nvGraphicFramePr>
+        <p:xfrm>
+          <a:off x="-249749" y="1690688"/>
+          <a:ext cx="6586667" cy="5040000"/>
+        </p:xfrm>
+        <a:graphic>
+          <a:graphicData uri="http://schemas.openxmlformats.org/presentationml/2006/ole">
+            <mc:AlternateContent xmlns:mc="http://schemas.openxmlformats.org/markup-compatibility/2006">
+              <mc:Choice xmlns:v="urn:schemas-microsoft-com:vml" Requires="v">
+                <p:oleObj name="Graph" r:id="rId2" imgW="3920760" imgH="3000960" progId="Origin95.Graph">
+                  <p:embed/>
+                </p:oleObj>
+              </mc:Choice>
+              <mc:Fallback>
+                <p:oleObj name="Graph" r:id="rId2" imgW="3920760" imgH="3000960" progId="Origin95.Graph">
+                  <p:embed/>
+                  <p:pic>
+                    <p:nvPicPr>
+                      <p:cNvPr id="0" name=""/>
+                      <p:cNvPicPr/>
+                      <p:nvPr/>
+                    </p:nvPicPr>
+                    <p:blipFill>
+                      <a:blip r:embed="rId3"/>
+                      <a:stretch>
+                        <a:fillRect/>
+                      </a:stretch>
+                    </p:blipFill>
+                    <p:spPr>
+                      <a:xfrm>
+                        <a:off x="-249749" y="1690688"/>
+                        <a:ext cx="6586667" cy="5040000"/>
+                      </a:xfrm>
+                      <a:prstGeom prst="rect">
+                        <a:avLst/>
+                      </a:prstGeom>
+                    </p:spPr>
+                  </p:pic>
+                </p:oleObj>
+              </mc:Fallback>
+            </mc:AlternateContent>
+          </a:graphicData>
+        </a:graphic>
+      </p:graphicFrame>
+      <p:graphicFrame>
+        <p:nvGraphicFramePr>
+          <p:cNvPr id="4" name="Object 3">
+            <a:extLst>
+              <a:ext uri="{FF2B5EF4-FFF2-40B4-BE49-F238E27FC236}">
+                <a16:creationId xmlns:a16="http://schemas.microsoft.com/office/drawing/2014/main" id="{5B6556DE-7025-6144-0E2C-C56613CDC9BE}"/>
+              </a:ext>
+            </a:extLst>
+          </p:cNvPr>
+          <p:cNvGraphicFramePr>
+            <a:graphicFrameLocks noChangeAspect="1"/>
+          </p:cNvGraphicFramePr>
+          <p:nvPr>
+            <p:extLst>
+              <p:ext uri="{D42A27DB-BD31-4B8C-83A1-F6EECF244321}">
+                <p14:modId xmlns:p14="http://schemas.microsoft.com/office/powerpoint/2010/main" val="3822570040"/>
+              </p:ext>
+            </p:extLst>
+          </p:nvPr>
+        </p:nvGraphicFramePr>
+        <p:xfrm>
+          <a:off x="6023231" y="1690688"/>
+          <a:ext cx="6586668" cy="5040000"/>
+        </p:xfrm>
+        <a:graphic>
+          <a:graphicData uri="http://schemas.openxmlformats.org/presentationml/2006/ole">
+            <mc:AlternateContent xmlns:mc="http://schemas.openxmlformats.org/markup-compatibility/2006">
+              <mc:Choice xmlns:v="urn:schemas-microsoft-com:vml" Requires="v">
+                <p:oleObj name="Graph" r:id="rId4" imgW="3920760" imgH="3000960" progId="Origin95.Graph">
+                  <p:embed/>
+                </p:oleObj>
+              </mc:Choice>
+              <mc:Fallback>
+                <p:oleObj name="Graph" r:id="rId4" imgW="3920760" imgH="3000960" progId="Origin95.Graph">
+                  <p:embed/>
+                  <p:pic>
+                    <p:nvPicPr>
+                      <p:cNvPr id="0" name=""/>
+                      <p:cNvPicPr/>
+                      <p:nvPr/>
+                    </p:nvPicPr>
+                    <p:blipFill>
+                      <a:blip r:embed="rId5"/>
+                      <a:stretch>
+                        <a:fillRect/>
+                      </a:stretch>
+                    </p:blipFill>
+                    <p:spPr>
+                      <a:xfrm>
+                        <a:off x="6023231" y="1690688"/>
+                        <a:ext cx="6586668" cy="5040000"/>
+                      </a:xfrm>
+                      <a:prstGeom prst="rect">
+                        <a:avLst/>
+                      </a:prstGeom>
+                    </p:spPr>
+                  </p:pic>
+                </p:oleObj>
+              </mc:Fallback>
+            </mc:AlternateContent>
+          </a:graphicData>
+        </a:graphic>
+      </p:graphicFrame>
+    </p:spTree>
+    <p:extLst>
+      <p:ext uri="{BB962C8B-B14F-4D97-AF65-F5344CB8AC3E}">
+        <p14:creationId xmlns:p14="http://schemas.microsoft.com/office/powerpoint/2010/main" val="585529019"/>
+      </p:ext>
+    </p:extLst>
+  </p:cSld>
+  <p:clrMapOvr>
+    <a:masterClrMapping/>
+  </p:clrMapOvr>
+</p:sld>
+</file>
+
+<file path=ppt/slides/slide38.xml><?xml version="1.0" encoding="utf-8"?>
+<p:sld xmlns:a="http://schemas.openxmlformats.org/drawingml/2006/main" xmlns:r="http://schemas.openxmlformats.org/officeDocument/2006/relationships" xmlns:p="http://schemas.openxmlformats.org/presentationml/2006/main">
+  <p:cSld>
+    <p:spTree>
+      <p:nvGrpSpPr>
+        <p:cNvPr id="1" name=""/>
+        <p:cNvGrpSpPr/>
+        <p:nvPr/>
+      </p:nvGrpSpPr>
+      <p:grpSpPr>
+        <a:xfrm>
+          <a:off x="0" y="0"/>
+          <a:ext cx="0" cy="0"/>
+          <a:chOff x="0" y="0"/>
+          <a:chExt cx="0" cy="0"/>
+        </a:xfrm>
+      </p:grpSpPr>
+      <p:sp>
+        <p:nvSpPr>
+          <p:cNvPr id="2" name="Title 1">
+            <a:extLst>
+              <a:ext uri="{FF2B5EF4-FFF2-40B4-BE49-F238E27FC236}">
+                <a16:creationId xmlns:a16="http://schemas.microsoft.com/office/drawing/2014/main" id="{49C62D86-2295-E4B3-81FA-99FEAB30C232}"/>
+              </a:ext>
+            </a:extLst>
+          </p:cNvPr>
+          <p:cNvSpPr>
+            <a:spLocks noGrp="1"/>
+          </p:cNvSpPr>
+          <p:nvPr>
+            <p:ph type="title"/>
+          </p:nvPr>
+        </p:nvSpPr>
+        <p:spPr/>
+        <p:txBody>
+          <a:bodyPr/>
+          <a:lstStyle/>
+          <a:p>
+            <a:r>
+              <a:rPr lang="en-US" dirty="0"/>
+              <a:t>Sample7_device5</a:t>
+            </a:r>
+            <a:endParaRPr lang="ru-RU" dirty="0"/>
+          </a:p>
+        </p:txBody>
+      </p:sp>
+      <p:graphicFrame>
+        <p:nvGraphicFramePr>
+          <p:cNvPr id="3" name="Object 2">
+            <a:extLst>
+              <a:ext uri="{FF2B5EF4-FFF2-40B4-BE49-F238E27FC236}">
+                <a16:creationId xmlns:a16="http://schemas.microsoft.com/office/drawing/2014/main" id="{F7F28955-4394-5C9D-B1D0-710C27A28404}"/>
+              </a:ext>
+            </a:extLst>
+          </p:cNvPr>
+          <p:cNvGraphicFramePr>
+            <a:graphicFrameLocks noChangeAspect="1"/>
+          </p:cNvGraphicFramePr>
+          <p:nvPr>
+            <p:extLst>
+              <p:ext uri="{D42A27DB-BD31-4B8C-83A1-F6EECF244321}">
+                <p14:modId xmlns:p14="http://schemas.microsoft.com/office/powerpoint/2010/main" val="4111212811"/>
+              </p:ext>
+            </p:extLst>
+          </p:nvPr>
+        </p:nvGraphicFramePr>
+        <p:xfrm>
+          <a:off x="5605333" y="1690688"/>
+          <a:ext cx="6586667" cy="5040000"/>
+        </p:xfrm>
+        <a:graphic>
+          <a:graphicData uri="http://schemas.openxmlformats.org/presentationml/2006/ole">
+            <mc:AlternateContent xmlns:mc="http://schemas.openxmlformats.org/markup-compatibility/2006">
+              <mc:Choice xmlns:v="urn:schemas-microsoft-com:vml" Requires="v">
+                <p:oleObj name="Graph" r:id="rId2" imgW="3920760" imgH="3000960" progId="Origin95.Graph">
+                  <p:embed/>
+                </p:oleObj>
+              </mc:Choice>
+              <mc:Fallback>
+                <p:oleObj name="Graph" r:id="rId2" imgW="3920760" imgH="3000960" progId="Origin95.Graph">
+                  <p:embed/>
+                  <p:pic>
+                    <p:nvPicPr>
+                      <p:cNvPr id="0" name=""/>
+                      <p:cNvPicPr/>
+                      <p:nvPr/>
+                    </p:nvPicPr>
+                    <p:blipFill>
+                      <a:blip r:embed="rId3"/>
+                      <a:stretch>
+                        <a:fillRect/>
+                      </a:stretch>
+                    </p:blipFill>
+                    <p:spPr>
+                      <a:xfrm>
+                        <a:off x="5605333" y="1690688"/>
+                        <a:ext cx="6586667" cy="5040000"/>
+                      </a:xfrm>
+                      <a:prstGeom prst="rect">
+                        <a:avLst/>
+                      </a:prstGeom>
+                    </p:spPr>
+                  </p:pic>
+                </p:oleObj>
+              </mc:Fallback>
+            </mc:AlternateContent>
+          </a:graphicData>
+        </a:graphic>
+      </p:graphicFrame>
+    </p:spTree>
+    <p:extLst>
+      <p:ext uri="{BB962C8B-B14F-4D97-AF65-F5344CB8AC3E}">
+        <p14:creationId xmlns:p14="http://schemas.microsoft.com/office/powerpoint/2010/main" val="3801042066"/>
+      </p:ext>
+    </p:extLst>
+  </p:cSld>
+  <p:clrMapOvr>
+    <a:masterClrMapping/>
+  </p:clrMapOvr>
+</p:sld>
+</file>
+
+<file path=ppt/slides/slide39.xml><?xml version="1.0" encoding="utf-8"?>
+<p:sld xmlns:a="http://schemas.openxmlformats.org/drawingml/2006/main" xmlns:r="http://schemas.openxmlformats.org/officeDocument/2006/relationships" xmlns:p="http://schemas.openxmlformats.org/presentationml/2006/main">
+  <p:cSld>
+    <p:spTree>
+      <p:nvGrpSpPr>
+        <p:cNvPr id="1" name=""/>
+        <p:cNvGrpSpPr/>
+        <p:nvPr/>
+      </p:nvGrpSpPr>
+      <p:grpSpPr>
+        <a:xfrm>
+          <a:off x="0" y="0"/>
+          <a:ext cx="0" cy="0"/>
+          <a:chOff x="0" y="0"/>
+          <a:chExt cx="0" cy="0"/>
+        </a:xfrm>
+      </p:grpSpPr>
+      <p:sp>
+        <p:nvSpPr>
+          <p:cNvPr id="2" name="Title 1">
+            <a:extLst>
+              <a:ext uri="{FF2B5EF4-FFF2-40B4-BE49-F238E27FC236}">
+                <a16:creationId xmlns:a16="http://schemas.microsoft.com/office/drawing/2014/main" id="{1587E200-3A66-D1F7-14D1-0865F2FE4B79}"/>
+              </a:ext>
+            </a:extLst>
+          </p:cNvPr>
+          <p:cNvSpPr>
+            <a:spLocks noGrp="1"/>
+          </p:cNvSpPr>
+          <p:nvPr>
+            <p:ph type="ctrTitle"/>
+          </p:nvPr>
+        </p:nvSpPr>
+        <p:spPr/>
+        <p:txBody>
+          <a:bodyPr/>
+          <a:lstStyle/>
+          <a:p>
+            <a:r>
+              <a:rPr lang="en-US" dirty="0"/>
+              <a:t>Sample 8</a:t>
+            </a:r>
+            <a:endParaRPr lang="ru-RU" dirty="0"/>
+          </a:p>
+        </p:txBody>
+      </p:sp>
+      <p:sp>
+        <p:nvSpPr>
+          <p:cNvPr id="3" name="Subtitle 2">
+            <a:extLst>
+              <a:ext uri="{FF2B5EF4-FFF2-40B4-BE49-F238E27FC236}">
+                <a16:creationId xmlns:a16="http://schemas.microsoft.com/office/drawing/2014/main" id="{F9B88B6B-0CBA-CFFA-6B9C-8C56B8CAB928}"/>
+              </a:ext>
+            </a:extLst>
+          </p:cNvPr>
+          <p:cNvSpPr>
+            <a:spLocks noGrp="1"/>
+          </p:cNvSpPr>
+          <p:nvPr>
+            <p:ph type="subTitle" idx="1"/>
+          </p:nvPr>
+        </p:nvSpPr>
+        <p:spPr/>
+        <p:txBody>
+          <a:bodyPr/>
+          <a:lstStyle/>
+          <a:p>
+            <a:pPr marL="342900" indent="-342900">
+              <a:buFont typeface="Arial" panose="020B0604020202020204" pitchFamily="34" charset="0"/>
+              <a:buChar char="•"/>
+            </a:pPr>
+            <a:r>
+              <a:rPr lang="en-US" dirty="0"/>
+              <a:t>Sample8_device1 </a:t>
+            </a:r>
+            <a:r>
+              <a:rPr lang="en-US" dirty="0" err="1"/>
+              <a:t>th</a:t>
+            </a:r>
+            <a:r>
+              <a:rPr lang="en-US" dirty="0"/>
+              <a:t>=6.2±0.6 nm</a:t>
+            </a:r>
+            <a:endParaRPr lang="ru-RU" dirty="0"/>
+          </a:p>
+        </p:txBody>
+      </p:sp>
+    </p:spTree>
+    <p:extLst>
+      <p:ext uri="{BB962C8B-B14F-4D97-AF65-F5344CB8AC3E}">
+        <p14:creationId xmlns:p14="http://schemas.microsoft.com/office/powerpoint/2010/main" val="3715379034"/>
+      </p:ext>
+    </p:extLst>
+  </p:cSld>
+  <p:clrMapOvr>
+    <a:masterClrMapping/>
+  </p:clrMapOvr>
+</p:sld>
+</file>
+
 <file path=ppt/slides/slide4.xml><?xml version="1.0" encoding="utf-8"?>
 <p:sld xmlns:a="http://schemas.openxmlformats.org/drawingml/2006/main" xmlns:r="http://schemas.openxmlformats.org/officeDocument/2006/relationships" xmlns:p="http://schemas.openxmlformats.org/presentationml/2006/main">
   <p:cSld>
@@ -8337,6 +9058,376 @@
     <p:extLst>
       <p:ext uri="{BB962C8B-B14F-4D97-AF65-F5344CB8AC3E}">
         <p14:creationId xmlns:p14="http://schemas.microsoft.com/office/powerpoint/2010/main" val="3776721495"/>
+      </p:ext>
+    </p:extLst>
+  </p:cSld>
+  <p:clrMapOvr>
+    <a:masterClrMapping/>
+  </p:clrMapOvr>
+</p:sld>
+</file>
+
+<file path=ppt/slides/slide40.xml><?xml version="1.0" encoding="utf-8"?>
+<p:sld xmlns:a="http://schemas.openxmlformats.org/drawingml/2006/main" xmlns:r="http://schemas.openxmlformats.org/officeDocument/2006/relationships" xmlns:p="http://schemas.openxmlformats.org/presentationml/2006/main">
+  <p:cSld>
+    <p:spTree>
+      <p:nvGrpSpPr>
+        <p:cNvPr id="1" name=""/>
+        <p:cNvGrpSpPr/>
+        <p:nvPr/>
+      </p:nvGrpSpPr>
+      <p:grpSpPr>
+        <a:xfrm>
+          <a:off x="0" y="0"/>
+          <a:ext cx="0" cy="0"/>
+          <a:chOff x="0" y="0"/>
+          <a:chExt cx="0" cy="0"/>
+        </a:xfrm>
+      </p:grpSpPr>
+      <p:sp>
+        <p:nvSpPr>
+          <p:cNvPr id="2" name="Title 1">
+            <a:extLst>
+              <a:ext uri="{FF2B5EF4-FFF2-40B4-BE49-F238E27FC236}">
+                <a16:creationId xmlns:a16="http://schemas.microsoft.com/office/drawing/2014/main" id="{9268535C-F832-9993-577E-E8654E0340E1}"/>
+              </a:ext>
+            </a:extLst>
+          </p:cNvPr>
+          <p:cNvSpPr>
+            <a:spLocks noGrp="1"/>
+          </p:cNvSpPr>
+          <p:nvPr>
+            <p:ph type="title"/>
+          </p:nvPr>
+        </p:nvSpPr>
+        <p:spPr/>
+        <p:txBody>
+          <a:bodyPr/>
+          <a:lstStyle/>
+          <a:p>
+            <a:r>
+              <a:rPr lang="en-US" dirty="0"/>
+              <a:t>Sample8_device1</a:t>
+            </a:r>
+            <a:endParaRPr lang="ru-RU" dirty="0"/>
+          </a:p>
+        </p:txBody>
+      </p:sp>
+      <p:graphicFrame>
+        <p:nvGraphicFramePr>
+          <p:cNvPr id="3" name="Object 2">
+            <a:extLst>
+              <a:ext uri="{FF2B5EF4-FFF2-40B4-BE49-F238E27FC236}">
+                <a16:creationId xmlns:a16="http://schemas.microsoft.com/office/drawing/2014/main" id="{398A6DCE-9FD0-9A0C-FCEA-C26869AF2E50}"/>
+              </a:ext>
+            </a:extLst>
+          </p:cNvPr>
+          <p:cNvGraphicFramePr>
+            <a:graphicFrameLocks noChangeAspect="1"/>
+          </p:cNvGraphicFramePr>
+          <p:nvPr>
+            <p:extLst>
+              <p:ext uri="{D42A27DB-BD31-4B8C-83A1-F6EECF244321}">
+                <p14:modId xmlns:p14="http://schemas.microsoft.com/office/powerpoint/2010/main" val="754998549"/>
+              </p:ext>
+            </p:extLst>
+          </p:nvPr>
+        </p:nvGraphicFramePr>
+        <p:xfrm>
+          <a:off x="-121930" y="1690688"/>
+          <a:ext cx="6586667" cy="5040000"/>
+        </p:xfrm>
+        <a:graphic>
+          <a:graphicData uri="http://schemas.openxmlformats.org/presentationml/2006/ole">
+            <mc:AlternateContent xmlns:mc="http://schemas.openxmlformats.org/markup-compatibility/2006">
+              <mc:Choice xmlns:v="urn:schemas-microsoft-com:vml" Requires="v">
+                <p:oleObj name="Graph" r:id="rId2" imgW="3920760" imgH="3000960" progId="Origin95.Graph">
+                  <p:embed/>
+                </p:oleObj>
+              </mc:Choice>
+              <mc:Fallback>
+                <p:oleObj name="Graph" r:id="rId2" imgW="3920760" imgH="3000960" progId="Origin95.Graph">
+                  <p:embed/>
+                  <p:pic>
+                    <p:nvPicPr>
+                      <p:cNvPr id="0" name=""/>
+                      <p:cNvPicPr/>
+                      <p:nvPr/>
+                    </p:nvPicPr>
+                    <p:blipFill>
+                      <a:blip r:embed="rId3"/>
+                      <a:stretch>
+                        <a:fillRect/>
+                      </a:stretch>
+                    </p:blipFill>
+                    <p:spPr>
+                      <a:xfrm>
+                        <a:off x="-121930" y="1690688"/>
+                        <a:ext cx="6586667" cy="5040000"/>
+                      </a:xfrm>
+                      <a:prstGeom prst="rect">
+                        <a:avLst/>
+                      </a:prstGeom>
+                    </p:spPr>
+                  </p:pic>
+                </p:oleObj>
+              </mc:Fallback>
+            </mc:AlternateContent>
+          </a:graphicData>
+        </a:graphic>
+      </p:graphicFrame>
+      <p:graphicFrame>
+        <p:nvGraphicFramePr>
+          <p:cNvPr id="4" name="Object 3">
+            <a:extLst>
+              <a:ext uri="{FF2B5EF4-FFF2-40B4-BE49-F238E27FC236}">
+                <a16:creationId xmlns:a16="http://schemas.microsoft.com/office/drawing/2014/main" id="{80952371-21C1-920D-2D06-73FCE04D78E5}"/>
+              </a:ext>
+            </a:extLst>
+          </p:cNvPr>
+          <p:cNvGraphicFramePr>
+            <a:graphicFrameLocks noChangeAspect="1"/>
+          </p:cNvGraphicFramePr>
+          <p:nvPr>
+            <p:extLst>
+              <p:ext uri="{D42A27DB-BD31-4B8C-83A1-F6EECF244321}">
+                <p14:modId xmlns:p14="http://schemas.microsoft.com/office/powerpoint/2010/main" val="1217951093"/>
+              </p:ext>
+            </p:extLst>
+          </p:nvPr>
+        </p:nvGraphicFramePr>
+        <p:xfrm>
+          <a:off x="6239541" y="1690688"/>
+          <a:ext cx="6586667" cy="5040000"/>
+        </p:xfrm>
+        <a:graphic>
+          <a:graphicData uri="http://schemas.openxmlformats.org/presentationml/2006/ole">
+            <mc:AlternateContent xmlns:mc="http://schemas.openxmlformats.org/markup-compatibility/2006">
+              <mc:Choice xmlns:v="urn:schemas-microsoft-com:vml" Requires="v">
+                <p:oleObj name="Graph" r:id="rId4" imgW="3920760" imgH="3000960" progId="Origin95.Graph">
+                  <p:embed/>
+                </p:oleObj>
+              </mc:Choice>
+              <mc:Fallback>
+                <p:oleObj name="Graph" r:id="rId4" imgW="3920760" imgH="3000960" progId="Origin95.Graph">
+                  <p:embed/>
+                  <p:pic>
+                    <p:nvPicPr>
+                      <p:cNvPr id="0" name=""/>
+                      <p:cNvPicPr/>
+                      <p:nvPr/>
+                    </p:nvPicPr>
+                    <p:blipFill>
+                      <a:blip r:embed="rId5"/>
+                      <a:stretch>
+                        <a:fillRect/>
+                      </a:stretch>
+                    </p:blipFill>
+                    <p:spPr>
+                      <a:xfrm>
+                        <a:off x="6239541" y="1690688"/>
+                        <a:ext cx="6586667" cy="5040000"/>
+                      </a:xfrm>
+                      <a:prstGeom prst="rect">
+                        <a:avLst/>
+                      </a:prstGeom>
+                    </p:spPr>
+                  </p:pic>
+                </p:oleObj>
+              </mc:Fallback>
+            </mc:AlternateContent>
+          </a:graphicData>
+        </a:graphic>
+      </p:graphicFrame>
+    </p:spTree>
+    <p:extLst>
+      <p:ext uri="{BB962C8B-B14F-4D97-AF65-F5344CB8AC3E}">
+        <p14:creationId xmlns:p14="http://schemas.microsoft.com/office/powerpoint/2010/main" val="1059925983"/>
+      </p:ext>
+    </p:extLst>
+  </p:cSld>
+  <p:clrMapOvr>
+    <a:masterClrMapping/>
+  </p:clrMapOvr>
+</p:sld>
+</file>
+
+<file path=ppt/slides/slide41.xml><?xml version="1.0" encoding="utf-8"?>
+<p:sld xmlns:a="http://schemas.openxmlformats.org/drawingml/2006/main" xmlns:r="http://schemas.openxmlformats.org/officeDocument/2006/relationships" xmlns:p="http://schemas.openxmlformats.org/presentationml/2006/main">
+  <p:cSld>
+    <p:spTree>
+      <p:nvGrpSpPr>
+        <p:cNvPr id="1" name=""/>
+        <p:cNvGrpSpPr/>
+        <p:nvPr/>
+      </p:nvGrpSpPr>
+      <p:grpSpPr>
+        <a:xfrm>
+          <a:off x="0" y="0"/>
+          <a:ext cx="0" cy="0"/>
+          <a:chOff x="0" y="0"/>
+          <a:chExt cx="0" cy="0"/>
+        </a:xfrm>
+      </p:grpSpPr>
+      <p:sp>
+        <p:nvSpPr>
+          <p:cNvPr id="2" name="Title 1">
+            <a:extLst>
+              <a:ext uri="{FF2B5EF4-FFF2-40B4-BE49-F238E27FC236}">
+                <a16:creationId xmlns:a16="http://schemas.microsoft.com/office/drawing/2014/main" id="{71297F99-C6CE-E9D0-6276-2CC5EE127D08}"/>
+              </a:ext>
+            </a:extLst>
+          </p:cNvPr>
+          <p:cNvSpPr>
+            <a:spLocks noGrp="1"/>
+          </p:cNvSpPr>
+          <p:nvPr>
+            <p:ph type="title"/>
+          </p:nvPr>
+        </p:nvSpPr>
+        <p:spPr/>
+        <p:txBody>
+          <a:bodyPr/>
+          <a:lstStyle/>
+          <a:p>
+            <a:r>
+              <a:rPr lang="en-US" dirty="0"/>
+              <a:t>Sample8_device1</a:t>
+            </a:r>
+            <a:endParaRPr lang="ru-RU" dirty="0"/>
+          </a:p>
+        </p:txBody>
+      </p:sp>
+      <p:graphicFrame>
+        <p:nvGraphicFramePr>
+          <p:cNvPr id="3" name="Object 2">
+            <a:extLst>
+              <a:ext uri="{FF2B5EF4-FFF2-40B4-BE49-F238E27FC236}">
+                <a16:creationId xmlns:a16="http://schemas.microsoft.com/office/drawing/2014/main" id="{DDA3A069-11D0-C114-4CD1-4FF01277B27B}"/>
+              </a:ext>
+            </a:extLst>
+          </p:cNvPr>
+          <p:cNvGraphicFramePr>
+            <a:graphicFrameLocks noChangeAspect="1"/>
+          </p:cNvGraphicFramePr>
+          <p:nvPr>
+            <p:extLst>
+              <p:ext uri="{D42A27DB-BD31-4B8C-83A1-F6EECF244321}">
+                <p14:modId xmlns:p14="http://schemas.microsoft.com/office/powerpoint/2010/main" val="3349703088"/>
+              </p:ext>
+            </p:extLst>
+          </p:nvPr>
+        </p:nvGraphicFramePr>
+        <p:xfrm>
+          <a:off x="6015830" y="1690688"/>
+          <a:ext cx="6586667" cy="5040000"/>
+        </p:xfrm>
+        <a:graphic>
+          <a:graphicData uri="http://schemas.openxmlformats.org/presentationml/2006/ole">
+            <mc:AlternateContent xmlns:mc="http://schemas.openxmlformats.org/markup-compatibility/2006">
+              <mc:Choice xmlns:v="urn:schemas-microsoft-com:vml" Requires="v">
+                <p:oleObj name="Graph" r:id="rId2" imgW="3920760" imgH="3000960" progId="Origin95.Graph">
+                  <p:embed/>
+                </p:oleObj>
+              </mc:Choice>
+              <mc:Fallback>
+                <p:oleObj name="Graph" r:id="rId2" imgW="3920760" imgH="3000960" progId="Origin95.Graph">
+                  <p:embed/>
+                  <p:pic>
+                    <p:nvPicPr>
+                      <p:cNvPr id="0" name=""/>
+                      <p:cNvPicPr/>
+                      <p:nvPr/>
+                    </p:nvPicPr>
+                    <p:blipFill>
+                      <a:blip r:embed="rId3"/>
+                      <a:stretch>
+                        <a:fillRect/>
+                      </a:stretch>
+                    </p:blipFill>
+                    <p:spPr>
+                      <a:xfrm>
+                        <a:off x="6015830" y="1690688"/>
+                        <a:ext cx="6586667" cy="5040000"/>
+                      </a:xfrm>
+                      <a:prstGeom prst="rect">
+                        <a:avLst/>
+                      </a:prstGeom>
+                    </p:spPr>
+                  </p:pic>
+                </p:oleObj>
+              </mc:Fallback>
+            </mc:AlternateContent>
+          </a:graphicData>
+        </a:graphic>
+      </p:graphicFrame>
+      <p:graphicFrame>
+        <p:nvGraphicFramePr>
+          <p:cNvPr id="4" name="Object 3">
+            <a:extLst>
+              <a:ext uri="{FF2B5EF4-FFF2-40B4-BE49-F238E27FC236}">
+                <a16:creationId xmlns:a16="http://schemas.microsoft.com/office/drawing/2014/main" id="{6AE93ADB-DEAA-8E81-22B5-23C2E10D08BF}"/>
+              </a:ext>
+            </a:extLst>
+          </p:cNvPr>
+          <p:cNvGraphicFramePr>
+            <a:graphicFrameLocks noChangeAspect="1"/>
+          </p:cNvGraphicFramePr>
+          <p:nvPr>
+            <p:extLst>
+              <p:ext uri="{D42A27DB-BD31-4B8C-83A1-F6EECF244321}">
+                <p14:modId xmlns:p14="http://schemas.microsoft.com/office/powerpoint/2010/main" val="3521129307"/>
+              </p:ext>
+            </p:extLst>
+          </p:nvPr>
+        </p:nvGraphicFramePr>
+        <p:xfrm>
+          <a:off x="-410497" y="1690688"/>
+          <a:ext cx="6586667" cy="5040000"/>
+        </p:xfrm>
+        <a:graphic>
+          <a:graphicData uri="http://schemas.openxmlformats.org/presentationml/2006/ole">
+            <mc:AlternateContent xmlns:mc="http://schemas.openxmlformats.org/markup-compatibility/2006">
+              <mc:Choice xmlns:v="urn:schemas-microsoft-com:vml" Requires="v">
+                <p:oleObj name="Graph" r:id="rId4" imgW="3920760" imgH="3000960" progId="Origin95.Graph">
+                  <p:embed/>
+                </p:oleObj>
+              </mc:Choice>
+              <mc:Fallback>
+                <p:oleObj name="Graph" r:id="rId4" imgW="3920760" imgH="3000960" progId="Origin95.Graph">
+                  <p:embed/>
+                  <p:pic>
+                    <p:nvPicPr>
+                      <p:cNvPr id="0" name=""/>
+                      <p:cNvPicPr/>
+                      <p:nvPr/>
+                    </p:nvPicPr>
+                    <p:blipFill>
+                      <a:blip r:embed="rId5"/>
+                      <a:stretch>
+                        <a:fillRect/>
+                      </a:stretch>
+                    </p:blipFill>
+                    <p:spPr>
+                      <a:xfrm>
+                        <a:off x="-410497" y="1690688"/>
+                        <a:ext cx="6586667" cy="5040000"/>
+                      </a:xfrm>
+                      <a:prstGeom prst="rect">
+                        <a:avLst/>
+                      </a:prstGeom>
+                    </p:spPr>
+                  </p:pic>
+                </p:oleObj>
+              </mc:Fallback>
+            </mc:AlternateContent>
+          </a:graphicData>
+        </a:graphic>
+      </p:graphicFrame>
+    </p:spTree>
+    <p:extLst>
+      <p:ext uri="{BB962C8B-B14F-4D97-AF65-F5344CB8AC3E}">
+        <p14:creationId xmlns:p14="http://schemas.microsoft.com/office/powerpoint/2010/main" val="3270078502"/>
       </p:ext>
     </p:extLst>
   </p:cSld>

</xml_diff>

<commit_message>
09/11/2023 Sample 9 complete
</commit_message>
<xml_diff>
--- a/Mikhail Bandurist Transistors/Report_Electrical_Characterisation_batch2.pptx
+++ b/Mikhail Bandurist Transistors/Report_Electrical_Characterisation_batch2.pptx
@@ -5,7 +5,7 @@
     <p:sldMasterId id="2147483648" r:id="rId1"/>
   </p:sldMasterIdLst>
   <p:notesMasterIdLst>
-    <p:notesMasterId r:id="rId43"/>
+    <p:notesMasterId r:id="rId49"/>
   </p:notesMasterIdLst>
   <p:sldIdLst>
     <p:sldId id="256" r:id="rId2"/>
@@ -49,6 +49,12 @@
     <p:sldId id="294" r:id="rId40"/>
     <p:sldId id="295" r:id="rId41"/>
     <p:sldId id="296" r:id="rId42"/>
+    <p:sldId id="297" r:id="rId43"/>
+    <p:sldId id="298" r:id="rId44"/>
+    <p:sldId id="299" r:id="rId45"/>
+    <p:sldId id="300" r:id="rId46"/>
+    <p:sldId id="301" r:id="rId47"/>
+    <p:sldId id="302" r:id="rId48"/>
   </p:sldIdLst>
   <p:sldSz cx="12192000" cy="6858000"/>
   <p:notesSz cx="6858000" cy="9144000"/>
@@ -237,7 +243,7 @@
           <a:p>
             <a:fld id="{B96EF0F7-918A-4738-AB99-78B82970DF32}" type="datetimeFigureOut">
               <a:rPr lang="ru-RU" smtClean="0"/>
-              <a:t>08.11.2023</a:t>
+              <a:t>09.11.2023</a:t>
             </a:fld>
             <a:endParaRPr lang="ru-RU"/>
           </a:p>
@@ -738,7 +744,7 @@
           <a:p>
             <a:fld id="{9FDA9E9B-36F1-4FB7-8743-C1EA76B05336}" type="datetimeFigureOut">
               <a:rPr lang="ru-RU" smtClean="0"/>
-              <a:t>08.11.2023</a:t>
+              <a:t>09.11.2023</a:t>
             </a:fld>
             <a:endParaRPr lang="ru-RU"/>
           </a:p>
@@ -938,7 +944,7 @@
           <a:p>
             <a:fld id="{9FDA9E9B-36F1-4FB7-8743-C1EA76B05336}" type="datetimeFigureOut">
               <a:rPr lang="ru-RU" smtClean="0"/>
-              <a:t>08.11.2023</a:t>
+              <a:t>09.11.2023</a:t>
             </a:fld>
             <a:endParaRPr lang="ru-RU"/>
           </a:p>
@@ -1148,7 +1154,7 @@
           <a:p>
             <a:fld id="{9FDA9E9B-36F1-4FB7-8743-C1EA76B05336}" type="datetimeFigureOut">
               <a:rPr lang="ru-RU" smtClean="0"/>
-              <a:t>08.11.2023</a:t>
+              <a:t>09.11.2023</a:t>
             </a:fld>
             <a:endParaRPr lang="ru-RU"/>
           </a:p>
@@ -1348,7 +1354,7 @@
           <a:p>
             <a:fld id="{9FDA9E9B-36F1-4FB7-8743-C1EA76B05336}" type="datetimeFigureOut">
               <a:rPr lang="ru-RU" smtClean="0"/>
-              <a:t>08.11.2023</a:t>
+              <a:t>09.11.2023</a:t>
             </a:fld>
             <a:endParaRPr lang="ru-RU"/>
           </a:p>
@@ -1624,7 +1630,7 @@
           <a:p>
             <a:fld id="{9FDA9E9B-36F1-4FB7-8743-C1EA76B05336}" type="datetimeFigureOut">
               <a:rPr lang="ru-RU" smtClean="0"/>
-              <a:t>08.11.2023</a:t>
+              <a:t>09.11.2023</a:t>
             </a:fld>
             <a:endParaRPr lang="ru-RU"/>
           </a:p>
@@ -1892,7 +1898,7 @@
           <a:p>
             <a:fld id="{9FDA9E9B-36F1-4FB7-8743-C1EA76B05336}" type="datetimeFigureOut">
               <a:rPr lang="ru-RU" smtClean="0"/>
-              <a:t>08.11.2023</a:t>
+              <a:t>09.11.2023</a:t>
             </a:fld>
             <a:endParaRPr lang="ru-RU"/>
           </a:p>
@@ -2307,7 +2313,7 @@
           <a:p>
             <a:fld id="{9FDA9E9B-36F1-4FB7-8743-C1EA76B05336}" type="datetimeFigureOut">
               <a:rPr lang="ru-RU" smtClean="0"/>
-              <a:t>08.11.2023</a:t>
+              <a:t>09.11.2023</a:t>
             </a:fld>
             <a:endParaRPr lang="ru-RU"/>
           </a:p>
@@ -2449,7 +2455,7 @@
           <a:p>
             <a:fld id="{9FDA9E9B-36F1-4FB7-8743-C1EA76B05336}" type="datetimeFigureOut">
               <a:rPr lang="ru-RU" smtClean="0"/>
-              <a:t>08.11.2023</a:t>
+              <a:t>09.11.2023</a:t>
             </a:fld>
             <a:endParaRPr lang="ru-RU"/>
           </a:p>
@@ -2562,7 +2568,7 @@
           <a:p>
             <a:fld id="{9FDA9E9B-36F1-4FB7-8743-C1EA76B05336}" type="datetimeFigureOut">
               <a:rPr lang="ru-RU" smtClean="0"/>
-              <a:t>08.11.2023</a:t>
+              <a:t>09.11.2023</a:t>
             </a:fld>
             <a:endParaRPr lang="ru-RU"/>
           </a:p>
@@ -2875,7 +2881,7 @@
           <a:p>
             <a:fld id="{9FDA9E9B-36F1-4FB7-8743-C1EA76B05336}" type="datetimeFigureOut">
               <a:rPr lang="ru-RU" smtClean="0"/>
-              <a:t>08.11.2023</a:t>
+              <a:t>09.11.2023</a:t>
             </a:fld>
             <a:endParaRPr lang="ru-RU"/>
           </a:p>
@@ -3164,7 +3170,7 @@
           <a:p>
             <a:fld id="{9FDA9E9B-36F1-4FB7-8743-C1EA76B05336}" type="datetimeFigureOut">
               <a:rPr lang="ru-RU" smtClean="0"/>
-              <a:t>08.11.2023</a:t>
+              <a:t>09.11.2023</a:t>
             </a:fld>
             <a:endParaRPr lang="ru-RU"/>
           </a:p>
@@ -3407,7 +3413,7 @@
           <a:p>
             <a:fld id="{9FDA9E9B-36F1-4FB7-8743-C1EA76B05336}" type="datetimeFigureOut">
               <a:rPr lang="ru-RU" smtClean="0"/>
-              <a:t>08.11.2023</a:t>
+              <a:t>09.11.2023</a:t>
             </a:fld>
             <a:endParaRPr lang="ru-RU"/>
           </a:p>
@@ -9428,6 +9434,948 @@
     <p:extLst>
       <p:ext uri="{BB962C8B-B14F-4D97-AF65-F5344CB8AC3E}">
         <p14:creationId xmlns:p14="http://schemas.microsoft.com/office/powerpoint/2010/main" val="3270078502"/>
+      </p:ext>
+    </p:extLst>
+  </p:cSld>
+  <p:clrMapOvr>
+    <a:masterClrMapping/>
+  </p:clrMapOvr>
+</p:sld>
+</file>
+
+<file path=ppt/slides/slide42.xml><?xml version="1.0" encoding="utf-8"?>
+<p:sld xmlns:a="http://schemas.openxmlformats.org/drawingml/2006/main" xmlns:r="http://schemas.openxmlformats.org/officeDocument/2006/relationships" xmlns:p="http://schemas.openxmlformats.org/presentationml/2006/main">
+  <p:cSld>
+    <p:spTree>
+      <p:nvGrpSpPr>
+        <p:cNvPr id="1" name=""/>
+        <p:cNvGrpSpPr/>
+        <p:nvPr/>
+      </p:nvGrpSpPr>
+      <p:grpSpPr>
+        <a:xfrm>
+          <a:off x="0" y="0"/>
+          <a:ext cx="0" cy="0"/>
+          <a:chOff x="0" y="0"/>
+          <a:chExt cx="0" cy="0"/>
+        </a:xfrm>
+      </p:grpSpPr>
+      <p:sp>
+        <p:nvSpPr>
+          <p:cNvPr id="3" name="Title 2">
+            <a:extLst>
+              <a:ext uri="{FF2B5EF4-FFF2-40B4-BE49-F238E27FC236}">
+                <a16:creationId xmlns:a16="http://schemas.microsoft.com/office/drawing/2014/main" id="{F1C809F1-F463-DCDB-CFF2-383F3978FB79}"/>
+              </a:ext>
+            </a:extLst>
+          </p:cNvPr>
+          <p:cNvSpPr>
+            <a:spLocks noGrp="1"/>
+          </p:cNvSpPr>
+          <p:nvPr>
+            <p:ph type="ctrTitle"/>
+          </p:nvPr>
+        </p:nvSpPr>
+        <p:spPr/>
+        <p:txBody>
+          <a:bodyPr/>
+          <a:lstStyle/>
+          <a:p>
+            <a:r>
+              <a:rPr lang="en-US" dirty="0"/>
+              <a:t>Sample 9</a:t>
+            </a:r>
+            <a:endParaRPr lang="ru-RU" dirty="0"/>
+          </a:p>
+        </p:txBody>
+      </p:sp>
+      <p:sp>
+        <p:nvSpPr>
+          <p:cNvPr id="4" name="Subtitle 3">
+            <a:extLst>
+              <a:ext uri="{FF2B5EF4-FFF2-40B4-BE49-F238E27FC236}">
+                <a16:creationId xmlns:a16="http://schemas.microsoft.com/office/drawing/2014/main" id="{B646E9BC-8B02-EA13-F83D-8FC03B26DAE0}"/>
+              </a:ext>
+            </a:extLst>
+          </p:cNvPr>
+          <p:cNvSpPr>
+            <a:spLocks noGrp="1"/>
+          </p:cNvSpPr>
+          <p:nvPr>
+            <p:ph type="subTitle" idx="1"/>
+          </p:nvPr>
+        </p:nvSpPr>
+        <p:spPr/>
+        <p:txBody>
+          <a:bodyPr/>
+          <a:lstStyle/>
+          <a:p>
+            <a:pPr marL="342900" indent="-342900">
+              <a:buFont typeface="Arial" panose="020B0604020202020204" pitchFamily="34" charset="0"/>
+              <a:buChar char="•"/>
+            </a:pPr>
+            <a:r>
+              <a:rPr lang="en-US" dirty="0"/>
+              <a:t>Sample9_device2 </a:t>
+            </a:r>
+            <a:r>
+              <a:rPr lang="en-US" dirty="0" err="1"/>
+              <a:t>th</a:t>
+            </a:r>
+            <a:r>
+              <a:rPr lang="en-US" dirty="0"/>
+              <a:t>=7.8±0.7 nm</a:t>
+            </a:r>
+          </a:p>
+          <a:p>
+            <a:pPr marL="342900" indent="-342900">
+              <a:buFont typeface="Arial" panose="020B0604020202020204" pitchFamily="34" charset="0"/>
+              <a:buChar char="•"/>
+            </a:pPr>
+            <a:r>
+              <a:rPr lang="en-US" dirty="0"/>
+              <a:t>Sample9_device3 </a:t>
+            </a:r>
+            <a:r>
+              <a:rPr lang="en-US" dirty="0" err="1"/>
+              <a:t>th</a:t>
+            </a:r>
+            <a:r>
+              <a:rPr lang="en-US" dirty="0"/>
+              <a:t>=10.8±1.4 nm</a:t>
+            </a:r>
+            <a:endParaRPr lang="ru-RU" dirty="0"/>
+          </a:p>
+        </p:txBody>
+      </p:sp>
+    </p:spTree>
+    <p:extLst>
+      <p:ext uri="{BB962C8B-B14F-4D97-AF65-F5344CB8AC3E}">
+        <p14:creationId xmlns:p14="http://schemas.microsoft.com/office/powerpoint/2010/main" val="2425064591"/>
+      </p:ext>
+    </p:extLst>
+  </p:cSld>
+  <p:clrMapOvr>
+    <a:masterClrMapping/>
+  </p:clrMapOvr>
+</p:sld>
+</file>
+
+<file path=ppt/slides/slide43.xml><?xml version="1.0" encoding="utf-8"?>
+<p:sld xmlns:a="http://schemas.openxmlformats.org/drawingml/2006/main" xmlns:r="http://schemas.openxmlformats.org/officeDocument/2006/relationships" xmlns:p="http://schemas.openxmlformats.org/presentationml/2006/main">
+  <p:cSld>
+    <p:spTree>
+      <p:nvGrpSpPr>
+        <p:cNvPr id="1" name=""/>
+        <p:cNvGrpSpPr/>
+        <p:nvPr/>
+      </p:nvGrpSpPr>
+      <p:grpSpPr>
+        <a:xfrm>
+          <a:off x="0" y="0"/>
+          <a:ext cx="0" cy="0"/>
+          <a:chOff x="0" y="0"/>
+          <a:chExt cx="0" cy="0"/>
+        </a:xfrm>
+      </p:grpSpPr>
+      <p:sp>
+        <p:nvSpPr>
+          <p:cNvPr id="2" name="Title 1">
+            <a:extLst>
+              <a:ext uri="{FF2B5EF4-FFF2-40B4-BE49-F238E27FC236}">
+                <a16:creationId xmlns:a16="http://schemas.microsoft.com/office/drawing/2014/main" id="{D092411C-33C0-5EE7-F69D-E43264D902CB}"/>
+              </a:ext>
+            </a:extLst>
+          </p:cNvPr>
+          <p:cNvSpPr>
+            <a:spLocks noGrp="1"/>
+          </p:cNvSpPr>
+          <p:nvPr>
+            <p:ph type="title"/>
+          </p:nvPr>
+        </p:nvSpPr>
+        <p:spPr/>
+        <p:txBody>
+          <a:bodyPr/>
+          <a:lstStyle/>
+          <a:p>
+            <a:r>
+              <a:rPr lang="en-US" dirty="0"/>
+              <a:t>Sample9_device2</a:t>
+            </a:r>
+            <a:endParaRPr lang="ru-RU" dirty="0"/>
+          </a:p>
+        </p:txBody>
+      </p:sp>
+      <p:graphicFrame>
+        <p:nvGraphicFramePr>
+          <p:cNvPr id="3" name="Object 2">
+            <a:extLst>
+              <a:ext uri="{FF2B5EF4-FFF2-40B4-BE49-F238E27FC236}">
+                <a16:creationId xmlns:a16="http://schemas.microsoft.com/office/drawing/2014/main" id="{7394BDA9-7952-90D7-1064-B9500876D220}"/>
+              </a:ext>
+            </a:extLst>
+          </p:cNvPr>
+          <p:cNvGraphicFramePr>
+            <a:graphicFrameLocks noChangeAspect="1"/>
+          </p:cNvGraphicFramePr>
+          <p:nvPr>
+            <p:extLst>
+              <p:ext uri="{D42A27DB-BD31-4B8C-83A1-F6EECF244321}">
+                <p14:modId xmlns:p14="http://schemas.microsoft.com/office/powerpoint/2010/main" val="2447370191"/>
+              </p:ext>
+            </p:extLst>
+          </p:nvPr>
+        </p:nvGraphicFramePr>
+        <p:xfrm>
+          <a:off x="-245806" y="1690688"/>
+          <a:ext cx="6586667" cy="5040000"/>
+        </p:xfrm>
+        <a:graphic>
+          <a:graphicData uri="http://schemas.openxmlformats.org/presentationml/2006/ole">
+            <mc:AlternateContent xmlns:mc="http://schemas.openxmlformats.org/markup-compatibility/2006">
+              <mc:Choice xmlns:v="urn:schemas-microsoft-com:vml" Requires="v">
+                <p:oleObj name="Graph" r:id="rId2" imgW="3920760" imgH="3000960" progId="Origin95.Graph">
+                  <p:embed/>
+                </p:oleObj>
+              </mc:Choice>
+              <mc:Fallback>
+                <p:oleObj name="Graph" r:id="rId2" imgW="3920760" imgH="3000960" progId="Origin95.Graph">
+                  <p:embed/>
+                  <p:pic>
+                    <p:nvPicPr>
+                      <p:cNvPr id="0" name=""/>
+                      <p:cNvPicPr/>
+                      <p:nvPr/>
+                    </p:nvPicPr>
+                    <p:blipFill>
+                      <a:blip r:embed="rId3"/>
+                      <a:stretch>
+                        <a:fillRect/>
+                      </a:stretch>
+                    </p:blipFill>
+                    <p:spPr>
+                      <a:xfrm>
+                        <a:off x="-245806" y="1690688"/>
+                        <a:ext cx="6586667" cy="5040000"/>
+                      </a:xfrm>
+                      <a:prstGeom prst="rect">
+                        <a:avLst/>
+                      </a:prstGeom>
+                    </p:spPr>
+                  </p:pic>
+                </p:oleObj>
+              </mc:Fallback>
+            </mc:AlternateContent>
+          </a:graphicData>
+        </a:graphic>
+      </p:graphicFrame>
+      <p:graphicFrame>
+        <p:nvGraphicFramePr>
+          <p:cNvPr id="4" name="Object 3">
+            <a:extLst>
+              <a:ext uri="{FF2B5EF4-FFF2-40B4-BE49-F238E27FC236}">
+                <a16:creationId xmlns:a16="http://schemas.microsoft.com/office/drawing/2014/main" id="{8570317E-AAEE-A2E8-7EA2-12991A7A0DDE}"/>
+              </a:ext>
+            </a:extLst>
+          </p:cNvPr>
+          <p:cNvGraphicFramePr>
+            <a:graphicFrameLocks noChangeAspect="1"/>
+          </p:cNvGraphicFramePr>
+          <p:nvPr>
+            <p:extLst>
+              <p:ext uri="{D42A27DB-BD31-4B8C-83A1-F6EECF244321}">
+                <p14:modId xmlns:p14="http://schemas.microsoft.com/office/powerpoint/2010/main" val="1894599127"/>
+              </p:ext>
+            </p:extLst>
+          </p:nvPr>
+        </p:nvGraphicFramePr>
+        <p:xfrm>
+          <a:off x="6007509" y="1690688"/>
+          <a:ext cx="6586667" cy="5040000"/>
+        </p:xfrm>
+        <a:graphic>
+          <a:graphicData uri="http://schemas.openxmlformats.org/presentationml/2006/ole">
+            <mc:AlternateContent xmlns:mc="http://schemas.openxmlformats.org/markup-compatibility/2006">
+              <mc:Choice xmlns:v="urn:schemas-microsoft-com:vml" Requires="v">
+                <p:oleObj name="Graph" r:id="rId4" imgW="3920760" imgH="3000960" progId="Origin95.Graph">
+                  <p:embed/>
+                </p:oleObj>
+              </mc:Choice>
+              <mc:Fallback>
+                <p:oleObj name="Graph" r:id="rId4" imgW="3920760" imgH="3000960" progId="Origin95.Graph">
+                  <p:embed/>
+                  <p:pic>
+                    <p:nvPicPr>
+                      <p:cNvPr id="0" name=""/>
+                      <p:cNvPicPr/>
+                      <p:nvPr/>
+                    </p:nvPicPr>
+                    <p:blipFill>
+                      <a:blip r:embed="rId5"/>
+                      <a:stretch>
+                        <a:fillRect/>
+                      </a:stretch>
+                    </p:blipFill>
+                    <p:spPr>
+                      <a:xfrm>
+                        <a:off x="6007509" y="1690688"/>
+                        <a:ext cx="6586667" cy="5040000"/>
+                      </a:xfrm>
+                      <a:prstGeom prst="rect">
+                        <a:avLst/>
+                      </a:prstGeom>
+                    </p:spPr>
+                  </p:pic>
+                </p:oleObj>
+              </mc:Fallback>
+            </mc:AlternateContent>
+          </a:graphicData>
+        </a:graphic>
+      </p:graphicFrame>
+    </p:spTree>
+    <p:extLst>
+      <p:ext uri="{BB962C8B-B14F-4D97-AF65-F5344CB8AC3E}">
+        <p14:creationId xmlns:p14="http://schemas.microsoft.com/office/powerpoint/2010/main" val="3878557010"/>
+      </p:ext>
+    </p:extLst>
+  </p:cSld>
+  <p:clrMapOvr>
+    <a:masterClrMapping/>
+  </p:clrMapOvr>
+</p:sld>
+</file>
+
+<file path=ppt/slides/slide44.xml><?xml version="1.0" encoding="utf-8"?>
+<p:sld xmlns:a="http://schemas.openxmlformats.org/drawingml/2006/main" xmlns:r="http://schemas.openxmlformats.org/officeDocument/2006/relationships" xmlns:p="http://schemas.openxmlformats.org/presentationml/2006/main">
+  <p:cSld>
+    <p:spTree>
+      <p:nvGrpSpPr>
+        <p:cNvPr id="1" name=""/>
+        <p:cNvGrpSpPr/>
+        <p:nvPr/>
+      </p:nvGrpSpPr>
+      <p:grpSpPr>
+        <a:xfrm>
+          <a:off x="0" y="0"/>
+          <a:ext cx="0" cy="0"/>
+          <a:chOff x="0" y="0"/>
+          <a:chExt cx="0" cy="0"/>
+        </a:xfrm>
+      </p:grpSpPr>
+      <p:sp>
+        <p:nvSpPr>
+          <p:cNvPr id="2" name="Title 1">
+            <a:extLst>
+              <a:ext uri="{FF2B5EF4-FFF2-40B4-BE49-F238E27FC236}">
+                <a16:creationId xmlns:a16="http://schemas.microsoft.com/office/drawing/2014/main" id="{DD43FD41-A734-08FF-93A0-1BF69B0AC75F}"/>
+              </a:ext>
+            </a:extLst>
+          </p:cNvPr>
+          <p:cNvSpPr>
+            <a:spLocks noGrp="1"/>
+          </p:cNvSpPr>
+          <p:nvPr>
+            <p:ph type="title"/>
+          </p:nvPr>
+        </p:nvSpPr>
+        <p:spPr/>
+        <p:txBody>
+          <a:bodyPr/>
+          <a:lstStyle/>
+          <a:p>
+            <a:r>
+              <a:rPr lang="en-US" dirty="0"/>
+              <a:t>Sample9_device2</a:t>
+            </a:r>
+            <a:endParaRPr lang="ru-RU" dirty="0"/>
+          </a:p>
+        </p:txBody>
+      </p:sp>
+      <p:graphicFrame>
+        <p:nvGraphicFramePr>
+          <p:cNvPr id="3" name="Object 2">
+            <a:extLst>
+              <a:ext uri="{FF2B5EF4-FFF2-40B4-BE49-F238E27FC236}">
+                <a16:creationId xmlns:a16="http://schemas.microsoft.com/office/drawing/2014/main" id="{6C749EA1-D7BC-6186-EE02-03B98113F678}"/>
+              </a:ext>
+            </a:extLst>
+          </p:cNvPr>
+          <p:cNvGraphicFramePr>
+            <a:graphicFrameLocks noChangeAspect="1"/>
+          </p:cNvGraphicFramePr>
+          <p:nvPr>
+            <p:extLst>
+              <p:ext uri="{D42A27DB-BD31-4B8C-83A1-F6EECF244321}">
+                <p14:modId xmlns:p14="http://schemas.microsoft.com/office/powerpoint/2010/main" val="2911653721"/>
+              </p:ext>
+            </p:extLst>
+          </p:nvPr>
+        </p:nvGraphicFramePr>
+        <p:xfrm>
+          <a:off x="6096000" y="1690688"/>
+          <a:ext cx="6586667" cy="5040000"/>
+        </p:xfrm>
+        <a:graphic>
+          <a:graphicData uri="http://schemas.openxmlformats.org/presentationml/2006/ole">
+            <mc:AlternateContent xmlns:mc="http://schemas.openxmlformats.org/markup-compatibility/2006">
+              <mc:Choice xmlns:v="urn:schemas-microsoft-com:vml" Requires="v">
+                <p:oleObj name="Graph" r:id="rId2" imgW="3920760" imgH="3000960" progId="Origin95.Graph">
+                  <p:embed/>
+                </p:oleObj>
+              </mc:Choice>
+              <mc:Fallback>
+                <p:oleObj name="Graph" r:id="rId2" imgW="3920760" imgH="3000960" progId="Origin95.Graph">
+                  <p:embed/>
+                  <p:pic>
+                    <p:nvPicPr>
+                      <p:cNvPr id="0" name=""/>
+                      <p:cNvPicPr/>
+                      <p:nvPr/>
+                    </p:nvPicPr>
+                    <p:blipFill>
+                      <a:blip r:embed="rId3"/>
+                      <a:stretch>
+                        <a:fillRect/>
+                      </a:stretch>
+                    </p:blipFill>
+                    <p:spPr>
+                      <a:xfrm>
+                        <a:off x="6096000" y="1690688"/>
+                        <a:ext cx="6586667" cy="5040000"/>
+                      </a:xfrm>
+                      <a:prstGeom prst="rect">
+                        <a:avLst/>
+                      </a:prstGeom>
+                    </p:spPr>
+                  </p:pic>
+                </p:oleObj>
+              </mc:Fallback>
+            </mc:AlternateContent>
+          </a:graphicData>
+        </a:graphic>
+      </p:graphicFrame>
+      <p:graphicFrame>
+        <p:nvGraphicFramePr>
+          <p:cNvPr id="4" name="Object 3">
+            <a:extLst>
+              <a:ext uri="{FF2B5EF4-FFF2-40B4-BE49-F238E27FC236}">
+                <a16:creationId xmlns:a16="http://schemas.microsoft.com/office/drawing/2014/main" id="{ECEBFC73-26CE-651C-44B4-1EEB5DB15CA7}"/>
+              </a:ext>
+            </a:extLst>
+          </p:cNvPr>
+          <p:cNvGraphicFramePr>
+            <a:graphicFrameLocks noChangeAspect="1"/>
+          </p:cNvGraphicFramePr>
+          <p:nvPr>
+            <p:extLst>
+              <p:ext uri="{D42A27DB-BD31-4B8C-83A1-F6EECF244321}">
+                <p14:modId xmlns:p14="http://schemas.microsoft.com/office/powerpoint/2010/main" val="3736532060"/>
+              </p:ext>
+            </p:extLst>
+          </p:nvPr>
+        </p:nvGraphicFramePr>
+        <p:xfrm>
+          <a:off x="-338239" y="1690688"/>
+          <a:ext cx="6586667" cy="5040000"/>
+        </p:xfrm>
+        <a:graphic>
+          <a:graphicData uri="http://schemas.openxmlformats.org/presentationml/2006/ole">
+            <mc:AlternateContent xmlns:mc="http://schemas.openxmlformats.org/markup-compatibility/2006">
+              <mc:Choice xmlns:v="urn:schemas-microsoft-com:vml" Requires="v">
+                <p:oleObj name="Graph" r:id="rId4" imgW="3920760" imgH="3000960" progId="Origin95.Graph">
+                  <p:embed/>
+                </p:oleObj>
+              </mc:Choice>
+              <mc:Fallback>
+                <p:oleObj name="Graph" r:id="rId4" imgW="3920760" imgH="3000960" progId="Origin95.Graph">
+                  <p:embed/>
+                  <p:pic>
+                    <p:nvPicPr>
+                      <p:cNvPr id="0" name=""/>
+                      <p:cNvPicPr/>
+                      <p:nvPr/>
+                    </p:nvPicPr>
+                    <p:blipFill>
+                      <a:blip r:embed="rId5"/>
+                      <a:stretch>
+                        <a:fillRect/>
+                      </a:stretch>
+                    </p:blipFill>
+                    <p:spPr>
+                      <a:xfrm>
+                        <a:off x="-338239" y="1690688"/>
+                        <a:ext cx="6586667" cy="5040000"/>
+                      </a:xfrm>
+                      <a:prstGeom prst="rect">
+                        <a:avLst/>
+                      </a:prstGeom>
+                    </p:spPr>
+                  </p:pic>
+                </p:oleObj>
+              </mc:Fallback>
+            </mc:AlternateContent>
+          </a:graphicData>
+        </a:graphic>
+      </p:graphicFrame>
+    </p:spTree>
+    <p:extLst>
+      <p:ext uri="{BB962C8B-B14F-4D97-AF65-F5344CB8AC3E}">
+        <p14:creationId xmlns:p14="http://schemas.microsoft.com/office/powerpoint/2010/main" val="3454581935"/>
+      </p:ext>
+    </p:extLst>
+  </p:cSld>
+  <p:clrMapOvr>
+    <a:masterClrMapping/>
+  </p:clrMapOvr>
+</p:sld>
+</file>
+
+<file path=ppt/slides/slide45.xml><?xml version="1.0" encoding="utf-8"?>
+<p:sld xmlns:a="http://schemas.openxmlformats.org/drawingml/2006/main" xmlns:r="http://schemas.openxmlformats.org/officeDocument/2006/relationships" xmlns:p="http://schemas.openxmlformats.org/presentationml/2006/main">
+  <p:cSld>
+    <p:spTree>
+      <p:nvGrpSpPr>
+        <p:cNvPr id="1" name=""/>
+        <p:cNvGrpSpPr/>
+        <p:nvPr/>
+      </p:nvGrpSpPr>
+      <p:grpSpPr>
+        <a:xfrm>
+          <a:off x="0" y="0"/>
+          <a:ext cx="0" cy="0"/>
+          <a:chOff x="0" y="0"/>
+          <a:chExt cx="0" cy="0"/>
+        </a:xfrm>
+      </p:grpSpPr>
+      <p:sp>
+        <p:nvSpPr>
+          <p:cNvPr id="2" name="Title 1">
+            <a:extLst>
+              <a:ext uri="{FF2B5EF4-FFF2-40B4-BE49-F238E27FC236}">
+                <a16:creationId xmlns:a16="http://schemas.microsoft.com/office/drawing/2014/main" id="{5E6EAB93-0E16-B903-423E-3FD813A1FC4F}"/>
+              </a:ext>
+            </a:extLst>
+          </p:cNvPr>
+          <p:cNvSpPr>
+            <a:spLocks noGrp="1"/>
+          </p:cNvSpPr>
+          <p:nvPr>
+            <p:ph type="title"/>
+          </p:nvPr>
+        </p:nvSpPr>
+        <p:spPr/>
+        <p:txBody>
+          <a:bodyPr/>
+          <a:lstStyle/>
+          <a:p>
+            <a:r>
+              <a:rPr lang="en-US" dirty="0"/>
+              <a:t>Sample9_device3</a:t>
+            </a:r>
+            <a:endParaRPr lang="ru-RU" dirty="0"/>
+          </a:p>
+        </p:txBody>
+      </p:sp>
+      <p:graphicFrame>
+        <p:nvGraphicFramePr>
+          <p:cNvPr id="3" name="Object 2">
+            <a:extLst>
+              <a:ext uri="{FF2B5EF4-FFF2-40B4-BE49-F238E27FC236}">
+                <a16:creationId xmlns:a16="http://schemas.microsoft.com/office/drawing/2014/main" id="{13566640-6EA3-C72B-9046-770B3477591D}"/>
+              </a:ext>
+            </a:extLst>
+          </p:cNvPr>
+          <p:cNvGraphicFramePr>
+            <a:graphicFrameLocks noChangeAspect="1"/>
+          </p:cNvGraphicFramePr>
+          <p:nvPr>
+            <p:extLst>
+              <p:ext uri="{D42A27DB-BD31-4B8C-83A1-F6EECF244321}">
+                <p14:modId xmlns:p14="http://schemas.microsoft.com/office/powerpoint/2010/main" val="1526143519"/>
+              </p:ext>
+            </p:extLst>
+          </p:nvPr>
+        </p:nvGraphicFramePr>
+        <p:xfrm>
+          <a:off x="-304800" y="1690688"/>
+          <a:ext cx="6586667" cy="5040000"/>
+        </p:xfrm>
+        <a:graphic>
+          <a:graphicData uri="http://schemas.openxmlformats.org/presentationml/2006/ole">
+            <mc:AlternateContent xmlns:mc="http://schemas.openxmlformats.org/markup-compatibility/2006">
+              <mc:Choice xmlns:v="urn:schemas-microsoft-com:vml" Requires="v">
+                <p:oleObj name="Graph" r:id="rId2" imgW="3920760" imgH="3000960" progId="Origin95.Graph">
+                  <p:embed/>
+                </p:oleObj>
+              </mc:Choice>
+              <mc:Fallback>
+                <p:oleObj name="Graph" r:id="rId2" imgW="3920760" imgH="3000960" progId="Origin95.Graph">
+                  <p:embed/>
+                  <p:pic>
+                    <p:nvPicPr>
+                      <p:cNvPr id="0" name=""/>
+                      <p:cNvPicPr/>
+                      <p:nvPr/>
+                    </p:nvPicPr>
+                    <p:blipFill>
+                      <a:blip r:embed="rId3"/>
+                      <a:stretch>
+                        <a:fillRect/>
+                      </a:stretch>
+                    </p:blipFill>
+                    <p:spPr>
+                      <a:xfrm>
+                        <a:off x="-304800" y="1690688"/>
+                        <a:ext cx="6586667" cy="5040000"/>
+                      </a:xfrm>
+                      <a:prstGeom prst="rect">
+                        <a:avLst/>
+                      </a:prstGeom>
+                    </p:spPr>
+                  </p:pic>
+                </p:oleObj>
+              </mc:Fallback>
+            </mc:AlternateContent>
+          </a:graphicData>
+        </a:graphic>
+      </p:graphicFrame>
+      <p:graphicFrame>
+        <p:nvGraphicFramePr>
+          <p:cNvPr id="5" name="Object 4">
+            <a:extLst>
+              <a:ext uri="{FF2B5EF4-FFF2-40B4-BE49-F238E27FC236}">
+                <a16:creationId xmlns:a16="http://schemas.microsoft.com/office/drawing/2014/main" id="{E8540A66-2B76-2D72-8213-F3CB3A7DD8F6}"/>
+              </a:ext>
+            </a:extLst>
+          </p:cNvPr>
+          <p:cNvGraphicFramePr>
+            <a:graphicFrameLocks noChangeAspect="1"/>
+          </p:cNvGraphicFramePr>
+          <p:nvPr>
+            <p:extLst>
+              <p:ext uri="{D42A27DB-BD31-4B8C-83A1-F6EECF244321}">
+                <p14:modId xmlns:p14="http://schemas.microsoft.com/office/powerpoint/2010/main" val="2197701039"/>
+              </p:ext>
+            </p:extLst>
+          </p:nvPr>
+        </p:nvGraphicFramePr>
+        <p:xfrm>
+          <a:off x="6096000" y="1818000"/>
+          <a:ext cx="6586667" cy="5040000"/>
+        </p:xfrm>
+        <a:graphic>
+          <a:graphicData uri="http://schemas.openxmlformats.org/presentationml/2006/ole">
+            <mc:AlternateContent xmlns:mc="http://schemas.openxmlformats.org/markup-compatibility/2006">
+              <mc:Choice xmlns:v="urn:schemas-microsoft-com:vml" Requires="v">
+                <p:oleObj name="Graph" r:id="rId4" imgW="3920760" imgH="3000960" progId="Origin95.Graph">
+                  <p:embed/>
+                </p:oleObj>
+              </mc:Choice>
+              <mc:Fallback>
+                <p:oleObj name="Graph" r:id="rId4" imgW="3920760" imgH="3000960" progId="Origin95.Graph">
+                  <p:embed/>
+                  <p:pic>
+                    <p:nvPicPr>
+                      <p:cNvPr id="0" name=""/>
+                      <p:cNvPicPr/>
+                      <p:nvPr/>
+                    </p:nvPicPr>
+                    <p:blipFill>
+                      <a:blip r:embed="rId5"/>
+                      <a:stretch>
+                        <a:fillRect/>
+                      </a:stretch>
+                    </p:blipFill>
+                    <p:spPr>
+                      <a:xfrm>
+                        <a:off x="6096000" y="1818000"/>
+                        <a:ext cx="6586667" cy="5040000"/>
+                      </a:xfrm>
+                      <a:prstGeom prst="rect">
+                        <a:avLst/>
+                      </a:prstGeom>
+                    </p:spPr>
+                  </p:pic>
+                </p:oleObj>
+              </mc:Fallback>
+            </mc:AlternateContent>
+          </a:graphicData>
+        </a:graphic>
+      </p:graphicFrame>
+    </p:spTree>
+    <p:extLst>
+      <p:ext uri="{BB962C8B-B14F-4D97-AF65-F5344CB8AC3E}">
+        <p14:creationId xmlns:p14="http://schemas.microsoft.com/office/powerpoint/2010/main" val="1882346453"/>
+      </p:ext>
+    </p:extLst>
+  </p:cSld>
+  <p:clrMapOvr>
+    <a:masterClrMapping/>
+  </p:clrMapOvr>
+</p:sld>
+</file>
+
+<file path=ppt/slides/slide46.xml><?xml version="1.0" encoding="utf-8"?>
+<p:sld xmlns:a="http://schemas.openxmlformats.org/drawingml/2006/main" xmlns:r="http://schemas.openxmlformats.org/officeDocument/2006/relationships" xmlns:p="http://schemas.openxmlformats.org/presentationml/2006/main">
+  <p:cSld>
+    <p:spTree>
+      <p:nvGrpSpPr>
+        <p:cNvPr id="1" name=""/>
+        <p:cNvGrpSpPr/>
+        <p:nvPr/>
+      </p:nvGrpSpPr>
+      <p:grpSpPr>
+        <a:xfrm>
+          <a:off x="0" y="0"/>
+          <a:ext cx="0" cy="0"/>
+          <a:chOff x="0" y="0"/>
+          <a:chExt cx="0" cy="0"/>
+        </a:xfrm>
+      </p:grpSpPr>
+      <p:sp>
+        <p:nvSpPr>
+          <p:cNvPr id="2" name="Title 1">
+            <a:extLst>
+              <a:ext uri="{FF2B5EF4-FFF2-40B4-BE49-F238E27FC236}">
+                <a16:creationId xmlns:a16="http://schemas.microsoft.com/office/drawing/2014/main" id="{FAC7124C-CD7A-3A5E-4733-3EF8CDCE0F46}"/>
+              </a:ext>
+            </a:extLst>
+          </p:cNvPr>
+          <p:cNvSpPr>
+            <a:spLocks noGrp="1"/>
+          </p:cNvSpPr>
+          <p:nvPr>
+            <p:ph type="title"/>
+          </p:nvPr>
+        </p:nvSpPr>
+        <p:spPr/>
+        <p:txBody>
+          <a:bodyPr/>
+          <a:lstStyle/>
+          <a:p>
+            <a:r>
+              <a:rPr lang="en-US" dirty="0"/>
+              <a:t>Sample9_device3</a:t>
+            </a:r>
+            <a:endParaRPr lang="ru-RU" dirty="0"/>
+          </a:p>
+        </p:txBody>
+      </p:sp>
+      <p:graphicFrame>
+        <p:nvGraphicFramePr>
+          <p:cNvPr id="3" name="Object 2">
+            <a:extLst>
+              <a:ext uri="{FF2B5EF4-FFF2-40B4-BE49-F238E27FC236}">
+                <a16:creationId xmlns:a16="http://schemas.microsoft.com/office/drawing/2014/main" id="{307419F4-DC3B-24D0-B486-3C9690EAFA61}"/>
+              </a:ext>
+            </a:extLst>
+          </p:cNvPr>
+          <p:cNvGraphicFramePr>
+            <a:graphicFrameLocks noChangeAspect="1"/>
+          </p:cNvGraphicFramePr>
+          <p:nvPr>
+            <p:extLst>
+              <p:ext uri="{D42A27DB-BD31-4B8C-83A1-F6EECF244321}">
+                <p14:modId xmlns:p14="http://schemas.microsoft.com/office/powerpoint/2010/main" val="2825632604"/>
+              </p:ext>
+            </p:extLst>
+          </p:nvPr>
+        </p:nvGraphicFramePr>
+        <p:xfrm>
+          <a:off x="6096000" y="1690688"/>
+          <a:ext cx="6586667" cy="5040000"/>
+        </p:xfrm>
+        <a:graphic>
+          <a:graphicData uri="http://schemas.openxmlformats.org/presentationml/2006/ole">
+            <mc:AlternateContent xmlns:mc="http://schemas.openxmlformats.org/markup-compatibility/2006">
+              <mc:Choice xmlns:v="urn:schemas-microsoft-com:vml" Requires="v">
+                <p:oleObj name="Graph" r:id="rId2" imgW="3920760" imgH="3000960" progId="Origin95.Graph">
+                  <p:embed/>
+                </p:oleObj>
+              </mc:Choice>
+              <mc:Fallback>
+                <p:oleObj name="Graph" r:id="rId2" imgW="3920760" imgH="3000960" progId="Origin95.Graph">
+                  <p:embed/>
+                  <p:pic>
+                    <p:nvPicPr>
+                      <p:cNvPr id="0" name=""/>
+                      <p:cNvPicPr/>
+                      <p:nvPr/>
+                    </p:nvPicPr>
+                    <p:blipFill>
+                      <a:blip r:embed="rId3"/>
+                      <a:stretch>
+                        <a:fillRect/>
+                      </a:stretch>
+                    </p:blipFill>
+                    <p:spPr>
+                      <a:xfrm>
+                        <a:off x="6096000" y="1690688"/>
+                        <a:ext cx="6586667" cy="5040000"/>
+                      </a:xfrm>
+                      <a:prstGeom prst="rect">
+                        <a:avLst/>
+                      </a:prstGeom>
+                    </p:spPr>
+                  </p:pic>
+                </p:oleObj>
+              </mc:Fallback>
+            </mc:AlternateContent>
+          </a:graphicData>
+        </a:graphic>
+      </p:graphicFrame>
+      <p:graphicFrame>
+        <p:nvGraphicFramePr>
+          <p:cNvPr id="4" name="Object 3">
+            <a:extLst>
+              <a:ext uri="{FF2B5EF4-FFF2-40B4-BE49-F238E27FC236}">
+                <a16:creationId xmlns:a16="http://schemas.microsoft.com/office/drawing/2014/main" id="{508F38EB-869B-B5F5-D00B-8347E888D7C6}"/>
+              </a:ext>
+            </a:extLst>
+          </p:cNvPr>
+          <p:cNvGraphicFramePr>
+            <a:graphicFrameLocks noChangeAspect="1"/>
+          </p:cNvGraphicFramePr>
+          <p:nvPr>
+            <p:extLst>
+              <p:ext uri="{D42A27DB-BD31-4B8C-83A1-F6EECF244321}">
+                <p14:modId xmlns:p14="http://schemas.microsoft.com/office/powerpoint/2010/main" val="4217155309"/>
+              </p:ext>
+            </p:extLst>
+          </p:nvPr>
+        </p:nvGraphicFramePr>
+        <p:xfrm>
+          <a:off x="-357905" y="1690688"/>
+          <a:ext cx="6586667" cy="5040000"/>
+        </p:xfrm>
+        <a:graphic>
+          <a:graphicData uri="http://schemas.openxmlformats.org/presentationml/2006/ole">
+            <mc:AlternateContent xmlns:mc="http://schemas.openxmlformats.org/markup-compatibility/2006">
+              <mc:Choice xmlns:v="urn:schemas-microsoft-com:vml" Requires="v">
+                <p:oleObj name="Graph" r:id="rId4" imgW="3920760" imgH="3000960" progId="Origin95.Graph">
+                  <p:embed/>
+                </p:oleObj>
+              </mc:Choice>
+              <mc:Fallback>
+                <p:oleObj name="Graph" r:id="rId4" imgW="3920760" imgH="3000960" progId="Origin95.Graph">
+                  <p:embed/>
+                  <p:pic>
+                    <p:nvPicPr>
+                      <p:cNvPr id="0" name=""/>
+                      <p:cNvPicPr/>
+                      <p:nvPr/>
+                    </p:nvPicPr>
+                    <p:blipFill>
+                      <a:blip r:embed="rId5"/>
+                      <a:stretch>
+                        <a:fillRect/>
+                      </a:stretch>
+                    </p:blipFill>
+                    <p:spPr>
+                      <a:xfrm>
+                        <a:off x="-357905" y="1690688"/>
+                        <a:ext cx="6586667" cy="5040000"/>
+                      </a:xfrm>
+                      <a:prstGeom prst="rect">
+                        <a:avLst/>
+                      </a:prstGeom>
+                    </p:spPr>
+                  </p:pic>
+                </p:oleObj>
+              </mc:Fallback>
+            </mc:AlternateContent>
+          </a:graphicData>
+        </a:graphic>
+      </p:graphicFrame>
+    </p:spTree>
+    <p:extLst>
+      <p:ext uri="{BB962C8B-B14F-4D97-AF65-F5344CB8AC3E}">
+        <p14:creationId xmlns:p14="http://schemas.microsoft.com/office/powerpoint/2010/main" val="826439209"/>
+      </p:ext>
+    </p:extLst>
+  </p:cSld>
+  <p:clrMapOvr>
+    <a:masterClrMapping/>
+  </p:clrMapOvr>
+</p:sld>
+</file>
+
+<file path=ppt/slides/slide47.xml><?xml version="1.0" encoding="utf-8"?>
+<p:sld xmlns:a="http://schemas.openxmlformats.org/drawingml/2006/main" xmlns:r="http://schemas.openxmlformats.org/officeDocument/2006/relationships" xmlns:p="http://schemas.openxmlformats.org/presentationml/2006/main">
+  <p:cSld>
+    <p:spTree>
+      <p:nvGrpSpPr>
+        <p:cNvPr id="1" name=""/>
+        <p:cNvGrpSpPr/>
+        <p:nvPr/>
+      </p:nvGrpSpPr>
+      <p:grpSpPr>
+        <a:xfrm>
+          <a:off x="0" y="0"/>
+          <a:ext cx="0" cy="0"/>
+          <a:chOff x="0" y="0"/>
+          <a:chExt cx="0" cy="0"/>
+        </a:xfrm>
+      </p:grpSpPr>
+      <p:sp>
+        <p:nvSpPr>
+          <p:cNvPr id="2" name="Title 1">
+            <a:extLst>
+              <a:ext uri="{FF2B5EF4-FFF2-40B4-BE49-F238E27FC236}">
+                <a16:creationId xmlns:a16="http://schemas.microsoft.com/office/drawing/2014/main" id="{2EFE9B77-49A0-96FE-A0F6-82698CAF0C7E}"/>
+              </a:ext>
+            </a:extLst>
+          </p:cNvPr>
+          <p:cNvSpPr>
+            <a:spLocks noGrp="1"/>
+          </p:cNvSpPr>
+          <p:nvPr>
+            <p:ph type="ctrTitle"/>
+          </p:nvPr>
+        </p:nvSpPr>
+        <p:spPr/>
+        <p:txBody>
+          <a:bodyPr/>
+          <a:lstStyle/>
+          <a:p>
+            <a:r>
+              <a:rPr lang="en-US"/>
+              <a:t>Sample 10</a:t>
+            </a:r>
+            <a:endParaRPr lang="ru-RU"/>
+          </a:p>
+        </p:txBody>
+      </p:sp>
+      <p:sp>
+        <p:nvSpPr>
+          <p:cNvPr id="3" name="Subtitle 2">
+            <a:extLst>
+              <a:ext uri="{FF2B5EF4-FFF2-40B4-BE49-F238E27FC236}">
+                <a16:creationId xmlns:a16="http://schemas.microsoft.com/office/drawing/2014/main" id="{BE9EB1C6-EAED-AFF4-58A2-C99F394363AD}"/>
+              </a:ext>
+            </a:extLst>
+          </p:cNvPr>
+          <p:cNvSpPr>
+            <a:spLocks noGrp="1"/>
+          </p:cNvSpPr>
+          <p:nvPr>
+            <p:ph type="subTitle" idx="1"/>
+          </p:nvPr>
+        </p:nvSpPr>
+        <p:spPr/>
+        <p:txBody>
+          <a:bodyPr/>
+          <a:lstStyle/>
+          <a:p>
+            <a:endParaRPr lang="ru-RU"/>
+          </a:p>
+        </p:txBody>
+      </p:sp>
+    </p:spTree>
+    <p:extLst>
+      <p:ext uri="{BB962C8B-B14F-4D97-AF65-F5344CB8AC3E}">
+        <p14:creationId xmlns:p14="http://schemas.microsoft.com/office/powerpoint/2010/main" val="2382548945"/>
       </p:ext>
     </p:extLst>
   </p:cSld>

</xml_diff>

<commit_message>
10/11/2023 Sample 10 complete
</commit_message>
<xml_diff>
--- a/Mikhail Bandurist Transistors/Report_Electrical_Characterisation_batch2.pptx
+++ b/Mikhail Bandurist Transistors/Report_Electrical_Characterisation_batch2.pptx
@@ -5,7 +5,7 @@
     <p:sldMasterId id="2147483648" r:id="rId1"/>
   </p:sldMasterIdLst>
   <p:notesMasterIdLst>
-    <p:notesMasterId r:id="rId49"/>
+    <p:notesMasterId r:id="rId59"/>
   </p:notesMasterIdLst>
   <p:sldIdLst>
     <p:sldId id="256" r:id="rId2"/>
@@ -55,6 +55,16 @@
     <p:sldId id="300" r:id="rId46"/>
     <p:sldId id="301" r:id="rId47"/>
     <p:sldId id="302" r:id="rId48"/>
+    <p:sldId id="303" r:id="rId49"/>
+    <p:sldId id="307" r:id="rId50"/>
+    <p:sldId id="304" r:id="rId51"/>
+    <p:sldId id="305" r:id="rId52"/>
+    <p:sldId id="306" r:id="rId53"/>
+    <p:sldId id="308" r:id="rId54"/>
+    <p:sldId id="309" r:id="rId55"/>
+    <p:sldId id="310" r:id="rId56"/>
+    <p:sldId id="311" r:id="rId57"/>
+    <p:sldId id="312" r:id="rId58"/>
   </p:sldIdLst>
   <p:sldSz cx="12192000" cy="6858000"/>
   <p:notesSz cx="6858000" cy="9144000"/>
@@ -10340,10 +10350,10 @@
           <a:lstStyle/>
           <a:p>
             <a:r>
-              <a:rPr lang="en-US"/>
+              <a:rPr lang="en-US" dirty="0"/>
               <a:t>Sample 10</a:t>
             </a:r>
-            <a:endParaRPr lang="ru-RU"/>
+            <a:endParaRPr lang="ru-RU" dirty="0"/>
           </a:p>
         </p:txBody>
       </p:sp>
@@ -10361,6 +10371,151 @@
           </p:cNvSpPr>
           <p:nvPr>
             <p:ph type="subTitle" idx="1"/>
+          </p:nvPr>
+        </p:nvSpPr>
+        <p:spPr/>
+        <p:txBody>
+          <a:bodyPr>
+            <a:normAutofit fontScale="77500" lnSpcReduction="20000"/>
+          </a:bodyPr>
+          <a:lstStyle/>
+          <a:p>
+            <a:pPr marL="342900" indent="-342900">
+              <a:buFont typeface="Arial" panose="020B0604020202020204" pitchFamily="34" charset="0"/>
+              <a:buChar char="•"/>
+            </a:pPr>
+            <a:r>
+              <a:rPr lang="en-US" dirty="0"/>
+              <a:t>Sample10_device1 </a:t>
+            </a:r>
+            <a:r>
+              <a:rPr lang="en-US" dirty="0" err="1"/>
+              <a:t>th</a:t>
+            </a:r>
+            <a:r>
+              <a:rPr lang="en-US" dirty="0"/>
+              <a:t>=3.9±0.5 nm</a:t>
+            </a:r>
+          </a:p>
+          <a:p>
+            <a:pPr marL="342900" indent="-342900">
+              <a:buFont typeface="Arial" panose="020B0604020202020204" pitchFamily="34" charset="0"/>
+              <a:buChar char="•"/>
+            </a:pPr>
+            <a:r>
+              <a:rPr lang="en-US" dirty="0"/>
+              <a:t>Sample10_device2 </a:t>
+            </a:r>
+            <a:r>
+              <a:rPr lang="en-US" dirty="0" err="1"/>
+              <a:t>th</a:t>
+            </a:r>
+            <a:r>
+              <a:rPr lang="en-US" dirty="0"/>
+              <a:t>=2.6±0.3 nm</a:t>
+            </a:r>
+          </a:p>
+          <a:p>
+            <a:pPr marL="342900" indent="-342900">
+              <a:buFont typeface="Arial" panose="020B0604020202020204" pitchFamily="34" charset="0"/>
+              <a:buChar char="•"/>
+            </a:pPr>
+            <a:r>
+              <a:rPr lang="en-US" dirty="0"/>
+              <a:t>Sample10_device3 </a:t>
+            </a:r>
+            <a:r>
+              <a:rPr lang="en-US" dirty="0" err="1"/>
+              <a:t>th</a:t>
+            </a:r>
+            <a:r>
+              <a:rPr lang="en-US" dirty="0"/>
+              <a:t>=8.7±0.4 nm</a:t>
+            </a:r>
+          </a:p>
+          <a:p>
+            <a:pPr marL="342900" indent="-342900">
+              <a:buFont typeface="Arial" panose="020B0604020202020204" pitchFamily="34" charset="0"/>
+              <a:buChar char="•"/>
+            </a:pPr>
+            <a:r>
+              <a:rPr lang="en-US" dirty="0"/>
+              <a:t>Sample10_device5 </a:t>
+            </a:r>
+            <a:r>
+              <a:rPr lang="en-US" dirty="0" err="1"/>
+              <a:t>th</a:t>
+            </a:r>
+            <a:r>
+              <a:rPr lang="en-US" dirty="0"/>
+              <a:t>=8.0±0.5 nm</a:t>
+            </a:r>
+          </a:p>
+          <a:p>
+            <a:pPr marL="342900" indent="-342900">
+              <a:buFont typeface="Arial" panose="020B0604020202020204" pitchFamily="34" charset="0"/>
+              <a:buChar char="•"/>
+            </a:pPr>
+            <a:r>
+              <a:rPr lang="en-US" dirty="0"/>
+              <a:t>Sample10_device6 </a:t>
+            </a:r>
+            <a:r>
+              <a:rPr lang="en-US" dirty="0" err="1"/>
+              <a:t>th</a:t>
+            </a:r>
+            <a:r>
+              <a:rPr lang="en-US" dirty="0"/>
+              <a:t>=9.4±0.5 nm</a:t>
+            </a:r>
+            <a:endParaRPr lang="ru-RU" dirty="0"/>
+          </a:p>
+        </p:txBody>
+      </p:sp>
+    </p:spTree>
+    <p:extLst>
+      <p:ext uri="{BB962C8B-B14F-4D97-AF65-F5344CB8AC3E}">
+        <p14:creationId xmlns:p14="http://schemas.microsoft.com/office/powerpoint/2010/main" val="2382548945"/>
+      </p:ext>
+    </p:extLst>
+  </p:cSld>
+  <p:clrMapOvr>
+    <a:masterClrMapping/>
+  </p:clrMapOvr>
+</p:sld>
+</file>
+
+<file path=ppt/slides/slide48.xml><?xml version="1.0" encoding="utf-8"?>
+<p:sld xmlns:a="http://schemas.openxmlformats.org/drawingml/2006/main" xmlns:r="http://schemas.openxmlformats.org/officeDocument/2006/relationships" xmlns:p="http://schemas.openxmlformats.org/presentationml/2006/main">
+  <p:cSld>
+    <p:spTree>
+      <p:nvGrpSpPr>
+        <p:cNvPr id="1" name=""/>
+        <p:cNvGrpSpPr/>
+        <p:nvPr/>
+      </p:nvGrpSpPr>
+      <p:grpSpPr>
+        <a:xfrm>
+          <a:off x="0" y="0"/>
+          <a:ext cx="0" cy="0"/>
+          <a:chOff x="0" y="0"/>
+          <a:chExt cx="0" cy="0"/>
+        </a:xfrm>
+      </p:grpSpPr>
+      <p:sp>
+        <p:nvSpPr>
+          <p:cNvPr id="2" name="Title 1">
+            <a:extLst>
+              <a:ext uri="{FF2B5EF4-FFF2-40B4-BE49-F238E27FC236}">
+                <a16:creationId xmlns:a16="http://schemas.microsoft.com/office/drawing/2014/main" id="{0B8EFE2D-9171-F39F-CF14-3D9F93746172}"/>
+              </a:ext>
+            </a:extLst>
+          </p:cNvPr>
+          <p:cNvSpPr>
+            <a:spLocks noGrp="1"/>
+          </p:cNvSpPr>
+          <p:nvPr>
+            <p:ph type="title"/>
           </p:nvPr>
         </p:nvSpPr>
         <p:spPr/>
@@ -10368,14 +10523,203 @@
           <a:bodyPr/>
           <a:lstStyle/>
           <a:p>
-            <a:endParaRPr lang="ru-RU"/>
+            <a:r>
+              <a:rPr lang="en-US" dirty="0"/>
+              <a:t>Sample10_device1</a:t>
+            </a:r>
+            <a:endParaRPr lang="ru-RU" dirty="0"/>
           </a:p>
         </p:txBody>
       </p:sp>
+      <p:graphicFrame>
+        <p:nvGraphicFramePr>
+          <p:cNvPr id="4" name="Object 3">
+            <a:extLst>
+              <a:ext uri="{FF2B5EF4-FFF2-40B4-BE49-F238E27FC236}">
+                <a16:creationId xmlns:a16="http://schemas.microsoft.com/office/drawing/2014/main" id="{B0C37874-2151-7AAA-6692-1F3A28FB2EB5}"/>
+              </a:ext>
+            </a:extLst>
+          </p:cNvPr>
+          <p:cNvGraphicFramePr>
+            <a:graphicFrameLocks noChangeAspect="1"/>
+          </p:cNvGraphicFramePr>
+          <p:nvPr>
+            <p:extLst>
+              <p:ext uri="{D42A27DB-BD31-4B8C-83A1-F6EECF244321}">
+                <p14:modId xmlns:p14="http://schemas.microsoft.com/office/powerpoint/2010/main" val="2738044199"/>
+              </p:ext>
+            </p:extLst>
+          </p:nvPr>
+        </p:nvGraphicFramePr>
+        <p:xfrm>
+          <a:off x="-397233" y="1690688"/>
+          <a:ext cx="6586667" cy="5040000"/>
+        </p:xfrm>
+        <a:graphic>
+          <a:graphicData uri="http://schemas.openxmlformats.org/presentationml/2006/ole">
+            <mc:AlternateContent xmlns:mc="http://schemas.openxmlformats.org/markup-compatibility/2006">
+              <mc:Choice xmlns:v="urn:schemas-microsoft-com:vml" Requires="v">
+                <p:oleObj name="Graph" r:id="rId2" imgW="3920760" imgH="3000960" progId="Origin95.Graph">
+                  <p:embed/>
+                </p:oleObj>
+              </mc:Choice>
+              <mc:Fallback>
+                <p:oleObj name="Graph" r:id="rId2" imgW="3920760" imgH="3000960" progId="Origin95.Graph">
+                  <p:embed/>
+                  <p:pic>
+                    <p:nvPicPr>
+                      <p:cNvPr id="0" name=""/>
+                      <p:cNvPicPr/>
+                      <p:nvPr/>
+                    </p:nvPicPr>
+                    <p:blipFill>
+                      <a:blip r:embed="rId3"/>
+                      <a:stretch>
+                        <a:fillRect/>
+                      </a:stretch>
+                    </p:blipFill>
+                    <p:spPr>
+                      <a:xfrm>
+                        <a:off x="-397233" y="1690688"/>
+                        <a:ext cx="6586667" cy="5040000"/>
+                      </a:xfrm>
+                      <a:prstGeom prst="rect">
+                        <a:avLst/>
+                      </a:prstGeom>
+                    </p:spPr>
+                  </p:pic>
+                </p:oleObj>
+              </mc:Fallback>
+            </mc:AlternateContent>
+          </a:graphicData>
+        </a:graphic>
+      </p:graphicFrame>
+      <p:graphicFrame>
+        <p:nvGraphicFramePr>
+          <p:cNvPr id="5" name="Object 4">
+            <a:extLst>
+              <a:ext uri="{FF2B5EF4-FFF2-40B4-BE49-F238E27FC236}">
+                <a16:creationId xmlns:a16="http://schemas.microsoft.com/office/drawing/2014/main" id="{0A3CA9AD-C794-F6A9-3082-1F17D9D7D492}"/>
+              </a:ext>
+            </a:extLst>
+          </p:cNvPr>
+          <p:cNvGraphicFramePr>
+            <a:graphicFrameLocks noChangeAspect="1"/>
+          </p:cNvGraphicFramePr>
+          <p:nvPr>
+            <p:extLst>
+              <p:ext uri="{D42A27DB-BD31-4B8C-83A1-F6EECF244321}">
+                <p14:modId xmlns:p14="http://schemas.microsoft.com/office/powerpoint/2010/main" val="2963246928"/>
+              </p:ext>
+            </p:extLst>
+          </p:nvPr>
+        </p:nvGraphicFramePr>
+        <p:xfrm>
+          <a:off x="6189434" y="1690688"/>
+          <a:ext cx="6586667" cy="5040000"/>
+        </p:xfrm>
+        <a:graphic>
+          <a:graphicData uri="http://schemas.openxmlformats.org/presentationml/2006/ole">
+            <mc:AlternateContent xmlns:mc="http://schemas.openxmlformats.org/markup-compatibility/2006">
+              <mc:Choice xmlns:v="urn:schemas-microsoft-com:vml" Requires="v">
+                <p:oleObj name="Graph" r:id="rId4" imgW="3920760" imgH="3000960" progId="Origin95.Graph">
+                  <p:embed/>
+                </p:oleObj>
+              </mc:Choice>
+              <mc:Fallback>
+                <p:oleObj name="Graph" r:id="rId4" imgW="3920760" imgH="3000960" progId="Origin95.Graph">
+                  <p:embed/>
+                  <p:pic>
+                    <p:nvPicPr>
+                      <p:cNvPr id="0" name=""/>
+                      <p:cNvPicPr/>
+                      <p:nvPr/>
+                    </p:nvPicPr>
+                    <p:blipFill>
+                      <a:blip r:embed="rId5"/>
+                      <a:stretch>
+                        <a:fillRect/>
+                      </a:stretch>
+                    </p:blipFill>
+                    <p:spPr>
+                      <a:xfrm>
+                        <a:off x="6189434" y="1690688"/>
+                        <a:ext cx="6586667" cy="5040000"/>
+                      </a:xfrm>
+                      <a:prstGeom prst="rect">
+                        <a:avLst/>
+                      </a:prstGeom>
+                    </p:spPr>
+                  </p:pic>
+                </p:oleObj>
+              </mc:Fallback>
+            </mc:AlternateContent>
+          </a:graphicData>
+        </a:graphic>
+      </p:graphicFrame>
     </p:spTree>
     <p:extLst>
       <p:ext uri="{BB962C8B-B14F-4D97-AF65-F5344CB8AC3E}">
-        <p14:creationId xmlns:p14="http://schemas.microsoft.com/office/powerpoint/2010/main" val="2382548945"/>
+        <p14:creationId xmlns:p14="http://schemas.microsoft.com/office/powerpoint/2010/main" val="3950344780"/>
+      </p:ext>
+    </p:extLst>
+  </p:cSld>
+  <p:clrMapOvr>
+    <a:masterClrMapping/>
+  </p:clrMapOvr>
+</p:sld>
+</file>
+
+<file path=ppt/slides/slide49.xml><?xml version="1.0" encoding="utf-8"?>
+<p:sld xmlns:a="http://schemas.openxmlformats.org/drawingml/2006/main" xmlns:r="http://schemas.openxmlformats.org/officeDocument/2006/relationships" xmlns:p="http://schemas.openxmlformats.org/presentationml/2006/main">
+  <p:cSld>
+    <p:spTree>
+      <p:nvGrpSpPr>
+        <p:cNvPr id="1" name=""/>
+        <p:cNvGrpSpPr/>
+        <p:nvPr/>
+      </p:nvGrpSpPr>
+      <p:grpSpPr>
+        <a:xfrm>
+          <a:off x="0" y="0"/>
+          <a:ext cx="0" cy="0"/>
+          <a:chOff x="0" y="0"/>
+          <a:chExt cx="0" cy="0"/>
+        </a:xfrm>
+      </p:grpSpPr>
+      <p:sp>
+        <p:nvSpPr>
+          <p:cNvPr id="2" name="Title 1">
+            <a:extLst>
+              <a:ext uri="{FF2B5EF4-FFF2-40B4-BE49-F238E27FC236}">
+                <a16:creationId xmlns:a16="http://schemas.microsoft.com/office/drawing/2014/main" id="{7E7B06DE-FFD2-7B83-55B4-00EBFD63281C}"/>
+              </a:ext>
+            </a:extLst>
+          </p:cNvPr>
+          <p:cNvSpPr>
+            <a:spLocks noGrp="1"/>
+          </p:cNvSpPr>
+          <p:nvPr>
+            <p:ph type="title"/>
+          </p:nvPr>
+        </p:nvSpPr>
+        <p:spPr/>
+        <p:txBody>
+          <a:bodyPr/>
+          <a:lstStyle/>
+          <a:p>
+            <a:r>
+              <a:rPr lang="en-US" dirty="0"/>
+              <a:t>Sample10_device1</a:t>
+            </a:r>
+            <a:endParaRPr lang="ru-RU" dirty="0"/>
+          </a:p>
+        </p:txBody>
+      </p:sp>
+    </p:spTree>
+    <p:extLst>
+      <p:ext uri="{BB962C8B-B14F-4D97-AF65-F5344CB8AC3E}">
+        <p14:creationId xmlns:p14="http://schemas.microsoft.com/office/powerpoint/2010/main" val="3642353712"/>
       </p:ext>
     </p:extLst>
   </p:cSld>
@@ -10561,6 +10905,1360 @@
     <p:extLst>
       <p:ext uri="{BB962C8B-B14F-4D97-AF65-F5344CB8AC3E}">
         <p14:creationId xmlns:p14="http://schemas.microsoft.com/office/powerpoint/2010/main" val="185370358"/>
+      </p:ext>
+    </p:extLst>
+  </p:cSld>
+  <p:clrMapOvr>
+    <a:masterClrMapping/>
+  </p:clrMapOvr>
+</p:sld>
+</file>
+
+<file path=ppt/slides/slide50.xml><?xml version="1.0" encoding="utf-8"?>
+<p:sld xmlns:a="http://schemas.openxmlformats.org/drawingml/2006/main" xmlns:r="http://schemas.openxmlformats.org/officeDocument/2006/relationships" xmlns:p="http://schemas.openxmlformats.org/presentationml/2006/main">
+  <p:cSld>
+    <p:spTree>
+      <p:nvGrpSpPr>
+        <p:cNvPr id="1" name=""/>
+        <p:cNvGrpSpPr/>
+        <p:nvPr/>
+      </p:nvGrpSpPr>
+      <p:grpSpPr>
+        <a:xfrm>
+          <a:off x="0" y="0"/>
+          <a:ext cx="0" cy="0"/>
+          <a:chOff x="0" y="0"/>
+          <a:chExt cx="0" cy="0"/>
+        </a:xfrm>
+      </p:grpSpPr>
+      <p:sp>
+        <p:nvSpPr>
+          <p:cNvPr id="2" name="Title 1">
+            <a:extLst>
+              <a:ext uri="{FF2B5EF4-FFF2-40B4-BE49-F238E27FC236}">
+                <a16:creationId xmlns:a16="http://schemas.microsoft.com/office/drawing/2014/main" id="{C037A02D-8723-5618-E51B-3D38AF203B5C}"/>
+              </a:ext>
+            </a:extLst>
+          </p:cNvPr>
+          <p:cNvSpPr>
+            <a:spLocks noGrp="1"/>
+          </p:cNvSpPr>
+          <p:nvPr>
+            <p:ph type="title"/>
+          </p:nvPr>
+        </p:nvSpPr>
+        <p:spPr/>
+        <p:txBody>
+          <a:bodyPr/>
+          <a:lstStyle/>
+          <a:p>
+            <a:r>
+              <a:rPr lang="en-US" dirty="0"/>
+              <a:t>Sample10_device2</a:t>
+            </a:r>
+            <a:endParaRPr lang="ru-RU" dirty="0"/>
+          </a:p>
+        </p:txBody>
+      </p:sp>
+      <p:graphicFrame>
+        <p:nvGraphicFramePr>
+          <p:cNvPr id="3" name="Object 2">
+            <a:extLst>
+              <a:ext uri="{FF2B5EF4-FFF2-40B4-BE49-F238E27FC236}">
+                <a16:creationId xmlns:a16="http://schemas.microsoft.com/office/drawing/2014/main" id="{BA09FA9F-F58F-A3EB-9ED4-5A57F8A9C01C}"/>
+              </a:ext>
+            </a:extLst>
+          </p:cNvPr>
+          <p:cNvGraphicFramePr>
+            <a:graphicFrameLocks noChangeAspect="1"/>
+          </p:cNvGraphicFramePr>
+          <p:nvPr>
+            <p:extLst>
+              <p:ext uri="{D42A27DB-BD31-4B8C-83A1-F6EECF244321}">
+                <p14:modId xmlns:p14="http://schemas.microsoft.com/office/powerpoint/2010/main" val="4083299453"/>
+              </p:ext>
+            </p:extLst>
+          </p:nvPr>
+        </p:nvGraphicFramePr>
+        <p:xfrm>
+          <a:off x="-220252" y="1690688"/>
+          <a:ext cx="6586667" cy="5040000"/>
+        </p:xfrm>
+        <a:graphic>
+          <a:graphicData uri="http://schemas.openxmlformats.org/presentationml/2006/ole">
+            <mc:AlternateContent xmlns:mc="http://schemas.openxmlformats.org/markup-compatibility/2006">
+              <mc:Choice xmlns:v="urn:schemas-microsoft-com:vml" Requires="v">
+                <p:oleObj name="Graph" r:id="rId2" imgW="3920760" imgH="3000960" progId="Origin95.Graph">
+                  <p:embed/>
+                </p:oleObj>
+              </mc:Choice>
+              <mc:Fallback>
+                <p:oleObj name="Graph" r:id="rId2" imgW="3920760" imgH="3000960" progId="Origin95.Graph">
+                  <p:embed/>
+                  <p:pic>
+                    <p:nvPicPr>
+                      <p:cNvPr id="0" name=""/>
+                      <p:cNvPicPr/>
+                      <p:nvPr/>
+                    </p:nvPicPr>
+                    <p:blipFill>
+                      <a:blip r:embed="rId3"/>
+                      <a:stretch>
+                        <a:fillRect/>
+                      </a:stretch>
+                    </p:blipFill>
+                    <p:spPr>
+                      <a:xfrm>
+                        <a:off x="-220252" y="1690688"/>
+                        <a:ext cx="6586667" cy="5040000"/>
+                      </a:xfrm>
+                      <a:prstGeom prst="rect">
+                        <a:avLst/>
+                      </a:prstGeom>
+                    </p:spPr>
+                  </p:pic>
+                </p:oleObj>
+              </mc:Fallback>
+            </mc:AlternateContent>
+          </a:graphicData>
+        </a:graphic>
+      </p:graphicFrame>
+      <p:graphicFrame>
+        <p:nvGraphicFramePr>
+          <p:cNvPr id="4" name="Object 3">
+            <a:extLst>
+              <a:ext uri="{FF2B5EF4-FFF2-40B4-BE49-F238E27FC236}">
+                <a16:creationId xmlns:a16="http://schemas.microsoft.com/office/drawing/2014/main" id="{D07D9B86-51F2-8F1B-576E-43487CBF03BA}"/>
+              </a:ext>
+            </a:extLst>
+          </p:cNvPr>
+          <p:cNvGraphicFramePr>
+            <a:graphicFrameLocks noChangeAspect="1"/>
+          </p:cNvGraphicFramePr>
+          <p:nvPr>
+            <p:extLst>
+              <p:ext uri="{D42A27DB-BD31-4B8C-83A1-F6EECF244321}">
+                <p14:modId xmlns:p14="http://schemas.microsoft.com/office/powerpoint/2010/main" val="2407422118"/>
+              </p:ext>
+            </p:extLst>
+          </p:nvPr>
+        </p:nvGraphicFramePr>
+        <p:xfrm>
+          <a:off x="6249374" y="1690688"/>
+          <a:ext cx="6586667" cy="5040000"/>
+        </p:xfrm>
+        <a:graphic>
+          <a:graphicData uri="http://schemas.openxmlformats.org/presentationml/2006/ole">
+            <mc:AlternateContent xmlns:mc="http://schemas.openxmlformats.org/markup-compatibility/2006">
+              <mc:Choice xmlns:v="urn:schemas-microsoft-com:vml" Requires="v">
+                <p:oleObj name="Graph" r:id="rId4" imgW="3920760" imgH="3000960" progId="Origin95.Graph">
+                  <p:embed/>
+                </p:oleObj>
+              </mc:Choice>
+              <mc:Fallback>
+                <p:oleObj name="Graph" r:id="rId4" imgW="3920760" imgH="3000960" progId="Origin95.Graph">
+                  <p:embed/>
+                  <p:pic>
+                    <p:nvPicPr>
+                      <p:cNvPr id="0" name=""/>
+                      <p:cNvPicPr/>
+                      <p:nvPr/>
+                    </p:nvPicPr>
+                    <p:blipFill>
+                      <a:blip r:embed="rId5"/>
+                      <a:stretch>
+                        <a:fillRect/>
+                      </a:stretch>
+                    </p:blipFill>
+                    <p:spPr>
+                      <a:xfrm>
+                        <a:off x="6249374" y="1690688"/>
+                        <a:ext cx="6586667" cy="5040000"/>
+                      </a:xfrm>
+                      <a:prstGeom prst="rect">
+                        <a:avLst/>
+                      </a:prstGeom>
+                    </p:spPr>
+                  </p:pic>
+                </p:oleObj>
+              </mc:Fallback>
+            </mc:AlternateContent>
+          </a:graphicData>
+        </a:graphic>
+      </p:graphicFrame>
+    </p:spTree>
+    <p:extLst>
+      <p:ext uri="{BB962C8B-B14F-4D97-AF65-F5344CB8AC3E}">
+        <p14:creationId xmlns:p14="http://schemas.microsoft.com/office/powerpoint/2010/main" val="1767886433"/>
+      </p:ext>
+    </p:extLst>
+  </p:cSld>
+  <p:clrMapOvr>
+    <a:masterClrMapping/>
+  </p:clrMapOvr>
+</p:sld>
+</file>
+
+<file path=ppt/slides/slide51.xml><?xml version="1.0" encoding="utf-8"?>
+<p:sld xmlns:a="http://schemas.openxmlformats.org/drawingml/2006/main" xmlns:r="http://schemas.openxmlformats.org/officeDocument/2006/relationships" xmlns:p="http://schemas.openxmlformats.org/presentationml/2006/main">
+  <p:cSld>
+    <p:spTree>
+      <p:nvGrpSpPr>
+        <p:cNvPr id="1" name=""/>
+        <p:cNvGrpSpPr/>
+        <p:nvPr/>
+      </p:nvGrpSpPr>
+      <p:grpSpPr>
+        <a:xfrm>
+          <a:off x="0" y="0"/>
+          <a:ext cx="0" cy="0"/>
+          <a:chOff x="0" y="0"/>
+          <a:chExt cx="0" cy="0"/>
+        </a:xfrm>
+      </p:grpSpPr>
+      <p:sp>
+        <p:nvSpPr>
+          <p:cNvPr id="2" name="Title 1">
+            <a:extLst>
+              <a:ext uri="{FF2B5EF4-FFF2-40B4-BE49-F238E27FC236}">
+                <a16:creationId xmlns:a16="http://schemas.microsoft.com/office/drawing/2014/main" id="{8013BC2D-22B8-DFCD-C5F2-70E2D2ED36DA}"/>
+              </a:ext>
+            </a:extLst>
+          </p:cNvPr>
+          <p:cNvSpPr>
+            <a:spLocks noGrp="1"/>
+          </p:cNvSpPr>
+          <p:nvPr>
+            <p:ph type="title"/>
+          </p:nvPr>
+        </p:nvSpPr>
+        <p:spPr/>
+        <p:txBody>
+          <a:bodyPr/>
+          <a:lstStyle/>
+          <a:p>
+            <a:r>
+              <a:rPr lang="en-US" dirty="0"/>
+              <a:t>Sample10_device2</a:t>
+            </a:r>
+            <a:endParaRPr lang="ru-RU" dirty="0"/>
+          </a:p>
+        </p:txBody>
+      </p:sp>
+      <p:graphicFrame>
+        <p:nvGraphicFramePr>
+          <p:cNvPr id="4" name="Object 3">
+            <a:extLst>
+              <a:ext uri="{FF2B5EF4-FFF2-40B4-BE49-F238E27FC236}">
+                <a16:creationId xmlns:a16="http://schemas.microsoft.com/office/drawing/2014/main" id="{E1B289B5-E294-DFBD-62F0-CDB38B182378}"/>
+              </a:ext>
+            </a:extLst>
+          </p:cNvPr>
+          <p:cNvGraphicFramePr>
+            <a:graphicFrameLocks noChangeAspect="1"/>
+          </p:cNvGraphicFramePr>
+          <p:nvPr>
+            <p:extLst>
+              <p:ext uri="{D42A27DB-BD31-4B8C-83A1-F6EECF244321}">
+                <p14:modId xmlns:p14="http://schemas.microsoft.com/office/powerpoint/2010/main" val="1807161590"/>
+              </p:ext>
+            </p:extLst>
+          </p:nvPr>
+        </p:nvGraphicFramePr>
+        <p:xfrm>
+          <a:off x="6096000" y="1690688"/>
+          <a:ext cx="6586667" cy="5040000"/>
+        </p:xfrm>
+        <a:graphic>
+          <a:graphicData uri="http://schemas.openxmlformats.org/presentationml/2006/ole">
+            <mc:AlternateContent xmlns:mc="http://schemas.openxmlformats.org/markup-compatibility/2006">
+              <mc:Choice xmlns:v="urn:schemas-microsoft-com:vml" Requires="v">
+                <p:oleObj name="Graph" r:id="rId2" imgW="3920760" imgH="3000960" progId="Origin95.Graph">
+                  <p:embed/>
+                </p:oleObj>
+              </mc:Choice>
+              <mc:Fallback>
+                <p:oleObj name="Graph" r:id="rId2" imgW="3920760" imgH="3000960" progId="Origin95.Graph">
+                  <p:embed/>
+                  <p:pic>
+                    <p:nvPicPr>
+                      <p:cNvPr id="0" name=""/>
+                      <p:cNvPicPr/>
+                      <p:nvPr/>
+                    </p:nvPicPr>
+                    <p:blipFill>
+                      <a:blip r:embed="rId3"/>
+                      <a:stretch>
+                        <a:fillRect/>
+                      </a:stretch>
+                    </p:blipFill>
+                    <p:spPr>
+                      <a:xfrm>
+                        <a:off x="6096000" y="1690688"/>
+                        <a:ext cx="6586667" cy="5040000"/>
+                      </a:xfrm>
+                      <a:prstGeom prst="rect">
+                        <a:avLst/>
+                      </a:prstGeom>
+                    </p:spPr>
+                  </p:pic>
+                </p:oleObj>
+              </mc:Fallback>
+            </mc:AlternateContent>
+          </a:graphicData>
+        </a:graphic>
+      </p:graphicFrame>
+      <p:graphicFrame>
+        <p:nvGraphicFramePr>
+          <p:cNvPr id="5" name="Object 4">
+            <a:extLst>
+              <a:ext uri="{FF2B5EF4-FFF2-40B4-BE49-F238E27FC236}">
+                <a16:creationId xmlns:a16="http://schemas.microsoft.com/office/drawing/2014/main" id="{176D59E6-440F-71FA-B787-33B0F870A6E9}"/>
+              </a:ext>
+            </a:extLst>
+          </p:cNvPr>
+          <p:cNvGraphicFramePr>
+            <a:graphicFrameLocks noChangeAspect="1"/>
+          </p:cNvGraphicFramePr>
+          <p:nvPr>
+            <p:extLst>
+              <p:ext uri="{D42A27DB-BD31-4B8C-83A1-F6EECF244321}">
+                <p14:modId xmlns:p14="http://schemas.microsoft.com/office/powerpoint/2010/main" val="3357662848"/>
+              </p:ext>
+            </p:extLst>
+          </p:nvPr>
+        </p:nvGraphicFramePr>
+        <p:xfrm>
+          <a:off x="-402177" y="1690688"/>
+          <a:ext cx="6586667" cy="5040000"/>
+        </p:xfrm>
+        <a:graphic>
+          <a:graphicData uri="http://schemas.openxmlformats.org/presentationml/2006/ole">
+            <mc:AlternateContent xmlns:mc="http://schemas.openxmlformats.org/markup-compatibility/2006">
+              <mc:Choice xmlns:v="urn:schemas-microsoft-com:vml" Requires="v">
+                <p:oleObj name="Graph" r:id="rId4" imgW="3920760" imgH="3000960" progId="Origin95.Graph">
+                  <p:embed/>
+                </p:oleObj>
+              </mc:Choice>
+              <mc:Fallback>
+                <p:oleObj name="Graph" r:id="rId4" imgW="3920760" imgH="3000960" progId="Origin95.Graph">
+                  <p:embed/>
+                  <p:pic>
+                    <p:nvPicPr>
+                      <p:cNvPr id="0" name=""/>
+                      <p:cNvPicPr/>
+                      <p:nvPr/>
+                    </p:nvPicPr>
+                    <p:blipFill>
+                      <a:blip r:embed="rId5"/>
+                      <a:stretch>
+                        <a:fillRect/>
+                      </a:stretch>
+                    </p:blipFill>
+                    <p:spPr>
+                      <a:xfrm>
+                        <a:off x="-402177" y="1690688"/>
+                        <a:ext cx="6586667" cy="5040000"/>
+                      </a:xfrm>
+                      <a:prstGeom prst="rect">
+                        <a:avLst/>
+                      </a:prstGeom>
+                    </p:spPr>
+                  </p:pic>
+                </p:oleObj>
+              </mc:Fallback>
+            </mc:AlternateContent>
+          </a:graphicData>
+        </a:graphic>
+      </p:graphicFrame>
+    </p:spTree>
+    <p:extLst>
+      <p:ext uri="{BB962C8B-B14F-4D97-AF65-F5344CB8AC3E}">
+        <p14:creationId xmlns:p14="http://schemas.microsoft.com/office/powerpoint/2010/main" val="1066179616"/>
+      </p:ext>
+    </p:extLst>
+  </p:cSld>
+  <p:clrMapOvr>
+    <a:masterClrMapping/>
+  </p:clrMapOvr>
+</p:sld>
+</file>
+
+<file path=ppt/slides/slide52.xml><?xml version="1.0" encoding="utf-8"?>
+<p:sld xmlns:a="http://schemas.openxmlformats.org/drawingml/2006/main" xmlns:r="http://schemas.openxmlformats.org/officeDocument/2006/relationships" xmlns:p="http://schemas.openxmlformats.org/presentationml/2006/main">
+  <p:cSld>
+    <p:spTree>
+      <p:nvGrpSpPr>
+        <p:cNvPr id="1" name=""/>
+        <p:cNvGrpSpPr/>
+        <p:nvPr/>
+      </p:nvGrpSpPr>
+      <p:grpSpPr>
+        <a:xfrm>
+          <a:off x="0" y="0"/>
+          <a:ext cx="0" cy="0"/>
+          <a:chOff x="0" y="0"/>
+          <a:chExt cx="0" cy="0"/>
+        </a:xfrm>
+      </p:grpSpPr>
+      <p:sp>
+        <p:nvSpPr>
+          <p:cNvPr id="2" name="Title 1">
+            <a:extLst>
+              <a:ext uri="{FF2B5EF4-FFF2-40B4-BE49-F238E27FC236}">
+                <a16:creationId xmlns:a16="http://schemas.microsoft.com/office/drawing/2014/main" id="{6FA2D24C-1775-5BDC-04AA-A34DBD08AB72}"/>
+              </a:ext>
+            </a:extLst>
+          </p:cNvPr>
+          <p:cNvSpPr>
+            <a:spLocks noGrp="1"/>
+          </p:cNvSpPr>
+          <p:nvPr>
+            <p:ph type="title"/>
+          </p:nvPr>
+        </p:nvSpPr>
+        <p:spPr/>
+        <p:txBody>
+          <a:bodyPr/>
+          <a:lstStyle/>
+          <a:p>
+            <a:r>
+              <a:rPr lang="en-US" dirty="0"/>
+              <a:t>Sample10_device3</a:t>
+            </a:r>
+            <a:endParaRPr lang="ru-RU" dirty="0"/>
+          </a:p>
+        </p:txBody>
+      </p:sp>
+      <p:graphicFrame>
+        <p:nvGraphicFramePr>
+          <p:cNvPr id="3" name="Object 2">
+            <a:extLst>
+              <a:ext uri="{FF2B5EF4-FFF2-40B4-BE49-F238E27FC236}">
+                <a16:creationId xmlns:a16="http://schemas.microsoft.com/office/drawing/2014/main" id="{29766408-1319-F600-E46B-592227858E61}"/>
+              </a:ext>
+            </a:extLst>
+          </p:cNvPr>
+          <p:cNvGraphicFramePr>
+            <a:graphicFrameLocks noChangeAspect="1"/>
+          </p:cNvGraphicFramePr>
+          <p:nvPr>
+            <p:extLst>
+              <p:ext uri="{D42A27DB-BD31-4B8C-83A1-F6EECF244321}">
+                <p14:modId xmlns:p14="http://schemas.microsoft.com/office/powerpoint/2010/main" val="1113052872"/>
+              </p:ext>
+            </p:extLst>
+          </p:nvPr>
+        </p:nvGraphicFramePr>
+        <p:xfrm>
+          <a:off x="-249749" y="1690688"/>
+          <a:ext cx="6586667" cy="5040000"/>
+        </p:xfrm>
+        <a:graphic>
+          <a:graphicData uri="http://schemas.openxmlformats.org/presentationml/2006/ole">
+            <mc:AlternateContent xmlns:mc="http://schemas.openxmlformats.org/markup-compatibility/2006">
+              <mc:Choice xmlns:v="urn:schemas-microsoft-com:vml" Requires="v">
+                <p:oleObj name="Graph" r:id="rId2" imgW="3920760" imgH="3000960" progId="Origin95.Graph">
+                  <p:embed/>
+                </p:oleObj>
+              </mc:Choice>
+              <mc:Fallback>
+                <p:oleObj name="Graph" r:id="rId2" imgW="3920760" imgH="3000960" progId="Origin95.Graph">
+                  <p:embed/>
+                  <p:pic>
+                    <p:nvPicPr>
+                      <p:cNvPr id="0" name=""/>
+                      <p:cNvPicPr/>
+                      <p:nvPr/>
+                    </p:nvPicPr>
+                    <p:blipFill>
+                      <a:blip r:embed="rId3"/>
+                      <a:stretch>
+                        <a:fillRect/>
+                      </a:stretch>
+                    </p:blipFill>
+                    <p:spPr>
+                      <a:xfrm>
+                        <a:off x="-249749" y="1690688"/>
+                        <a:ext cx="6586667" cy="5040000"/>
+                      </a:xfrm>
+                      <a:prstGeom prst="rect">
+                        <a:avLst/>
+                      </a:prstGeom>
+                    </p:spPr>
+                  </p:pic>
+                </p:oleObj>
+              </mc:Fallback>
+            </mc:AlternateContent>
+          </a:graphicData>
+        </a:graphic>
+      </p:graphicFrame>
+      <p:graphicFrame>
+        <p:nvGraphicFramePr>
+          <p:cNvPr id="4" name="Object 3">
+            <a:extLst>
+              <a:ext uri="{FF2B5EF4-FFF2-40B4-BE49-F238E27FC236}">
+                <a16:creationId xmlns:a16="http://schemas.microsoft.com/office/drawing/2014/main" id="{0E64DA6A-473F-E78B-D7E1-084D12A5C6D8}"/>
+              </a:ext>
+            </a:extLst>
+          </p:cNvPr>
+          <p:cNvGraphicFramePr>
+            <a:graphicFrameLocks noChangeAspect="1"/>
+          </p:cNvGraphicFramePr>
+          <p:nvPr>
+            <p:extLst>
+              <p:ext uri="{D42A27DB-BD31-4B8C-83A1-F6EECF244321}">
+                <p14:modId xmlns:p14="http://schemas.microsoft.com/office/powerpoint/2010/main" val="3816951242"/>
+              </p:ext>
+            </p:extLst>
+          </p:nvPr>
+        </p:nvGraphicFramePr>
+        <p:xfrm>
+          <a:off x="6096000" y="1690688"/>
+          <a:ext cx="6586667" cy="5040000"/>
+        </p:xfrm>
+        <a:graphic>
+          <a:graphicData uri="http://schemas.openxmlformats.org/presentationml/2006/ole">
+            <mc:AlternateContent xmlns:mc="http://schemas.openxmlformats.org/markup-compatibility/2006">
+              <mc:Choice xmlns:v="urn:schemas-microsoft-com:vml" Requires="v">
+                <p:oleObj name="Graph" r:id="rId4" imgW="3920760" imgH="3000960" progId="Origin95.Graph">
+                  <p:embed/>
+                </p:oleObj>
+              </mc:Choice>
+              <mc:Fallback>
+                <p:oleObj name="Graph" r:id="rId4" imgW="3920760" imgH="3000960" progId="Origin95.Graph">
+                  <p:embed/>
+                  <p:pic>
+                    <p:nvPicPr>
+                      <p:cNvPr id="0" name=""/>
+                      <p:cNvPicPr/>
+                      <p:nvPr/>
+                    </p:nvPicPr>
+                    <p:blipFill>
+                      <a:blip r:embed="rId5"/>
+                      <a:stretch>
+                        <a:fillRect/>
+                      </a:stretch>
+                    </p:blipFill>
+                    <p:spPr>
+                      <a:xfrm>
+                        <a:off x="6096000" y="1690688"/>
+                        <a:ext cx="6586667" cy="5040000"/>
+                      </a:xfrm>
+                      <a:prstGeom prst="rect">
+                        <a:avLst/>
+                      </a:prstGeom>
+                    </p:spPr>
+                  </p:pic>
+                </p:oleObj>
+              </mc:Fallback>
+            </mc:AlternateContent>
+          </a:graphicData>
+        </a:graphic>
+      </p:graphicFrame>
+    </p:spTree>
+    <p:extLst>
+      <p:ext uri="{BB962C8B-B14F-4D97-AF65-F5344CB8AC3E}">
+        <p14:creationId xmlns:p14="http://schemas.microsoft.com/office/powerpoint/2010/main" val="185122803"/>
+      </p:ext>
+    </p:extLst>
+  </p:cSld>
+  <p:clrMapOvr>
+    <a:masterClrMapping/>
+  </p:clrMapOvr>
+</p:sld>
+</file>
+
+<file path=ppt/slides/slide53.xml><?xml version="1.0" encoding="utf-8"?>
+<p:sld xmlns:a="http://schemas.openxmlformats.org/drawingml/2006/main" xmlns:r="http://schemas.openxmlformats.org/officeDocument/2006/relationships" xmlns:p="http://schemas.openxmlformats.org/presentationml/2006/main">
+  <p:cSld>
+    <p:spTree>
+      <p:nvGrpSpPr>
+        <p:cNvPr id="1" name=""/>
+        <p:cNvGrpSpPr/>
+        <p:nvPr/>
+      </p:nvGrpSpPr>
+      <p:grpSpPr>
+        <a:xfrm>
+          <a:off x="0" y="0"/>
+          <a:ext cx="0" cy="0"/>
+          <a:chOff x="0" y="0"/>
+          <a:chExt cx="0" cy="0"/>
+        </a:xfrm>
+      </p:grpSpPr>
+      <p:sp>
+        <p:nvSpPr>
+          <p:cNvPr id="2" name="Title 1">
+            <a:extLst>
+              <a:ext uri="{FF2B5EF4-FFF2-40B4-BE49-F238E27FC236}">
+                <a16:creationId xmlns:a16="http://schemas.microsoft.com/office/drawing/2014/main" id="{4D89A422-B30C-87CA-20BA-E515BDA410EA}"/>
+              </a:ext>
+            </a:extLst>
+          </p:cNvPr>
+          <p:cNvSpPr>
+            <a:spLocks noGrp="1"/>
+          </p:cNvSpPr>
+          <p:nvPr>
+            <p:ph type="title"/>
+          </p:nvPr>
+        </p:nvSpPr>
+        <p:spPr/>
+        <p:txBody>
+          <a:bodyPr/>
+          <a:lstStyle/>
+          <a:p>
+            <a:r>
+              <a:rPr lang="en-US" dirty="0"/>
+              <a:t>Sample10_device3</a:t>
+            </a:r>
+            <a:endParaRPr lang="ru-RU" dirty="0"/>
+          </a:p>
+        </p:txBody>
+      </p:sp>
+      <p:graphicFrame>
+        <p:nvGraphicFramePr>
+          <p:cNvPr id="3" name="Object 2">
+            <a:extLst>
+              <a:ext uri="{FF2B5EF4-FFF2-40B4-BE49-F238E27FC236}">
+                <a16:creationId xmlns:a16="http://schemas.microsoft.com/office/drawing/2014/main" id="{B72FE5EB-3EC2-900F-38F9-D5BD77D51C8B}"/>
+              </a:ext>
+            </a:extLst>
+          </p:cNvPr>
+          <p:cNvGraphicFramePr>
+            <a:graphicFrameLocks noChangeAspect="1"/>
+          </p:cNvGraphicFramePr>
+          <p:nvPr>
+            <p:extLst>
+              <p:ext uri="{D42A27DB-BD31-4B8C-83A1-F6EECF244321}">
+                <p14:modId xmlns:p14="http://schemas.microsoft.com/office/powerpoint/2010/main" val="914329634"/>
+              </p:ext>
+            </p:extLst>
+          </p:nvPr>
+        </p:nvGraphicFramePr>
+        <p:xfrm>
+          <a:off x="6023231" y="1690688"/>
+          <a:ext cx="6586667" cy="5040000"/>
+        </p:xfrm>
+        <a:graphic>
+          <a:graphicData uri="http://schemas.openxmlformats.org/presentationml/2006/ole">
+            <mc:AlternateContent xmlns:mc="http://schemas.openxmlformats.org/markup-compatibility/2006">
+              <mc:Choice xmlns:v="urn:schemas-microsoft-com:vml" Requires="v">
+                <p:oleObj name="Graph" r:id="rId2" imgW="3920760" imgH="3000960" progId="Origin95.Graph">
+                  <p:embed/>
+                </p:oleObj>
+              </mc:Choice>
+              <mc:Fallback>
+                <p:oleObj name="Graph" r:id="rId2" imgW="3920760" imgH="3000960" progId="Origin95.Graph">
+                  <p:embed/>
+                  <p:pic>
+                    <p:nvPicPr>
+                      <p:cNvPr id="0" name=""/>
+                      <p:cNvPicPr/>
+                      <p:nvPr/>
+                    </p:nvPicPr>
+                    <p:blipFill>
+                      <a:blip r:embed="rId3"/>
+                      <a:stretch>
+                        <a:fillRect/>
+                      </a:stretch>
+                    </p:blipFill>
+                    <p:spPr>
+                      <a:xfrm>
+                        <a:off x="6023231" y="1690688"/>
+                        <a:ext cx="6586667" cy="5040000"/>
+                      </a:xfrm>
+                      <a:prstGeom prst="rect">
+                        <a:avLst/>
+                      </a:prstGeom>
+                    </p:spPr>
+                  </p:pic>
+                </p:oleObj>
+              </mc:Fallback>
+            </mc:AlternateContent>
+          </a:graphicData>
+        </a:graphic>
+      </p:graphicFrame>
+      <p:graphicFrame>
+        <p:nvGraphicFramePr>
+          <p:cNvPr id="4" name="Object 3">
+            <a:extLst>
+              <a:ext uri="{FF2B5EF4-FFF2-40B4-BE49-F238E27FC236}">
+                <a16:creationId xmlns:a16="http://schemas.microsoft.com/office/drawing/2014/main" id="{6C01A6DA-C6A9-CAE8-2A16-F5EF8302F7FB}"/>
+              </a:ext>
+            </a:extLst>
+          </p:cNvPr>
+          <p:cNvGraphicFramePr>
+            <a:graphicFrameLocks noChangeAspect="1"/>
+          </p:cNvGraphicFramePr>
+          <p:nvPr>
+            <p:extLst>
+              <p:ext uri="{D42A27DB-BD31-4B8C-83A1-F6EECF244321}">
+                <p14:modId xmlns:p14="http://schemas.microsoft.com/office/powerpoint/2010/main" val="718397855"/>
+              </p:ext>
+            </p:extLst>
+          </p:nvPr>
+        </p:nvGraphicFramePr>
+        <p:xfrm>
+          <a:off x="-279989" y="1690688"/>
+          <a:ext cx="6586667" cy="5040000"/>
+        </p:xfrm>
+        <a:graphic>
+          <a:graphicData uri="http://schemas.openxmlformats.org/presentationml/2006/ole">
+            <mc:AlternateContent xmlns:mc="http://schemas.openxmlformats.org/markup-compatibility/2006">
+              <mc:Choice xmlns:v="urn:schemas-microsoft-com:vml" Requires="v">
+                <p:oleObj name="Graph" r:id="rId4" imgW="3920760" imgH="3000960" progId="Origin95.Graph">
+                  <p:embed/>
+                </p:oleObj>
+              </mc:Choice>
+              <mc:Fallback>
+                <p:oleObj name="Graph" r:id="rId4" imgW="3920760" imgH="3000960" progId="Origin95.Graph">
+                  <p:embed/>
+                  <p:pic>
+                    <p:nvPicPr>
+                      <p:cNvPr id="0" name=""/>
+                      <p:cNvPicPr/>
+                      <p:nvPr/>
+                    </p:nvPicPr>
+                    <p:blipFill>
+                      <a:blip r:embed="rId5"/>
+                      <a:stretch>
+                        <a:fillRect/>
+                      </a:stretch>
+                    </p:blipFill>
+                    <p:spPr>
+                      <a:xfrm>
+                        <a:off x="-279989" y="1690688"/>
+                        <a:ext cx="6586667" cy="5040000"/>
+                      </a:xfrm>
+                      <a:prstGeom prst="rect">
+                        <a:avLst/>
+                      </a:prstGeom>
+                    </p:spPr>
+                  </p:pic>
+                </p:oleObj>
+              </mc:Fallback>
+            </mc:AlternateContent>
+          </a:graphicData>
+        </a:graphic>
+      </p:graphicFrame>
+    </p:spTree>
+    <p:extLst>
+      <p:ext uri="{BB962C8B-B14F-4D97-AF65-F5344CB8AC3E}">
+        <p14:creationId xmlns:p14="http://schemas.microsoft.com/office/powerpoint/2010/main" val="3451989266"/>
+      </p:ext>
+    </p:extLst>
+  </p:cSld>
+  <p:clrMapOvr>
+    <a:masterClrMapping/>
+  </p:clrMapOvr>
+</p:sld>
+</file>
+
+<file path=ppt/slides/slide54.xml><?xml version="1.0" encoding="utf-8"?>
+<p:sld xmlns:a="http://schemas.openxmlformats.org/drawingml/2006/main" xmlns:r="http://schemas.openxmlformats.org/officeDocument/2006/relationships" xmlns:p="http://schemas.openxmlformats.org/presentationml/2006/main">
+  <p:cSld>
+    <p:spTree>
+      <p:nvGrpSpPr>
+        <p:cNvPr id="1" name=""/>
+        <p:cNvGrpSpPr/>
+        <p:nvPr/>
+      </p:nvGrpSpPr>
+      <p:grpSpPr>
+        <a:xfrm>
+          <a:off x="0" y="0"/>
+          <a:ext cx="0" cy="0"/>
+          <a:chOff x="0" y="0"/>
+          <a:chExt cx="0" cy="0"/>
+        </a:xfrm>
+      </p:grpSpPr>
+      <p:sp>
+        <p:nvSpPr>
+          <p:cNvPr id="2" name="Title 1">
+            <a:extLst>
+              <a:ext uri="{FF2B5EF4-FFF2-40B4-BE49-F238E27FC236}">
+                <a16:creationId xmlns:a16="http://schemas.microsoft.com/office/drawing/2014/main" id="{AB429241-A67A-B22C-002A-BD1C26B6D8A5}"/>
+              </a:ext>
+            </a:extLst>
+          </p:cNvPr>
+          <p:cNvSpPr>
+            <a:spLocks noGrp="1"/>
+          </p:cNvSpPr>
+          <p:nvPr>
+            <p:ph type="title"/>
+          </p:nvPr>
+        </p:nvSpPr>
+        <p:spPr/>
+        <p:txBody>
+          <a:bodyPr/>
+          <a:lstStyle/>
+          <a:p>
+            <a:r>
+              <a:rPr lang="en-US" dirty="0"/>
+              <a:t>Sample10_device5</a:t>
+            </a:r>
+            <a:endParaRPr lang="ru-RU" dirty="0"/>
+          </a:p>
+        </p:txBody>
+      </p:sp>
+      <p:graphicFrame>
+        <p:nvGraphicFramePr>
+          <p:cNvPr id="3" name="Object 2">
+            <a:extLst>
+              <a:ext uri="{FF2B5EF4-FFF2-40B4-BE49-F238E27FC236}">
+                <a16:creationId xmlns:a16="http://schemas.microsoft.com/office/drawing/2014/main" id="{CEB04CA0-7E45-87CF-6458-729288E650E1}"/>
+              </a:ext>
+            </a:extLst>
+          </p:cNvPr>
+          <p:cNvGraphicFramePr>
+            <a:graphicFrameLocks noChangeAspect="1"/>
+          </p:cNvGraphicFramePr>
+          <p:nvPr>
+            <p:extLst>
+              <p:ext uri="{D42A27DB-BD31-4B8C-83A1-F6EECF244321}">
+                <p14:modId xmlns:p14="http://schemas.microsoft.com/office/powerpoint/2010/main" val="1653539719"/>
+              </p:ext>
+            </p:extLst>
+          </p:nvPr>
+        </p:nvGraphicFramePr>
+        <p:xfrm>
+          <a:off x="-275304" y="1690688"/>
+          <a:ext cx="6586667" cy="5040000"/>
+        </p:xfrm>
+        <a:graphic>
+          <a:graphicData uri="http://schemas.openxmlformats.org/presentationml/2006/ole">
+            <mc:AlternateContent xmlns:mc="http://schemas.openxmlformats.org/markup-compatibility/2006">
+              <mc:Choice xmlns:v="urn:schemas-microsoft-com:vml" Requires="v">
+                <p:oleObj name="Graph" r:id="rId2" imgW="3920760" imgH="3000960" progId="Origin95.Graph">
+                  <p:embed/>
+                </p:oleObj>
+              </mc:Choice>
+              <mc:Fallback>
+                <p:oleObj name="Graph" r:id="rId2" imgW="3920760" imgH="3000960" progId="Origin95.Graph">
+                  <p:embed/>
+                  <p:pic>
+                    <p:nvPicPr>
+                      <p:cNvPr id="0" name=""/>
+                      <p:cNvPicPr/>
+                      <p:nvPr/>
+                    </p:nvPicPr>
+                    <p:blipFill>
+                      <a:blip r:embed="rId3"/>
+                      <a:stretch>
+                        <a:fillRect/>
+                      </a:stretch>
+                    </p:blipFill>
+                    <p:spPr>
+                      <a:xfrm>
+                        <a:off x="-275304" y="1690688"/>
+                        <a:ext cx="6586667" cy="5040000"/>
+                      </a:xfrm>
+                      <a:prstGeom prst="rect">
+                        <a:avLst/>
+                      </a:prstGeom>
+                    </p:spPr>
+                  </p:pic>
+                </p:oleObj>
+              </mc:Fallback>
+            </mc:AlternateContent>
+          </a:graphicData>
+        </a:graphic>
+      </p:graphicFrame>
+      <p:graphicFrame>
+        <p:nvGraphicFramePr>
+          <p:cNvPr id="4" name="Object 3">
+            <a:extLst>
+              <a:ext uri="{FF2B5EF4-FFF2-40B4-BE49-F238E27FC236}">
+                <a16:creationId xmlns:a16="http://schemas.microsoft.com/office/drawing/2014/main" id="{39F3791B-4F9F-C88B-FA4A-2DEF4FA3CEE3}"/>
+              </a:ext>
+            </a:extLst>
+          </p:cNvPr>
+          <p:cNvGraphicFramePr>
+            <a:graphicFrameLocks noChangeAspect="1"/>
+          </p:cNvGraphicFramePr>
+          <p:nvPr>
+            <p:extLst>
+              <p:ext uri="{D42A27DB-BD31-4B8C-83A1-F6EECF244321}">
+                <p14:modId xmlns:p14="http://schemas.microsoft.com/office/powerpoint/2010/main" val="2500186910"/>
+              </p:ext>
+            </p:extLst>
+          </p:nvPr>
+        </p:nvGraphicFramePr>
+        <p:xfrm>
+          <a:off x="6311363" y="1690688"/>
+          <a:ext cx="6586667" cy="5040000"/>
+        </p:xfrm>
+        <a:graphic>
+          <a:graphicData uri="http://schemas.openxmlformats.org/presentationml/2006/ole">
+            <mc:AlternateContent xmlns:mc="http://schemas.openxmlformats.org/markup-compatibility/2006">
+              <mc:Choice xmlns:v="urn:schemas-microsoft-com:vml" Requires="v">
+                <p:oleObj name="Graph" r:id="rId4" imgW="3920760" imgH="3000960" progId="Origin95.Graph">
+                  <p:embed/>
+                </p:oleObj>
+              </mc:Choice>
+              <mc:Fallback>
+                <p:oleObj name="Graph" r:id="rId4" imgW="3920760" imgH="3000960" progId="Origin95.Graph">
+                  <p:embed/>
+                  <p:pic>
+                    <p:nvPicPr>
+                      <p:cNvPr id="0" name=""/>
+                      <p:cNvPicPr/>
+                      <p:nvPr/>
+                    </p:nvPicPr>
+                    <p:blipFill>
+                      <a:blip r:embed="rId5"/>
+                      <a:stretch>
+                        <a:fillRect/>
+                      </a:stretch>
+                    </p:blipFill>
+                    <p:spPr>
+                      <a:xfrm>
+                        <a:off x="6311363" y="1690688"/>
+                        <a:ext cx="6586667" cy="5040000"/>
+                      </a:xfrm>
+                      <a:prstGeom prst="rect">
+                        <a:avLst/>
+                      </a:prstGeom>
+                    </p:spPr>
+                  </p:pic>
+                </p:oleObj>
+              </mc:Fallback>
+            </mc:AlternateContent>
+          </a:graphicData>
+        </a:graphic>
+      </p:graphicFrame>
+    </p:spTree>
+    <p:extLst>
+      <p:ext uri="{BB962C8B-B14F-4D97-AF65-F5344CB8AC3E}">
+        <p14:creationId xmlns:p14="http://schemas.microsoft.com/office/powerpoint/2010/main" val="3682814763"/>
+      </p:ext>
+    </p:extLst>
+  </p:cSld>
+  <p:clrMapOvr>
+    <a:masterClrMapping/>
+  </p:clrMapOvr>
+</p:sld>
+</file>
+
+<file path=ppt/slides/slide55.xml><?xml version="1.0" encoding="utf-8"?>
+<p:sld xmlns:a="http://schemas.openxmlformats.org/drawingml/2006/main" xmlns:r="http://schemas.openxmlformats.org/officeDocument/2006/relationships" xmlns:p="http://schemas.openxmlformats.org/presentationml/2006/main">
+  <p:cSld>
+    <p:spTree>
+      <p:nvGrpSpPr>
+        <p:cNvPr id="1" name=""/>
+        <p:cNvGrpSpPr/>
+        <p:nvPr/>
+      </p:nvGrpSpPr>
+      <p:grpSpPr>
+        <a:xfrm>
+          <a:off x="0" y="0"/>
+          <a:ext cx="0" cy="0"/>
+          <a:chOff x="0" y="0"/>
+          <a:chExt cx="0" cy="0"/>
+        </a:xfrm>
+      </p:grpSpPr>
+      <p:sp>
+        <p:nvSpPr>
+          <p:cNvPr id="2" name="Title 1">
+            <a:extLst>
+              <a:ext uri="{FF2B5EF4-FFF2-40B4-BE49-F238E27FC236}">
+                <a16:creationId xmlns:a16="http://schemas.microsoft.com/office/drawing/2014/main" id="{64941E0D-021A-E34E-9650-674ED7898953}"/>
+              </a:ext>
+            </a:extLst>
+          </p:cNvPr>
+          <p:cNvSpPr>
+            <a:spLocks noGrp="1"/>
+          </p:cNvSpPr>
+          <p:nvPr>
+            <p:ph type="title"/>
+          </p:nvPr>
+        </p:nvSpPr>
+        <p:spPr/>
+        <p:txBody>
+          <a:bodyPr/>
+          <a:lstStyle/>
+          <a:p>
+            <a:r>
+              <a:rPr lang="en-US" dirty="0"/>
+              <a:t>Sample10_device5</a:t>
+            </a:r>
+            <a:endParaRPr lang="ru-RU" dirty="0"/>
+          </a:p>
+        </p:txBody>
+      </p:sp>
+    </p:spTree>
+    <p:extLst>
+      <p:ext uri="{BB962C8B-B14F-4D97-AF65-F5344CB8AC3E}">
+        <p14:creationId xmlns:p14="http://schemas.microsoft.com/office/powerpoint/2010/main" val="463835348"/>
+      </p:ext>
+    </p:extLst>
+  </p:cSld>
+  <p:clrMapOvr>
+    <a:masterClrMapping/>
+  </p:clrMapOvr>
+</p:sld>
+</file>
+
+<file path=ppt/slides/slide56.xml><?xml version="1.0" encoding="utf-8"?>
+<p:sld xmlns:a="http://schemas.openxmlformats.org/drawingml/2006/main" xmlns:r="http://schemas.openxmlformats.org/officeDocument/2006/relationships" xmlns:p="http://schemas.openxmlformats.org/presentationml/2006/main">
+  <p:cSld>
+    <p:spTree>
+      <p:nvGrpSpPr>
+        <p:cNvPr id="1" name=""/>
+        <p:cNvGrpSpPr/>
+        <p:nvPr/>
+      </p:nvGrpSpPr>
+      <p:grpSpPr>
+        <a:xfrm>
+          <a:off x="0" y="0"/>
+          <a:ext cx="0" cy="0"/>
+          <a:chOff x="0" y="0"/>
+          <a:chExt cx="0" cy="0"/>
+        </a:xfrm>
+      </p:grpSpPr>
+      <p:sp>
+        <p:nvSpPr>
+          <p:cNvPr id="2" name="Title 1">
+            <a:extLst>
+              <a:ext uri="{FF2B5EF4-FFF2-40B4-BE49-F238E27FC236}">
+                <a16:creationId xmlns:a16="http://schemas.microsoft.com/office/drawing/2014/main" id="{7ABED71A-4508-2890-3260-249E371EF9C3}"/>
+              </a:ext>
+            </a:extLst>
+          </p:cNvPr>
+          <p:cNvSpPr>
+            <a:spLocks noGrp="1"/>
+          </p:cNvSpPr>
+          <p:nvPr>
+            <p:ph type="title"/>
+          </p:nvPr>
+        </p:nvSpPr>
+        <p:spPr/>
+        <p:txBody>
+          <a:bodyPr/>
+          <a:lstStyle/>
+          <a:p>
+            <a:r>
+              <a:rPr lang="en-US" dirty="0"/>
+              <a:t>Sample10_device6</a:t>
+            </a:r>
+            <a:endParaRPr lang="ru-RU" dirty="0"/>
+          </a:p>
+        </p:txBody>
+      </p:sp>
+      <p:graphicFrame>
+        <p:nvGraphicFramePr>
+          <p:cNvPr id="3" name="Object 2">
+            <a:extLst>
+              <a:ext uri="{FF2B5EF4-FFF2-40B4-BE49-F238E27FC236}">
+                <a16:creationId xmlns:a16="http://schemas.microsoft.com/office/drawing/2014/main" id="{B96C8661-6D5C-ECA8-CF67-109CBB34B0CC}"/>
+              </a:ext>
+            </a:extLst>
+          </p:cNvPr>
+          <p:cNvGraphicFramePr>
+            <a:graphicFrameLocks noChangeAspect="1"/>
+          </p:cNvGraphicFramePr>
+          <p:nvPr>
+            <p:extLst>
+              <p:ext uri="{D42A27DB-BD31-4B8C-83A1-F6EECF244321}">
+                <p14:modId xmlns:p14="http://schemas.microsoft.com/office/powerpoint/2010/main" val="2711116362"/>
+              </p:ext>
+            </p:extLst>
+          </p:nvPr>
+        </p:nvGraphicFramePr>
+        <p:xfrm>
+          <a:off x="-334296" y="1690688"/>
+          <a:ext cx="6586667" cy="5040000"/>
+        </p:xfrm>
+        <a:graphic>
+          <a:graphicData uri="http://schemas.openxmlformats.org/presentationml/2006/ole">
+            <mc:AlternateContent xmlns:mc="http://schemas.openxmlformats.org/markup-compatibility/2006">
+              <mc:Choice xmlns:v="urn:schemas-microsoft-com:vml" Requires="v">
+                <p:oleObj name="Graph" r:id="rId2" imgW="3920760" imgH="3000960" progId="Origin95.Graph">
+                  <p:embed/>
+                </p:oleObj>
+              </mc:Choice>
+              <mc:Fallback>
+                <p:oleObj name="Graph" r:id="rId2" imgW="3920760" imgH="3000960" progId="Origin95.Graph">
+                  <p:embed/>
+                  <p:pic>
+                    <p:nvPicPr>
+                      <p:cNvPr id="0" name=""/>
+                      <p:cNvPicPr/>
+                      <p:nvPr/>
+                    </p:nvPicPr>
+                    <p:blipFill>
+                      <a:blip r:embed="rId3"/>
+                      <a:stretch>
+                        <a:fillRect/>
+                      </a:stretch>
+                    </p:blipFill>
+                    <p:spPr>
+                      <a:xfrm>
+                        <a:off x="-334296" y="1690688"/>
+                        <a:ext cx="6586667" cy="5040000"/>
+                      </a:xfrm>
+                      <a:prstGeom prst="rect">
+                        <a:avLst/>
+                      </a:prstGeom>
+                    </p:spPr>
+                  </p:pic>
+                </p:oleObj>
+              </mc:Fallback>
+            </mc:AlternateContent>
+          </a:graphicData>
+        </a:graphic>
+      </p:graphicFrame>
+      <p:graphicFrame>
+        <p:nvGraphicFramePr>
+          <p:cNvPr id="4" name="Object 3">
+            <a:extLst>
+              <a:ext uri="{FF2B5EF4-FFF2-40B4-BE49-F238E27FC236}">
+                <a16:creationId xmlns:a16="http://schemas.microsoft.com/office/drawing/2014/main" id="{56CB6CEF-B2FB-6103-CFDD-72A0A3083800}"/>
+              </a:ext>
+            </a:extLst>
+          </p:cNvPr>
+          <p:cNvGraphicFramePr>
+            <a:graphicFrameLocks noChangeAspect="1"/>
+          </p:cNvGraphicFramePr>
+          <p:nvPr>
+            <p:extLst>
+              <p:ext uri="{D42A27DB-BD31-4B8C-83A1-F6EECF244321}">
+                <p14:modId xmlns:p14="http://schemas.microsoft.com/office/powerpoint/2010/main" val="3552932650"/>
+              </p:ext>
+            </p:extLst>
+          </p:nvPr>
+        </p:nvGraphicFramePr>
+        <p:xfrm>
+          <a:off x="6096000" y="1690688"/>
+          <a:ext cx="6586667" cy="5040000"/>
+        </p:xfrm>
+        <a:graphic>
+          <a:graphicData uri="http://schemas.openxmlformats.org/presentationml/2006/ole">
+            <mc:AlternateContent xmlns:mc="http://schemas.openxmlformats.org/markup-compatibility/2006">
+              <mc:Choice xmlns:v="urn:schemas-microsoft-com:vml" Requires="v">
+                <p:oleObj name="Graph" r:id="rId4" imgW="3920760" imgH="3000960" progId="Origin95.Graph">
+                  <p:embed/>
+                </p:oleObj>
+              </mc:Choice>
+              <mc:Fallback>
+                <p:oleObj name="Graph" r:id="rId4" imgW="3920760" imgH="3000960" progId="Origin95.Graph">
+                  <p:embed/>
+                  <p:pic>
+                    <p:nvPicPr>
+                      <p:cNvPr id="0" name=""/>
+                      <p:cNvPicPr/>
+                      <p:nvPr/>
+                    </p:nvPicPr>
+                    <p:blipFill>
+                      <a:blip r:embed="rId5"/>
+                      <a:stretch>
+                        <a:fillRect/>
+                      </a:stretch>
+                    </p:blipFill>
+                    <p:spPr>
+                      <a:xfrm>
+                        <a:off x="6096000" y="1690688"/>
+                        <a:ext cx="6586667" cy="5040000"/>
+                      </a:xfrm>
+                      <a:prstGeom prst="rect">
+                        <a:avLst/>
+                      </a:prstGeom>
+                    </p:spPr>
+                  </p:pic>
+                </p:oleObj>
+              </mc:Fallback>
+            </mc:AlternateContent>
+          </a:graphicData>
+        </a:graphic>
+      </p:graphicFrame>
+    </p:spTree>
+    <p:extLst>
+      <p:ext uri="{BB962C8B-B14F-4D97-AF65-F5344CB8AC3E}">
+        <p14:creationId xmlns:p14="http://schemas.microsoft.com/office/powerpoint/2010/main" val="3655135497"/>
+      </p:ext>
+    </p:extLst>
+  </p:cSld>
+  <p:clrMapOvr>
+    <a:masterClrMapping/>
+  </p:clrMapOvr>
+</p:sld>
+</file>
+
+<file path=ppt/slides/slide57.xml><?xml version="1.0" encoding="utf-8"?>
+<p:sld xmlns:a="http://schemas.openxmlformats.org/drawingml/2006/main" xmlns:r="http://schemas.openxmlformats.org/officeDocument/2006/relationships" xmlns:p="http://schemas.openxmlformats.org/presentationml/2006/main">
+  <p:cSld>
+    <p:spTree>
+      <p:nvGrpSpPr>
+        <p:cNvPr id="1" name=""/>
+        <p:cNvGrpSpPr/>
+        <p:nvPr/>
+      </p:nvGrpSpPr>
+      <p:grpSpPr>
+        <a:xfrm>
+          <a:off x="0" y="0"/>
+          <a:ext cx="0" cy="0"/>
+          <a:chOff x="0" y="0"/>
+          <a:chExt cx="0" cy="0"/>
+        </a:xfrm>
+      </p:grpSpPr>
+      <p:sp>
+        <p:nvSpPr>
+          <p:cNvPr id="2" name="Title 1">
+            <a:extLst>
+              <a:ext uri="{FF2B5EF4-FFF2-40B4-BE49-F238E27FC236}">
+                <a16:creationId xmlns:a16="http://schemas.microsoft.com/office/drawing/2014/main" id="{0AE027BC-A0C1-459D-87FA-001357420376}"/>
+              </a:ext>
+            </a:extLst>
+          </p:cNvPr>
+          <p:cNvSpPr>
+            <a:spLocks noGrp="1"/>
+          </p:cNvSpPr>
+          <p:nvPr>
+            <p:ph type="title"/>
+          </p:nvPr>
+        </p:nvSpPr>
+        <p:spPr/>
+        <p:txBody>
+          <a:bodyPr/>
+          <a:lstStyle/>
+          <a:p>
+            <a:r>
+              <a:rPr lang="en-US" dirty="0"/>
+              <a:t>Sample10_device6</a:t>
+            </a:r>
+            <a:endParaRPr lang="ru-RU" dirty="0"/>
+          </a:p>
+        </p:txBody>
+      </p:sp>
+      <p:graphicFrame>
+        <p:nvGraphicFramePr>
+          <p:cNvPr id="3" name="Object 2">
+            <a:extLst>
+              <a:ext uri="{FF2B5EF4-FFF2-40B4-BE49-F238E27FC236}">
+                <a16:creationId xmlns:a16="http://schemas.microsoft.com/office/drawing/2014/main" id="{3933A73D-A46B-6C9D-A2DE-F3B4127A62CB}"/>
+              </a:ext>
+            </a:extLst>
+          </p:cNvPr>
+          <p:cNvGraphicFramePr>
+            <a:graphicFrameLocks noChangeAspect="1"/>
+          </p:cNvGraphicFramePr>
+          <p:nvPr>
+            <p:extLst>
+              <p:ext uri="{D42A27DB-BD31-4B8C-83A1-F6EECF244321}">
+                <p14:modId xmlns:p14="http://schemas.microsoft.com/office/powerpoint/2010/main" val="4191964663"/>
+              </p:ext>
+            </p:extLst>
+          </p:nvPr>
+        </p:nvGraphicFramePr>
+        <p:xfrm>
+          <a:off x="6096000" y="1690688"/>
+          <a:ext cx="6586667" cy="5040000"/>
+        </p:xfrm>
+        <a:graphic>
+          <a:graphicData uri="http://schemas.openxmlformats.org/presentationml/2006/ole">
+            <mc:AlternateContent xmlns:mc="http://schemas.openxmlformats.org/markup-compatibility/2006">
+              <mc:Choice xmlns:v="urn:schemas-microsoft-com:vml" Requires="v">
+                <p:oleObj name="Graph" r:id="rId2" imgW="3920760" imgH="3000960" progId="Origin95.Graph">
+                  <p:embed/>
+                </p:oleObj>
+              </mc:Choice>
+              <mc:Fallback>
+                <p:oleObj name="Graph" r:id="rId2" imgW="3920760" imgH="3000960" progId="Origin95.Graph">
+                  <p:embed/>
+                  <p:pic>
+                    <p:nvPicPr>
+                      <p:cNvPr id="0" name=""/>
+                      <p:cNvPicPr/>
+                      <p:nvPr/>
+                    </p:nvPicPr>
+                    <p:blipFill>
+                      <a:blip r:embed="rId3"/>
+                      <a:stretch>
+                        <a:fillRect/>
+                      </a:stretch>
+                    </p:blipFill>
+                    <p:spPr>
+                      <a:xfrm>
+                        <a:off x="6096000" y="1690688"/>
+                        <a:ext cx="6586667" cy="5040000"/>
+                      </a:xfrm>
+                      <a:prstGeom prst="rect">
+                        <a:avLst/>
+                      </a:prstGeom>
+                    </p:spPr>
+                  </p:pic>
+                </p:oleObj>
+              </mc:Fallback>
+            </mc:AlternateContent>
+          </a:graphicData>
+        </a:graphic>
+      </p:graphicFrame>
+      <p:graphicFrame>
+        <p:nvGraphicFramePr>
+          <p:cNvPr id="4" name="Object 3">
+            <a:extLst>
+              <a:ext uri="{FF2B5EF4-FFF2-40B4-BE49-F238E27FC236}">
+                <a16:creationId xmlns:a16="http://schemas.microsoft.com/office/drawing/2014/main" id="{8270EC0B-AB0C-0E6B-B66D-09648B177501}"/>
+              </a:ext>
+            </a:extLst>
+          </p:cNvPr>
+          <p:cNvGraphicFramePr>
+            <a:graphicFrameLocks noChangeAspect="1"/>
+          </p:cNvGraphicFramePr>
+          <p:nvPr>
+            <p:extLst>
+              <p:ext uri="{D42A27DB-BD31-4B8C-83A1-F6EECF244321}">
+                <p14:modId xmlns:p14="http://schemas.microsoft.com/office/powerpoint/2010/main" val="523163284"/>
+              </p:ext>
+            </p:extLst>
+          </p:nvPr>
+        </p:nvGraphicFramePr>
+        <p:xfrm>
+          <a:off x="-230085" y="1690688"/>
+          <a:ext cx="6586667" cy="5040000"/>
+        </p:xfrm>
+        <a:graphic>
+          <a:graphicData uri="http://schemas.openxmlformats.org/presentationml/2006/ole">
+            <mc:AlternateContent xmlns:mc="http://schemas.openxmlformats.org/markup-compatibility/2006">
+              <mc:Choice xmlns:v="urn:schemas-microsoft-com:vml" Requires="v">
+                <p:oleObj name="Graph" r:id="rId4" imgW="3920760" imgH="3000960" progId="Origin95.Graph">
+                  <p:embed/>
+                </p:oleObj>
+              </mc:Choice>
+              <mc:Fallback>
+                <p:oleObj name="Graph" r:id="rId4" imgW="3920760" imgH="3000960" progId="Origin95.Graph">
+                  <p:embed/>
+                  <p:pic>
+                    <p:nvPicPr>
+                      <p:cNvPr id="0" name=""/>
+                      <p:cNvPicPr/>
+                      <p:nvPr/>
+                    </p:nvPicPr>
+                    <p:blipFill>
+                      <a:blip r:embed="rId5"/>
+                      <a:stretch>
+                        <a:fillRect/>
+                      </a:stretch>
+                    </p:blipFill>
+                    <p:spPr>
+                      <a:xfrm>
+                        <a:off x="-230085" y="1690688"/>
+                        <a:ext cx="6586667" cy="5040000"/>
+                      </a:xfrm>
+                      <a:prstGeom prst="rect">
+                        <a:avLst/>
+                      </a:prstGeom>
+                    </p:spPr>
+                  </p:pic>
+                </p:oleObj>
+              </mc:Fallback>
+            </mc:AlternateContent>
+          </a:graphicData>
+        </a:graphic>
+      </p:graphicFrame>
+    </p:spTree>
+    <p:extLst>
+      <p:ext uri="{BB962C8B-B14F-4D97-AF65-F5344CB8AC3E}">
+        <p14:creationId xmlns:p14="http://schemas.microsoft.com/office/powerpoint/2010/main" val="1027871724"/>
       </p:ext>
     </p:extLst>
   </p:cSld>

</xml_diff>